<commit_message>
Algieba sort payments (#126)
* update ui spec

* update external spec

* update CHANGELOG.md
</commit_message>
<xml_diff>
--- a/payment_manager/bin/algieba.pptx
+++ b/payment_manager/bin/algieba.pptx
@@ -14,7 +14,7 @@
     <p:sldId id="266" r:id="rId5"/>
     <p:sldId id="265" r:id="rId6"/>
     <p:sldId id="269" r:id="rId7"/>
-    <p:sldId id="270" r:id="rId8"/>
+    <p:sldId id="272" r:id="rId8"/>
     <p:sldId id="267" r:id="rId9"/>
     <p:sldId id="268" r:id="rId10"/>
   </p:sldIdLst>
@@ -200,7 +200,7 @@
           <a:p>
             <a:fld id="{EE82FEE5-269B-9B49-A8C4-823C45BE6055}" type="datetimeFigureOut">
               <a:rPr kumimoji="1" lang="ja-JP" altLang="en-US" smtClean="0"/>
-              <a:t>17/10/14</a:t>
+              <a:t>17/11/12</a:t>
             </a:fld>
             <a:endParaRPr kumimoji="1" lang="ja-JP" altLang="en-US"/>
           </a:p>
@@ -1353,7 +1353,7 @@
           <a:p>
             <a:fld id="{3ABA01A1-4899-9944-833D-6A66CDE659CB}" type="datetimeFigureOut">
               <a:rPr kumimoji="1" lang="ja-JP" altLang="en-US" smtClean="0"/>
-              <a:t>17/10/14</a:t>
+              <a:t>17/11/12</a:t>
             </a:fld>
             <a:endParaRPr kumimoji="1" lang="ja-JP" altLang="en-US"/>
           </a:p>
@@ -1555,7 +1555,7 @@
           <a:p>
             <a:fld id="{3ABA01A1-4899-9944-833D-6A66CDE659CB}" type="datetimeFigureOut">
               <a:rPr kumimoji="1" lang="ja-JP" altLang="en-US" smtClean="0"/>
-              <a:t>17/10/14</a:t>
+              <a:t>17/11/12</a:t>
             </a:fld>
             <a:endParaRPr kumimoji="1" lang="ja-JP" altLang="en-US"/>
           </a:p>
@@ -1767,7 +1767,7 @@
           <a:p>
             <a:fld id="{3ABA01A1-4899-9944-833D-6A66CDE659CB}" type="datetimeFigureOut">
               <a:rPr kumimoji="1" lang="ja-JP" altLang="en-US" smtClean="0"/>
-              <a:t>17/10/14</a:t>
+              <a:t>17/11/12</a:t>
             </a:fld>
             <a:endParaRPr kumimoji="1" lang="ja-JP" altLang="en-US"/>
           </a:p>
@@ -1969,7 +1969,7 @@
           <a:p>
             <a:fld id="{3ABA01A1-4899-9944-833D-6A66CDE659CB}" type="datetimeFigureOut">
               <a:rPr kumimoji="1" lang="ja-JP" altLang="en-US" smtClean="0"/>
-              <a:t>17/10/14</a:t>
+              <a:t>17/11/12</a:t>
             </a:fld>
             <a:endParaRPr kumimoji="1" lang="ja-JP" altLang="en-US"/>
           </a:p>
@@ -2215,7 +2215,7 @@
           <a:p>
             <a:fld id="{3ABA01A1-4899-9944-833D-6A66CDE659CB}" type="datetimeFigureOut">
               <a:rPr kumimoji="1" lang="ja-JP" altLang="en-US" smtClean="0"/>
-              <a:t>17/10/14</a:t>
+              <a:t>17/11/12</a:t>
             </a:fld>
             <a:endParaRPr kumimoji="1" lang="ja-JP" altLang="en-US"/>
           </a:p>
@@ -2567,7 +2567,7 @@
           <a:p>
             <a:fld id="{3ABA01A1-4899-9944-833D-6A66CDE659CB}" type="datetimeFigureOut">
               <a:rPr kumimoji="1" lang="ja-JP" altLang="en-US" smtClean="0"/>
-              <a:t>17/10/14</a:t>
+              <a:t>17/11/12</a:t>
             </a:fld>
             <a:endParaRPr kumimoji="1" lang="ja-JP" altLang="en-US"/>
           </a:p>
@@ -3053,7 +3053,7 @@
           <a:p>
             <a:fld id="{3ABA01A1-4899-9944-833D-6A66CDE659CB}" type="datetimeFigureOut">
               <a:rPr kumimoji="1" lang="ja-JP" altLang="en-US" smtClean="0"/>
-              <a:t>17/10/14</a:t>
+              <a:t>17/11/12</a:t>
             </a:fld>
             <a:endParaRPr kumimoji="1" lang="ja-JP" altLang="en-US"/>
           </a:p>
@@ -3171,7 +3171,7 @@
           <a:p>
             <a:fld id="{3ABA01A1-4899-9944-833D-6A66CDE659CB}" type="datetimeFigureOut">
               <a:rPr kumimoji="1" lang="ja-JP" altLang="en-US" smtClean="0"/>
-              <a:t>17/10/14</a:t>
+              <a:t>17/11/12</a:t>
             </a:fld>
             <a:endParaRPr kumimoji="1" lang="ja-JP" altLang="en-US"/>
           </a:p>
@@ -3266,7 +3266,7 @@
           <a:p>
             <a:fld id="{3ABA01A1-4899-9944-833D-6A66CDE659CB}" type="datetimeFigureOut">
               <a:rPr kumimoji="1" lang="ja-JP" altLang="en-US" smtClean="0"/>
-              <a:t>17/10/14</a:t>
+              <a:t>17/11/12</a:t>
             </a:fld>
             <a:endParaRPr kumimoji="1" lang="ja-JP" altLang="en-US"/>
           </a:p>
@@ -3575,7 +3575,7 @@
           <a:p>
             <a:fld id="{3ABA01A1-4899-9944-833D-6A66CDE659CB}" type="datetimeFigureOut">
               <a:rPr kumimoji="1" lang="ja-JP" altLang="en-US" smtClean="0"/>
-              <a:t>17/10/14</a:t>
+              <a:t>17/11/12</a:t>
             </a:fld>
             <a:endParaRPr kumimoji="1" lang="ja-JP" altLang="en-US"/>
           </a:p>
@@ -3828,7 +3828,7 @@
           <a:p>
             <a:fld id="{3ABA01A1-4899-9944-833D-6A66CDE659CB}" type="datetimeFigureOut">
               <a:rPr kumimoji="1" lang="ja-JP" altLang="en-US" smtClean="0"/>
-              <a:t>17/10/14</a:t>
+              <a:t>17/11/12</a:t>
             </a:fld>
             <a:endParaRPr kumimoji="1" lang="ja-JP" altLang="en-US"/>
           </a:p>
@@ -4073,7 +4073,7 @@
           <a:p>
             <a:fld id="{3ABA01A1-4899-9944-833D-6A66CDE659CB}" type="datetimeFigureOut">
               <a:rPr kumimoji="1" lang="ja-JP" altLang="en-US" smtClean="0"/>
-              <a:t>17/10/14</a:t>
+              <a:t>17/11/12</a:t>
             </a:fld>
             <a:endParaRPr kumimoji="1" lang="ja-JP" altLang="en-US"/>
           </a:p>
@@ -4517,11 +4517,11 @@
             </a:r>
             <a:r>
               <a:rPr lang="en-US" altLang="ja-JP" sz="2800" dirty="0" smtClean="0"/>
-              <a:t>2017/10/</a:t>
+              <a:t>2017/</a:t>
             </a:r>
             <a:r>
               <a:rPr lang="en-US" altLang="ja-JP" sz="2800" dirty="0" smtClean="0"/>
-              <a:t>14</a:t>
+              <a:t>11/12</a:t>
             </a:r>
             <a:r>
               <a:rPr lang="en-US" altLang="ja-JP" sz="2800" dirty="0" smtClean="0"/>
@@ -4536,7 +4536,11 @@
             </a:r>
             <a:r>
               <a:rPr lang="en-US" altLang="ja-JP" sz="2800" dirty="0" smtClean="0"/>
-              <a:t> 2.11.0</a:t>
+              <a:t> </a:t>
+            </a:r>
+            <a:r>
+              <a:rPr lang="en-US" altLang="ja-JP" sz="2800" dirty="0" smtClean="0"/>
+              <a:t>2.12.0</a:t>
             </a:r>
             <a:endParaRPr kumimoji="1" lang="ja-JP" altLang="en-US" dirty="0"/>
           </a:p>
@@ -4847,7 +4851,7 @@
         <p:spPr>
           <a:xfrm>
             <a:off x="646545" y="969818"/>
-            <a:ext cx="7635424" cy="5632312"/>
+            <a:ext cx="7635424" cy="5663089"/>
           </a:xfrm>
           <a:prstGeom prst="rect">
             <a:avLst/>
@@ -4883,7 +4887,7 @@
               <a:buFont typeface="Arial"/>
               <a:buChar char="•"/>
             </a:pPr>
-            <a:endParaRPr lang="en-US" altLang="ja-JP" dirty="0" smtClean="0">
+            <a:endParaRPr lang="en-US" altLang="ja-JP" sz="1000" dirty="0" smtClean="0">
               <a:latin typeface="メイリオ"/>
               <a:ea typeface="メイリオ"/>
               <a:cs typeface="メイリオ"/>
@@ -5059,7 +5063,7 @@
               <a:buFont typeface="Arial"/>
               <a:buChar char="•"/>
             </a:pPr>
-            <a:endParaRPr lang="en-US" altLang="ja-JP" dirty="0" smtClean="0">
+            <a:endParaRPr lang="en-US" altLang="ja-JP" sz="1000" dirty="0" smtClean="0">
               <a:latin typeface="メイリオ"/>
               <a:ea typeface="メイリオ"/>
               <a:cs typeface="メイリオ"/>
@@ -5150,7 +5154,7 @@
               <a:buFont typeface="Arial"/>
               <a:buChar char="•"/>
             </a:pPr>
-            <a:endParaRPr lang="en-US" altLang="ja-JP" dirty="0" smtClean="0">
+            <a:endParaRPr lang="en-US" altLang="ja-JP" sz="1000" dirty="0" smtClean="0">
               <a:latin typeface="メイリオ"/>
               <a:ea typeface="メイリオ"/>
               <a:cs typeface="メイリオ"/>
@@ -5235,6 +5239,25 @@
                 <a:cs typeface="メイリオ"/>
               </a:rPr>
               <a:t>される</a:t>
+            </a:r>
+            <a:endParaRPr lang="en-US" altLang="ja-JP" dirty="0" smtClean="0">
+              <a:latin typeface="メイリオ"/>
+              <a:ea typeface="メイリオ"/>
+              <a:cs typeface="メイリオ"/>
+            </a:endParaRPr>
+          </a:p>
+          <a:p>
+            <a:pPr marL="742950" lvl="1" indent="-285750">
+              <a:buFont typeface="Arial"/>
+              <a:buChar char="•"/>
+            </a:pPr>
+            <a:r>
+              <a:rPr lang="en-US" altLang="en-US" dirty="0" smtClean="0">
+                <a:latin typeface="メイリオ"/>
+                <a:ea typeface="メイリオ"/>
+                <a:cs typeface="メイリオ"/>
+              </a:rPr>
+              <a:t>項目を選択することでソート可能</a:t>
             </a:r>
             <a:endParaRPr lang="en-US" altLang="ja-JP" dirty="0" smtClean="0">
               <a:latin typeface="メイリオ"/>
@@ -5910,7 +5933,7 @@
           <p:nvPr>
             <p:extLst>
               <p:ext uri="{D42A27DB-BD31-4B8C-83A1-F6EECF244321}">
-                <p14:modId xmlns:p14="http://schemas.microsoft.com/office/powerpoint/2010/main" val="1983224749"/>
+                <p14:modId xmlns:p14="http://schemas.microsoft.com/office/powerpoint/2010/main" val="3806521063"/>
               </p:ext>
             </p:extLst>
           </p:nvPr>
@@ -9179,21 +9202,373 @@
                 <a:ea typeface="メイリオ"/>
                 <a:cs typeface="メイリオ"/>
               </a:rPr>
-              <a:t>種類</a:t>
-            </a:r>
-            <a:r>
-              <a:rPr kumimoji="1" lang="ja-JP" altLang="en-US" sz="1000" dirty="0" smtClean="0">
-                <a:latin typeface="メイリオ"/>
-                <a:ea typeface="メイリオ"/>
-                <a:cs typeface="メイリオ"/>
-              </a:rPr>
-              <a:t>：</a:t>
+              <a:t>種類：</a:t>
             </a:r>
             <a:endParaRPr kumimoji="1" lang="ja-JP" altLang="en-US" sz="1000" dirty="0">
               <a:latin typeface="メイリオ"/>
               <a:ea typeface="メイリオ"/>
               <a:cs typeface="メイリオ"/>
             </a:endParaRPr>
+          </a:p>
+        </p:txBody>
+      </p:sp>
+      <p:sp>
+        <p:nvSpPr>
+          <p:cNvPr id="91" name="二等辺三角形 90"/>
+          <p:cNvSpPr/>
+          <p:nvPr/>
+        </p:nvSpPr>
+        <p:spPr>
+          <a:xfrm>
+            <a:off x="2516950" y="2487417"/>
+            <a:ext cx="144000" cy="144000"/>
+          </a:xfrm>
+          <a:prstGeom prst="triangle">
+            <a:avLst/>
+          </a:prstGeom>
+          <a:solidFill>
+            <a:schemeClr val="bg1"/>
+          </a:solidFill>
+          <a:ln>
+            <a:noFill/>
+          </a:ln>
+          <a:effectLst/>
+        </p:spPr>
+        <p:style>
+          <a:lnRef idx="1">
+            <a:schemeClr val="accent1"/>
+          </a:lnRef>
+          <a:fillRef idx="3">
+            <a:schemeClr val="accent1"/>
+          </a:fillRef>
+          <a:effectRef idx="2">
+            <a:schemeClr val="accent1"/>
+          </a:effectRef>
+          <a:fontRef idx="minor">
+            <a:schemeClr val="lt1"/>
+          </a:fontRef>
+        </p:style>
+        <p:txBody>
+          <a:bodyPr rtlCol="0" anchor="ctr"/>
+          <a:lstStyle/>
+          <a:p>
+            <a:pPr algn="ctr"/>
+            <a:endParaRPr kumimoji="1" lang="ja-JP" altLang="en-US"/>
+          </a:p>
+        </p:txBody>
+      </p:sp>
+      <p:sp>
+        <p:nvSpPr>
+          <p:cNvPr id="93" name="二等辺三角形 92"/>
+          <p:cNvSpPr/>
+          <p:nvPr/>
+        </p:nvSpPr>
+        <p:spPr>
+          <a:xfrm rot="10800000">
+            <a:off x="2516951" y="2642657"/>
+            <a:ext cx="144000" cy="144000"/>
+          </a:xfrm>
+          <a:prstGeom prst="triangle">
+            <a:avLst/>
+          </a:prstGeom>
+          <a:solidFill>
+            <a:schemeClr val="bg1"/>
+          </a:solidFill>
+          <a:ln>
+            <a:noFill/>
+          </a:ln>
+          <a:effectLst/>
+        </p:spPr>
+        <p:style>
+          <a:lnRef idx="1">
+            <a:schemeClr val="accent1"/>
+          </a:lnRef>
+          <a:fillRef idx="3">
+            <a:schemeClr val="accent1"/>
+          </a:fillRef>
+          <a:effectRef idx="2">
+            <a:schemeClr val="accent1"/>
+          </a:effectRef>
+          <a:fontRef idx="minor">
+            <a:schemeClr val="lt1"/>
+          </a:fontRef>
+        </p:style>
+        <p:txBody>
+          <a:bodyPr rtlCol="0" anchor="ctr"/>
+          <a:lstStyle/>
+          <a:p>
+            <a:pPr algn="ctr"/>
+            <a:endParaRPr kumimoji="1" lang="ja-JP" altLang="en-US"/>
+          </a:p>
+        </p:txBody>
+      </p:sp>
+      <p:sp>
+        <p:nvSpPr>
+          <p:cNvPr id="94" name="二等辺三角形 93"/>
+          <p:cNvSpPr/>
+          <p:nvPr/>
+        </p:nvSpPr>
+        <p:spPr>
+          <a:xfrm>
+            <a:off x="4227925" y="2489732"/>
+            <a:ext cx="144000" cy="144000"/>
+          </a:xfrm>
+          <a:prstGeom prst="triangle">
+            <a:avLst/>
+          </a:prstGeom>
+          <a:solidFill>
+            <a:schemeClr val="bg1"/>
+          </a:solidFill>
+          <a:ln>
+            <a:noFill/>
+          </a:ln>
+          <a:effectLst/>
+        </p:spPr>
+        <p:style>
+          <a:lnRef idx="1">
+            <a:schemeClr val="accent1"/>
+          </a:lnRef>
+          <a:fillRef idx="3">
+            <a:schemeClr val="accent1"/>
+          </a:fillRef>
+          <a:effectRef idx="2">
+            <a:schemeClr val="accent1"/>
+          </a:effectRef>
+          <a:fontRef idx="minor">
+            <a:schemeClr val="lt1"/>
+          </a:fontRef>
+        </p:style>
+        <p:txBody>
+          <a:bodyPr rtlCol="0" anchor="ctr"/>
+          <a:lstStyle/>
+          <a:p>
+            <a:pPr algn="ctr"/>
+            <a:endParaRPr kumimoji="1" lang="ja-JP" altLang="en-US"/>
+          </a:p>
+        </p:txBody>
+      </p:sp>
+      <p:sp>
+        <p:nvSpPr>
+          <p:cNvPr id="99" name="二等辺三角形 98"/>
+          <p:cNvSpPr/>
+          <p:nvPr/>
+        </p:nvSpPr>
+        <p:spPr>
+          <a:xfrm rot="10800000">
+            <a:off x="4227926" y="2644972"/>
+            <a:ext cx="144000" cy="144000"/>
+          </a:xfrm>
+          <a:prstGeom prst="triangle">
+            <a:avLst/>
+          </a:prstGeom>
+          <a:solidFill>
+            <a:schemeClr val="bg1"/>
+          </a:solidFill>
+          <a:ln>
+            <a:noFill/>
+          </a:ln>
+          <a:effectLst/>
+        </p:spPr>
+        <p:style>
+          <a:lnRef idx="1">
+            <a:schemeClr val="accent1"/>
+          </a:lnRef>
+          <a:fillRef idx="3">
+            <a:schemeClr val="accent1"/>
+          </a:fillRef>
+          <a:effectRef idx="2">
+            <a:schemeClr val="accent1"/>
+          </a:effectRef>
+          <a:fontRef idx="minor">
+            <a:schemeClr val="lt1"/>
+          </a:fontRef>
+        </p:style>
+        <p:txBody>
+          <a:bodyPr rtlCol="0" anchor="ctr"/>
+          <a:lstStyle/>
+          <a:p>
+            <a:pPr algn="ctr"/>
+            <a:endParaRPr kumimoji="1" lang="ja-JP" altLang="en-US"/>
+          </a:p>
+        </p:txBody>
+      </p:sp>
+      <p:sp>
+        <p:nvSpPr>
+          <p:cNvPr id="100" name="二等辺三角形 99"/>
+          <p:cNvSpPr/>
+          <p:nvPr/>
+        </p:nvSpPr>
+        <p:spPr>
+          <a:xfrm>
+            <a:off x="5950445" y="2492047"/>
+            <a:ext cx="144000" cy="144000"/>
+          </a:xfrm>
+          <a:prstGeom prst="triangle">
+            <a:avLst/>
+          </a:prstGeom>
+          <a:solidFill>
+            <a:schemeClr val="bg1"/>
+          </a:solidFill>
+          <a:ln>
+            <a:noFill/>
+          </a:ln>
+          <a:effectLst/>
+        </p:spPr>
+        <p:style>
+          <a:lnRef idx="1">
+            <a:schemeClr val="accent1"/>
+          </a:lnRef>
+          <a:fillRef idx="3">
+            <a:schemeClr val="accent1"/>
+          </a:fillRef>
+          <a:effectRef idx="2">
+            <a:schemeClr val="accent1"/>
+          </a:effectRef>
+          <a:fontRef idx="minor">
+            <a:schemeClr val="lt1"/>
+          </a:fontRef>
+        </p:style>
+        <p:txBody>
+          <a:bodyPr rtlCol="0" anchor="ctr"/>
+          <a:lstStyle/>
+          <a:p>
+            <a:pPr algn="ctr"/>
+            <a:endParaRPr kumimoji="1" lang="ja-JP" altLang="en-US"/>
+          </a:p>
+        </p:txBody>
+      </p:sp>
+      <p:sp>
+        <p:nvSpPr>
+          <p:cNvPr id="101" name="二等辺三角形 100"/>
+          <p:cNvSpPr/>
+          <p:nvPr/>
+        </p:nvSpPr>
+        <p:spPr>
+          <a:xfrm rot="10800000">
+            <a:off x="5950446" y="2647287"/>
+            <a:ext cx="144000" cy="144000"/>
+          </a:xfrm>
+          <a:prstGeom prst="triangle">
+            <a:avLst/>
+          </a:prstGeom>
+          <a:solidFill>
+            <a:schemeClr val="bg1"/>
+          </a:solidFill>
+          <a:ln>
+            <a:noFill/>
+          </a:ln>
+          <a:effectLst/>
+        </p:spPr>
+        <p:style>
+          <a:lnRef idx="1">
+            <a:schemeClr val="accent1"/>
+          </a:lnRef>
+          <a:fillRef idx="3">
+            <a:schemeClr val="accent1"/>
+          </a:fillRef>
+          <a:effectRef idx="2">
+            <a:schemeClr val="accent1"/>
+          </a:effectRef>
+          <a:fontRef idx="minor">
+            <a:schemeClr val="lt1"/>
+          </a:fontRef>
+        </p:style>
+        <p:txBody>
+          <a:bodyPr rtlCol="0" anchor="ctr"/>
+          <a:lstStyle/>
+          <a:p>
+            <a:pPr algn="ctr"/>
+            <a:endParaRPr kumimoji="1" lang="ja-JP" altLang="en-US"/>
+          </a:p>
+        </p:txBody>
+      </p:sp>
+      <p:sp>
+        <p:nvSpPr>
+          <p:cNvPr id="102" name="二等辺三角形 101"/>
+          <p:cNvSpPr/>
+          <p:nvPr/>
+        </p:nvSpPr>
+        <p:spPr>
+          <a:xfrm>
+            <a:off x="7672965" y="2494362"/>
+            <a:ext cx="144000" cy="144000"/>
+          </a:xfrm>
+          <a:prstGeom prst="triangle">
+            <a:avLst/>
+          </a:prstGeom>
+          <a:solidFill>
+            <a:schemeClr val="bg1"/>
+          </a:solidFill>
+          <a:ln>
+            <a:noFill/>
+          </a:ln>
+          <a:effectLst/>
+        </p:spPr>
+        <p:style>
+          <a:lnRef idx="1">
+            <a:schemeClr val="accent1"/>
+          </a:lnRef>
+          <a:fillRef idx="3">
+            <a:schemeClr val="accent1"/>
+          </a:fillRef>
+          <a:effectRef idx="2">
+            <a:schemeClr val="accent1"/>
+          </a:effectRef>
+          <a:fontRef idx="minor">
+            <a:schemeClr val="lt1"/>
+          </a:fontRef>
+        </p:style>
+        <p:txBody>
+          <a:bodyPr rtlCol="0" anchor="ctr"/>
+          <a:lstStyle/>
+          <a:p>
+            <a:pPr algn="ctr"/>
+            <a:endParaRPr kumimoji="1" lang="ja-JP" altLang="en-US"/>
+          </a:p>
+        </p:txBody>
+      </p:sp>
+      <p:sp>
+        <p:nvSpPr>
+          <p:cNvPr id="103" name="二等辺三角形 102"/>
+          <p:cNvSpPr/>
+          <p:nvPr/>
+        </p:nvSpPr>
+        <p:spPr>
+          <a:xfrm rot="10800000">
+            <a:off x="7672966" y="2649602"/>
+            <a:ext cx="144000" cy="144000"/>
+          </a:xfrm>
+          <a:prstGeom prst="triangle">
+            <a:avLst/>
+          </a:prstGeom>
+          <a:solidFill>
+            <a:schemeClr val="bg1"/>
+          </a:solidFill>
+          <a:ln>
+            <a:noFill/>
+          </a:ln>
+          <a:effectLst/>
+        </p:spPr>
+        <p:style>
+          <a:lnRef idx="1">
+            <a:schemeClr val="accent1"/>
+          </a:lnRef>
+          <a:fillRef idx="3">
+            <a:schemeClr val="accent1"/>
+          </a:fillRef>
+          <a:effectRef idx="2">
+            <a:schemeClr val="accent1"/>
+          </a:effectRef>
+          <a:fontRef idx="minor">
+            <a:schemeClr val="lt1"/>
+          </a:fontRef>
+        </p:style>
+        <p:txBody>
+          <a:bodyPr rtlCol="0" anchor="ctr"/>
+          <a:lstStyle/>
+          <a:p>
+            <a:pPr algn="ctr"/>
+            <a:endParaRPr kumimoji="1" lang="ja-JP" altLang="en-US"/>
           </a:p>
         </p:txBody>
       </p:sp>
@@ -9426,14 +9801,14 @@
       </p:grpSpPr>
       <p:graphicFrame>
         <p:nvGraphicFramePr>
-          <p:cNvPr id="82" name="表 81"/>
+          <p:cNvPr id="74" name="表 73"/>
           <p:cNvGraphicFramePr>
             <a:graphicFrameLocks noGrp="1"/>
           </p:cNvGraphicFramePr>
           <p:nvPr>
             <p:extLst>
               <p:ext uri="{D42A27DB-BD31-4B8C-83A1-F6EECF244321}">
-                <p14:modId xmlns:p14="http://schemas.microsoft.com/office/powerpoint/2010/main" val="1670799361"/>
+                <p14:modId xmlns:p14="http://schemas.microsoft.com/office/powerpoint/2010/main" val="310339601"/>
               </p:ext>
             </p:extLst>
           </p:nvPr>
@@ -9928,7 +10303,7 @@
       </p:graphicFrame>
       <p:sp>
         <p:nvSpPr>
-          <p:cNvPr id="83" name="正方形/長方形 82"/>
+          <p:cNvPr id="75" name="正方形/長方形 74"/>
           <p:cNvSpPr/>
           <p:nvPr/>
         </p:nvSpPr>
@@ -9980,7 +10355,7 @@
       </p:sp>
       <p:sp>
         <p:nvSpPr>
-          <p:cNvPr id="84" name="角丸四角形 83"/>
+          <p:cNvPr id="76" name="角丸四角形 75"/>
           <p:cNvSpPr/>
           <p:nvPr/>
         </p:nvSpPr>
@@ -10025,7 +10400,7 @@
       </p:sp>
       <p:sp>
         <p:nvSpPr>
-          <p:cNvPr id="85" name="テキスト ボックス 84"/>
+          <p:cNvPr id="77" name="テキスト ボックス 76"/>
           <p:cNvSpPr txBox="1"/>
           <p:nvPr/>
         </p:nvSpPr>
@@ -10063,7 +10438,7 @@
       </p:sp>
       <p:sp>
         <p:nvSpPr>
-          <p:cNvPr id="86" name="角丸四角形 85"/>
+          <p:cNvPr id="78" name="角丸四角形 77"/>
           <p:cNvSpPr/>
           <p:nvPr/>
         </p:nvSpPr>
@@ -10108,7 +10483,7 @@
       </p:sp>
       <p:sp>
         <p:nvSpPr>
-          <p:cNvPr id="87" name="テキスト ボックス 86"/>
+          <p:cNvPr id="79" name="テキスト ボックス 78"/>
           <p:cNvSpPr txBox="1"/>
           <p:nvPr/>
         </p:nvSpPr>
@@ -10154,7 +10529,7 @@
       </p:sp>
       <p:sp>
         <p:nvSpPr>
-          <p:cNvPr id="88" name="角丸四角形 87"/>
+          <p:cNvPr id="80" name="角丸四角形 79"/>
           <p:cNvSpPr/>
           <p:nvPr/>
         </p:nvSpPr>
@@ -10199,7 +10574,7 @@
       </p:sp>
       <p:sp>
         <p:nvSpPr>
-          <p:cNvPr id="89" name="テキスト ボックス 88"/>
+          <p:cNvPr id="81" name="テキスト ボックス 80"/>
           <p:cNvSpPr txBox="1"/>
           <p:nvPr/>
         </p:nvSpPr>
@@ -10245,7 +10620,7 @@
       </p:sp>
       <p:sp>
         <p:nvSpPr>
-          <p:cNvPr id="90" name="角丸四角形 89"/>
+          <p:cNvPr id="137" name="角丸四角形 136"/>
           <p:cNvSpPr/>
           <p:nvPr/>
         </p:nvSpPr>
@@ -10290,7 +10665,7 @@
       </p:sp>
       <p:sp>
         <p:nvSpPr>
-          <p:cNvPr id="91" name="テキスト ボックス 90"/>
+          <p:cNvPr id="138" name="テキスト ボックス 137"/>
           <p:cNvSpPr txBox="1"/>
           <p:nvPr/>
         </p:nvSpPr>
@@ -10336,7 +10711,7 @@
       </p:sp>
       <p:sp>
         <p:nvSpPr>
-          <p:cNvPr id="92" name="角丸四角形 91"/>
+          <p:cNvPr id="139" name="角丸四角形 138"/>
           <p:cNvSpPr/>
           <p:nvPr/>
         </p:nvSpPr>
@@ -10399,7 +10774,7 @@
       </p:sp>
       <p:cxnSp>
         <p:nvCxnSpPr>
-          <p:cNvPr id="93" name="直線コネクタ 92"/>
+          <p:cNvPr id="140" name="直線コネクタ 139"/>
           <p:cNvCxnSpPr/>
           <p:nvPr/>
         </p:nvCxnSpPr>
@@ -10437,7 +10812,7 @@
       </p:cxnSp>
       <p:sp>
         <p:nvSpPr>
-          <p:cNvPr id="94" name="テキスト ボックス 93"/>
+          <p:cNvPr id="141" name="テキスト ボックス 140"/>
           <p:cNvSpPr txBox="1"/>
           <p:nvPr/>
         </p:nvSpPr>
@@ -10475,7 +10850,7 @@
       </p:sp>
       <p:sp>
         <p:nvSpPr>
-          <p:cNvPr id="95" name="テキスト ボックス 94"/>
+          <p:cNvPr id="142" name="テキスト ボックス 141"/>
           <p:cNvSpPr txBox="1"/>
           <p:nvPr/>
         </p:nvSpPr>
@@ -10513,7 +10888,7 @@
       </p:sp>
       <p:sp>
         <p:nvSpPr>
-          <p:cNvPr id="96" name="テキスト ボックス 95"/>
+          <p:cNvPr id="143" name="テキスト ボックス 142"/>
           <p:cNvSpPr txBox="1"/>
           <p:nvPr/>
         </p:nvSpPr>
@@ -10551,7 +10926,7 @@
       </p:sp>
       <p:sp>
         <p:nvSpPr>
-          <p:cNvPr id="97" name="二等辺三角形 96"/>
+          <p:cNvPr id="144" name="二等辺三角形 143"/>
           <p:cNvSpPr/>
           <p:nvPr/>
         </p:nvSpPr>
@@ -10596,7 +10971,7 @@
       </p:sp>
       <p:sp>
         <p:nvSpPr>
-          <p:cNvPr id="98" name="二等辺三角形 97"/>
+          <p:cNvPr id="145" name="二等辺三角形 144"/>
           <p:cNvSpPr/>
           <p:nvPr/>
         </p:nvSpPr>
@@ -10641,7 +11016,7 @@
       </p:sp>
       <p:sp>
         <p:nvSpPr>
-          <p:cNvPr id="99" name="テキスト ボックス 98"/>
+          <p:cNvPr id="146" name="テキスト ボックス 145"/>
           <p:cNvSpPr txBox="1"/>
           <p:nvPr/>
         </p:nvSpPr>
@@ -10679,7 +11054,7 @@
       </p:sp>
       <p:sp>
         <p:nvSpPr>
-          <p:cNvPr id="100" name="テキスト ボックス 99"/>
+          <p:cNvPr id="147" name="テキスト ボックス 146"/>
           <p:cNvSpPr txBox="1"/>
           <p:nvPr/>
         </p:nvSpPr>
@@ -10773,7 +11148,7 @@
       </p:sp>
       <p:sp>
         <p:nvSpPr>
-          <p:cNvPr id="101" name="二等辺三角形 100"/>
+          <p:cNvPr id="148" name="二等辺三角形 147"/>
           <p:cNvSpPr/>
           <p:nvPr/>
         </p:nvSpPr>
@@ -10818,7 +11193,7 @@
       </p:sp>
       <p:sp>
         <p:nvSpPr>
-          <p:cNvPr id="102" name="二等辺三角形 101"/>
+          <p:cNvPr id="149" name="二等辺三角形 148"/>
           <p:cNvSpPr/>
           <p:nvPr/>
         </p:nvSpPr>
@@ -10863,7 +11238,7 @@
       </p:sp>
       <p:sp>
         <p:nvSpPr>
-          <p:cNvPr id="103" name="二等辺三角形 102"/>
+          <p:cNvPr id="150" name="二等辺三角形 149"/>
           <p:cNvSpPr/>
           <p:nvPr/>
         </p:nvSpPr>
@@ -10908,7 +11283,7 @@
       </p:sp>
       <p:sp>
         <p:nvSpPr>
-          <p:cNvPr id="104" name="二等辺三角形 103"/>
+          <p:cNvPr id="151" name="二等辺三角形 150"/>
           <p:cNvSpPr/>
           <p:nvPr/>
         </p:nvSpPr>
@@ -10953,7 +11328,7 @@
       </p:sp>
       <p:sp>
         <p:nvSpPr>
-          <p:cNvPr id="105" name="角丸四角形 104"/>
+          <p:cNvPr id="152" name="角丸四角形 151"/>
           <p:cNvSpPr/>
           <p:nvPr/>
         </p:nvSpPr>
@@ -11016,7 +11391,7 @@
       </p:sp>
       <p:pic>
         <p:nvPicPr>
-          <p:cNvPr id="106" name="図 105" descr="trash.png"/>
+          <p:cNvPr id="153" name="図 152" descr="trash.png"/>
           <p:cNvPicPr>
             <a:picLocks noChangeAspect="1"/>
           </p:cNvPicPr>
@@ -11046,7 +11421,7 @@
       </p:pic>
       <p:pic>
         <p:nvPicPr>
-          <p:cNvPr id="107" name="図 106" descr="trash.png"/>
+          <p:cNvPr id="154" name="図 153" descr="trash.png"/>
           <p:cNvPicPr>
             <a:picLocks noChangeAspect="1"/>
           </p:cNvPicPr>
@@ -11076,7 +11451,7 @@
       </p:pic>
       <p:pic>
         <p:nvPicPr>
-          <p:cNvPr id="108" name="図 107" descr="trash.png"/>
+          <p:cNvPr id="155" name="図 154" descr="trash.png"/>
           <p:cNvPicPr>
             <a:picLocks noChangeAspect="1"/>
           </p:cNvPicPr>
@@ -11106,7 +11481,7 @@
       </p:pic>
       <p:pic>
         <p:nvPicPr>
-          <p:cNvPr id="109" name="図 108" descr="trash.png"/>
+          <p:cNvPr id="156" name="図 155" descr="trash.png"/>
           <p:cNvPicPr>
             <a:picLocks noChangeAspect="1"/>
           </p:cNvPicPr>
@@ -11136,7 +11511,7 @@
       </p:pic>
       <p:pic>
         <p:nvPicPr>
-          <p:cNvPr id="110" name="図 109" descr="trash.png"/>
+          <p:cNvPr id="157" name="図 156" descr="trash.png"/>
           <p:cNvPicPr>
             <a:picLocks noChangeAspect="1"/>
           </p:cNvPicPr>
@@ -11166,7 +11541,7 @@
       </p:pic>
       <p:pic>
         <p:nvPicPr>
-          <p:cNvPr id="111" name="図 110" descr="trash.png"/>
+          <p:cNvPr id="158" name="図 157" descr="trash.png"/>
           <p:cNvPicPr>
             <a:picLocks noChangeAspect="1"/>
           </p:cNvPicPr>
@@ -11196,7 +11571,7 @@
       </p:pic>
       <p:pic>
         <p:nvPicPr>
-          <p:cNvPr id="112" name="図 111" descr="trash.png"/>
+          <p:cNvPr id="159" name="図 158" descr="trash.png"/>
           <p:cNvPicPr>
             <a:picLocks noChangeAspect="1"/>
           </p:cNvPicPr>
@@ -11226,7 +11601,7 @@
       </p:pic>
       <p:pic>
         <p:nvPicPr>
-          <p:cNvPr id="113" name="図 112" descr="trash.png"/>
+          <p:cNvPr id="160" name="図 159" descr="trash.png"/>
           <p:cNvPicPr>
             <a:picLocks noChangeAspect="1"/>
           </p:cNvPicPr>
@@ -11256,7 +11631,7 @@
       </p:pic>
       <p:pic>
         <p:nvPicPr>
-          <p:cNvPr id="114" name="図 113" descr="trash.png"/>
+          <p:cNvPr id="161" name="図 160" descr="trash.png"/>
           <p:cNvPicPr>
             <a:picLocks noChangeAspect="1"/>
           </p:cNvPicPr>
@@ -11286,7 +11661,7 @@
       </p:pic>
       <p:pic>
         <p:nvPicPr>
-          <p:cNvPr id="115" name="図 114" descr="trash.png"/>
+          <p:cNvPr id="162" name="図 161" descr="trash.png"/>
           <p:cNvPicPr>
             <a:picLocks noChangeAspect="1"/>
           </p:cNvPicPr>
@@ -11316,7 +11691,7 @@
       </p:pic>
       <p:grpSp>
         <p:nvGrpSpPr>
-          <p:cNvPr id="116" name="図形グループ 115"/>
+          <p:cNvPr id="163" name="図形グループ 162"/>
           <p:cNvGrpSpPr/>
           <p:nvPr/>
         </p:nvGrpSpPr>
@@ -11330,7 +11705,7 @@
         </p:grpSpPr>
         <p:sp>
           <p:nvSpPr>
-            <p:cNvPr id="117" name="角丸四角形 116"/>
+            <p:cNvPr id="164" name="角丸四角形 163"/>
             <p:cNvSpPr/>
             <p:nvPr/>
           </p:nvSpPr>
@@ -11379,7 +11754,7 @@
         </p:sp>
         <p:cxnSp>
           <p:nvCxnSpPr>
-            <p:cNvPr id="118" name="直線コネクタ 117"/>
+            <p:cNvPr id="165" name="直線コネクタ 164"/>
             <p:cNvCxnSpPr/>
             <p:nvPr/>
           </p:nvCxnSpPr>
@@ -11414,7 +11789,7 @@
         </p:cxnSp>
         <p:cxnSp>
           <p:nvCxnSpPr>
-            <p:cNvPr id="119" name="直線コネクタ 118"/>
+            <p:cNvPr id="166" name="直線コネクタ 165"/>
             <p:cNvCxnSpPr/>
             <p:nvPr/>
           </p:nvCxnSpPr>
@@ -11449,7 +11824,7 @@
         </p:cxnSp>
         <p:cxnSp>
           <p:nvCxnSpPr>
-            <p:cNvPr id="120" name="直線コネクタ 119"/>
+            <p:cNvPr id="167" name="直線コネクタ 166"/>
             <p:cNvCxnSpPr/>
             <p:nvPr/>
           </p:nvCxnSpPr>
@@ -11485,7 +11860,7 @@
       </p:grpSp>
       <p:cxnSp>
         <p:nvCxnSpPr>
-          <p:cNvPr id="121" name="直線コネクタ 120"/>
+          <p:cNvPr id="168" name="直線コネクタ 167"/>
           <p:cNvCxnSpPr/>
           <p:nvPr/>
         </p:nvCxnSpPr>
@@ -11523,7 +11898,7 @@
       </p:cxnSp>
       <p:sp>
         <p:nvSpPr>
-          <p:cNvPr id="122" name="テキスト ボックス 121"/>
+          <p:cNvPr id="169" name="テキスト ボックス 168"/>
           <p:cNvSpPr txBox="1"/>
           <p:nvPr/>
         </p:nvSpPr>
@@ -11561,7 +11936,7 @@
       </p:sp>
       <p:sp>
         <p:nvSpPr>
-          <p:cNvPr id="123" name="角丸四角形 122"/>
+          <p:cNvPr id="170" name="角丸四角形 169"/>
           <p:cNvSpPr/>
           <p:nvPr/>
         </p:nvSpPr>
@@ -11606,7 +11981,7 @@
       </p:sp>
       <p:sp>
         <p:nvSpPr>
-          <p:cNvPr id="124" name="テキスト ボックス 123"/>
+          <p:cNvPr id="171" name="テキスト ボックス 170"/>
           <p:cNvSpPr txBox="1"/>
           <p:nvPr/>
         </p:nvSpPr>
@@ -11644,7 +12019,7 @@
       </p:sp>
       <p:sp>
         <p:nvSpPr>
-          <p:cNvPr id="125" name="テキスト ボックス 124"/>
+          <p:cNvPr id="172" name="テキスト ボックス 171"/>
           <p:cNvSpPr txBox="1"/>
           <p:nvPr/>
         </p:nvSpPr>
@@ -11690,7 +12065,7 @@
       </p:sp>
       <p:sp>
         <p:nvSpPr>
-          <p:cNvPr id="126" name="角丸四角形 125"/>
+          <p:cNvPr id="173" name="角丸四角形 172"/>
           <p:cNvSpPr/>
           <p:nvPr/>
         </p:nvSpPr>
@@ -11735,7 +12110,7 @@
       </p:sp>
       <p:grpSp>
         <p:nvGrpSpPr>
-          <p:cNvPr id="127" name="図形グループ 126"/>
+          <p:cNvPr id="174" name="図形グループ 173"/>
           <p:cNvGrpSpPr/>
           <p:nvPr/>
         </p:nvGrpSpPr>
@@ -11749,7 +12124,7 @@
         </p:grpSpPr>
         <p:sp>
           <p:nvSpPr>
-            <p:cNvPr id="128" name="角丸四角形 127"/>
+            <p:cNvPr id="175" name="角丸四角形 174"/>
             <p:cNvSpPr/>
             <p:nvPr/>
           </p:nvSpPr>
@@ -11811,7 +12186,7 @@
         </p:sp>
         <p:sp>
           <p:nvSpPr>
-            <p:cNvPr id="129" name="二等辺三角形 128"/>
+            <p:cNvPr id="176" name="二等辺三角形 175"/>
             <p:cNvSpPr/>
             <p:nvPr/>
           </p:nvSpPr>
@@ -11857,7 +12232,7 @@
       </p:grpSp>
       <p:sp>
         <p:nvSpPr>
-          <p:cNvPr id="130" name="テキスト ボックス 129"/>
+          <p:cNvPr id="177" name="テキスト ボックス 176"/>
           <p:cNvSpPr txBox="1"/>
           <p:nvPr/>
         </p:nvSpPr>
@@ -11903,7 +12278,7 @@
       </p:sp>
       <p:sp>
         <p:nvSpPr>
-          <p:cNvPr id="131" name="角丸四角形 130"/>
+          <p:cNvPr id="178" name="角丸四角形 177"/>
           <p:cNvSpPr/>
           <p:nvPr/>
         </p:nvSpPr>
@@ -11948,7 +12323,7 @@
       </p:sp>
       <p:sp>
         <p:nvSpPr>
-          <p:cNvPr id="132" name="テキスト ボックス 131"/>
+          <p:cNvPr id="179" name="テキスト ボックス 178"/>
           <p:cNvSpPr txBox="1"/>
           <p:nvPr/>
         </p:nvSpPr>
@@ -11994,7 +12369,7 @@
       </p:sp>
       <p:sp>
         <p:nvSpPr>
-          <p:cNvPr id="133" name="角丸四角形 132"/>
+          <p:cNvPr id="180" name="角丸四角形 179"/>
           <p:cNvSpPr/>
           <p:nvPr/>
         </p:nvSpPr>
@@ -12039,7 +12414,7 @@
       </p:sp>
       <p:sp>
         <p:nvSpPr>
-          <p:cNvPr id="134" name="角丸四角形 133"/>
+          <p:cNvPr id="181" name="角丸四角形 180"/>
           <p:cNvSpPr/>
           <p:nvPr/>
         </p:nvSpPr>
@@ -12084,7 +12459,7 @@
       </p:sp>
       <p:sp>
         <p:nvSpPr>
-          <p:cNvPr id="135" name="テキスト ボックス 134"/>
+          <p:cNvPr id="182" name="テキスト ボックス 181"/>
           <p:cNvSpPr txBox="1"/>
           <p:nvPr/>
         </p:nvSpPr>
@@ -12122,7 +12497,7 @@
       </p:sp>
       <p:sp>
         <p:nvSpPr>
-          <p:cNvPr id="136" name="角丸四角形 135"/>
+          <p:cNvPr id="183" name="角丸四角形 182"/>
           <p:cNvSpPr/>
           <p:nvPr/>
         </p:nvSpPr>
@@ -12167,7 +12542,7 @@
       </p:sp>
       <p:sp>
         <p:nvSpPr>
-          <p:cNvPr id="185" name="角丸四角形 184"/>
+          <p:cNvPr id="200" name="角丸四角形 199"/>
           <p:cNvSpPr/>
           <p:nvPr/>
         </p:nvSpPr>
@@ -12230,7 +12605,7 @@
       </p:sp>
       <p:grpSp>
         <p:nvGrpSpPr>
-          <p:cNvPr id="186" name="図形グループ 185"/>
+          <p:cNvPr id="201" name="図形グループ 200"/>
           <p:cNvGrpSpPr/>
           <p:nvPr/>
         </p:nvGrpSpPr>
@@ -12244,7 +12619,7 @@
         </p:grpSpPr>
         <p:sp>
           <p:nvSpPr>
-            <p:cNvPr id="187" name="角丸四角形 186"/>
+            <p:cNvPr id="202" name="角丸四角形 201"/>
             <p:cNvSpPr/>
             <p:nvPr/>
           </p:nvSpPr>
@@ -12293,7 +12668,7 @@
         </p:sp>
         <p:cxnSp>
           <p:nvCxnSpPr>
-            <p:cNvPr id="188" name="直線コネクタ 187"/>
+            <p:cNvPr id="203" name="直線コネクタ 202"/>
             <p:cNvCxnSpPr/>
             <p:nvPr/>
           </p:nvCxnSpPr>
@@ -12328,7 +12703,7 @@
         </p:cxnSp>
         <p:cxnSp>
           <p:nvCxnSpPr>
-            <p:cNvPr id="189" name="直線コネクタ 188"/>
+            <p:cNvPr id="204" name="直線コネクタ 203"/>
             <p:cNvCxnSpPr/>
             <p:nvPr/>
           </p:nvCxnSpPr>
@@ -12363,7 +12738,7 @@
         </p:cxnSp>
         <p:cxnSp>
           <p:nvCxnSpPr>
-            <p:cNvPr id="190" name="直線コネクタ 189"/>
+            <p:cNvPr id="205" name="直線コネクタ 204"/>
             <p:cNvCxnSpPr/>
             <p:nvPr/>
           </p:nvCxnSpPr>
@@ -12399,7 +12774,7 @@
       </p:grpSp>
       <p:sp>
         <p:nvSpPr>
-          <p:cNvPr id="191" name="テキスト ボックス 190"/>
+          <p:cNvPr id="206" name="テキスト ボックス 205"/>
           <p:cNvSpPr txBox="1"/>
           <p:nvPr/>
         </p:nvSpPr>
@@ -12437,7 +12812,7 @@
       </p:sp>
       <p:sp>
         <p:nvSpPr>
-          <p:cNvPr id="192" name="テキスト ボックス 191"/>
+          <p:cNvPr id="207" name="テキスト ボックス 206"/>
           <p:cNvSpPr txBox="1"/>
           <p:nvPr/>
         </p:nvSpPr>
@@ -12475,7 +12850,7 @@
       </p:sp>
       <p:sp>
         <p:nvSpPr>
-          <p:cNvPr id="193" name="円/楕円 192"/>
+          <p:cNvPr id="208" name="円/楕円 207"/>
           <p:cNvSpPr/>
           <p:nvPr/>
         </p:nvSpPr>
@@ -12520,7 +12895,7 @@
       </p:sp>
       <p:sp>
         <p:nvSpPr>
-          <p:cNvPr id="194" name="円/楕円 193"/>
+          <p:cNvPr id="209" name="円/楕円 208"/>
           <p:cNvSpPr/>
           <p:nvPr/>
         </p:nvSpPr>
@@ -12565,7 +12940,7 @@
       </p:sp>
       <p:grpSp>
         <p:nvGrpSpPr>
-          <p:cNvPr id="195" name="図形グループ 194"/>
+          <p:cNvPr id="210" name="図形グループ 209"/>
           <p:cNvGrpSpPr/>
           <p:nvPr/>
         </p:nvGrpSpPr>
@@ -12579,7 +12954,7 @@
         </p:grpSpPr>
         <p:sp>
           <p:nvSpPr>
-            <p:cNvPr id="196" name="角丸四角形 195"/>
+            <p:cNvPr id="211" name="角丸四角形 210"/>
             <p:cNvSpPr/>
             <p:nvPr/>
           </p:nvSpPr>
@@ -12630,7 +13005,7 @@
         </p:sp>
         <p:sp>
           <p:nvSpPr>
-            <p:cNvPr id="197" name="二等辺三角形 196"/>
+            <p:cNvPr id="212" name="二等辺三角形 211"/>
             <p:cNvSpPr/>
             <p:nvPr/>
           </p:nvSpPr>
@@ -12676,7 +13051,7 @@
       </p:grpSp>
       <p:sp>
         <p:nvSpPr>
-          <p:cNvPr id="198" name="テキスト ボックス 197"/>
+          <p:cNvPr id="213" name="テキスト ボックス 212"/>
           <p:cNvSpPr txBox="1"/>
           <p:nvPr/>
         </p:nvSpPr>
@@ -12702,15 +13077,7 @@
                 <a:ea typeface="メイリオ"/>
                 <a:cs typeface="メイリオ"/>
               </a:rPr>
-              <a:t>種類</a:t>
-            </a:r>
-            <a:r>
-              <a:rPr kumimoji="1" lang="ja-JP" altLang="en-US" sz="1000" dirty="0" smtClean="0">
-                <a:latin typeface="メイリオ"/>
-                <a:ea typeface="メイリオ"/>
-                <a:cs typeface="メイリオ"/>
-              </a:rPr>
-              <a:t>：</a:t>
+              <a:t>種類：</a:t>
             </a:r>
             <a:endParaRPr kumimoji="1" lang="ja-JP" altLang="en-US" sz="1000" dirty="0">
               <a:latin typeface="メイリオ"/>
@@ -12722,7 +13089,367 @@
       </p:sp>
       <p:sp>
         <p:nvSpPr>
-          <p:cNvPr id="199" name="正方形/長方形 198"/>
+          <p:cNvPr id="214" name="二等辺三角形 213"/>
+          <p:cNvSpPr/>
+          <p:nvPr/>
+        </p:nvSpPr>
+        <p:spPr>
+          <a:xfrm>
+            <a:off x="2516950" y="2487417"/>
+            <a:ext cx="144000" cy="144000"/>
+          </a:xfrm>
+          <a:prstGeom prst="triangle">
+            <a:avLst/>
+          </a:prstGeom>
+          <a:solidFill>
+            <a:schemeClr val="bg1"/>
+          </a:solidFill>
+          <a:ln>
+            <a:noFill/>
+          </a:ln>
+          <a:effectLst/>
+        </p:spPr>
+        <p:style>
+          <a:lnRef idx="1">
+            <a:schemeClr val="accent1"/>
+          </a:lnRef>
+          <a:fillRef idx="3">
+            <a:schemeClr val="accent1"/>
+          </a:fillRef>
+          <a:effectRef idx="2">
+            <a:schemeClr val="accent1"/>
+          </a:effectRef>
+          <a:fontRef idx="minor">
+            <a:schemeClr val="lt1"/>
+          </a:fontRef>
+        </p:style>
+        <p:txBody>
+          <a:bodyPr rtlCol="0" anchor="ctr"/>
+          <a:lstStyle/>
+          <a:p>
+            <a:pPr algn="ctr"/>
+            <a:endParaRPr kumimoji="1" lang="ja-JP" altLang="en-US"/>
+          </a:p>
+        </p:txBody>
+      </p:sp>
+      <p:sp>
+        <p:nvSpPr>
+          <p:cNvPr id="215" name="二等辺三角形 214"/>
+          <p:cNvSpPr/>
+          <p:nvPr/>
+        </p:nvSpPr>
+        <p:spPr>
+          <a:xfrm rot="10800000">
+            <a:off x="2516951" y="2642657"/>
+            <a:ext cx="144000" cy="144000"/>
+          </a:xfrm>
+          <a:prstGeom prst="triangle">
+            <a:avLst/>
+          </a:prstGeom>
+          <a:solidFill>
+            <a:schemeClr val="bg1"/>
+          </a:solidFill>
+          <a:ln>
+            <a:noFill/>
+          </a:ln>
+          <a:effectLst/>
+        </p:spPr>
+        <p:style>
+          <a:lnRef idx="1">
+            <a:schemeClr val="accent1"/>
+          </a:lnRef>
+          <a:fillRef idx="3">
+            <a:schemeClr val="accent1"/>
+          </a:fillRef>
+          <a:effectRef idx="2">
+            <a:schemeClr val="accent1"/>
+          </a:effectRef>
+          <a:fontRef idx="minor">
+            <a:schemeClr val="lt1"/>
+          </a:fontRef>
+        </p:style>
+        <p:txBody>
+          <a:bodyPr rtlCol="0" anchor="ctr"/>
+          <a:lstStyle/>
+          <a:p>
+            <a:pPr algn="ctr"/>
+            <a:endParaRPr kumimoji="1" lang="ja-JP" altLang="en-US"/>
+          </a:p>
+        </p:txBody>
+      </p:sp>
+      <p:sp>
+        <p:nvSpPr>
+          <p:cNvPr id="216" name="二等辺三角形 215"/>
+          <p:cNvSpPr/>
+          <p:nvPr/>
+        </p:nvSpPr>
+        <p:spPr>
+          <a:xfrm>
+            <a:off x="4227925" y="2489732"/>
+            <a:ext cx="144000" cy="144000"/>
+          </a:xfrm>
+          <a:prstGeom prst="triangle">
+            <a:avLst/>
+          </a:prstGeom>
+          <a:solidFill>
+            <a:schemeClr val="bg1"/>
+          </a:solidFill>
+          <a:ln>
+            <a:noFill/>
+          </a:ln>
+          <a:effectLst/>
+        </p:spPr>
+        <p:style>
+          <a:lnRef idx="1">
+            <a:schemeClr val="accent1"/>
+          </a:lnRef>
+          <a:fillRef idx="3">
+            <a:schemeClr val="accent1"/>
+          </a:fillRef>
+          <a:effectRef idx="2">
+            <a:schemeClr val="accent1"/>
+          </a:effectRef>
+          <a:fontRef idx="minor">
+            <a:schemeClr val="lt1"/>
+          </a:fontRef>
+        </p:style>
+        <p:txBody>
+          <a:bodyPr rtlCol="0" anchor="ctr"/>
+          <a:lstStyle/>
+          <a:p>
+            <a:pPr algn="ctr"/>
+            <a:endParaRPr kumimoji="1" lang="ja-JP" altLang="en-US"/>
+          </a:p>
+        </p:txBody>
+      </p:sp>
+      <p:sp>
+        <p:nvSpPr>
+          <p:cNvPr id="217" name="二等辺三角形 216"/>
+          <p:cNvSpPr/>
+          <p:nvPr/>
+        </p:nvSpPr>
+        <p:spPr>
+          <a:xfrm rot="10800000">
+            <a:off x="4227926" y="2644972"/>
+            <a:ext cx="144000" cy="144000"/>
+          </a:xfrm>
+          <a:prstGeom prst="triangle">
+            <a:avLst/>
+          </a:prstGeom>
+          <a:solidFill>
+            <a:schemeClr val="bg1"/>
+          </a:solidFill>
+          <a:ln>
+            <a:noFill/>
+          </a:ln>
+          <a:effectLst/>
+        </p:spPr>
+        <p:style>
+          <a:lnRef idx="1">
+            <a:schemeClr val="accent1"/>
+          </a:lnRef>
+          <a:fillRef idx="3">
+            <a:schemeClr val="accent1"/>
+          </a:fillRef>
+          <a:effectRef idx="2">
+            <a:schemeClr val="accent1"/>
+          </a:effectRef>
+          <a:fontRef idx="minor">
+            <a:schemeClr val="lt1"/>
+          </a:fontRef>
+        </p:style>
+        <p:txBody>
+          <a:bodyPr rtlCol="0" anchor="ctr"/>
+          <a:lstStyle/>
+          <a:p>
+            <a:pPr algn="ctr"/>
+            <a:endParaRPr kumimoji="1" lang="ja-JP" altLang="en-US"/>
+          </a:p>
+        </p:txBody>
+      </p:sp>
+      <p:sp>
+        <p:nvSpPr>
+          <p:cNvPr id="218" name="二等辺三角形 217"/>
+          <p:cNvSpPr/>
+          <p:nvPr/>
+        </p:nvSpPr>
+        <p:spPr>
+          <a:xfrm>
+            <a:off x="5950445" y="2492047"/>
+            <a:ext cx="144000" cy="144000"/>
+          </a:xfrm>
+          <a:prstGeom prst="triangle">
+            <a:avLst/>
+          </a:prstGeom>
+          <a:solidFill>
+            <a:schemeClr val="bg1"/>
+          </a:solidFill>
+          <a:ln>
+            <a:noFill/>
+          </a:ln>
+          <a:effectLst/>
+        </p:spPr>
+        <p:style>
+          <a:lnRef idx="1">
+            <a:schemeClr val="accent1"/>
+          </a:lnRef>
+          <a:fillRef idx="3">
+            <a:schemeClr val="accent1"/>
+          </a:fillRef>
+          <a:effectRef idx="2">
+            <a:schemeClr val="accent1"/>
+          </a:effectRef>
+          <a:fontRef idx="minor">
+            <a:schemeClr val="lt1"/>
+          </a:fontRef>
+        </p:style>
+        <p:txBody>
+          <a:bodyPr rtlCol="0" anchor="ctr"/>
+          <a:lstStyle/>
+          <a:p>
+            <a:pPr algn="ctr"/>
+            <a:endParaRPr kumimoji="1" lang="ja-JP" altLang="en-US"/>
+          </a:p>
+        </p:txBody>
+      </p:sp>
+      <p:sp>
+        <p:nvSpPr>
+          <p:cNvPr id="219" name="二等辺三角形 218"/>
+          <p:cNvSpPr/>
+          <p:nvPr/>
+        </p:nvSpPr>
+        <p:spPr>
+          <a:xfrm rot="10800000">
+            <a:off x="5950446" y="2647287"/>
+            <a:ext cx="144000" cy="144000"/>
+          </a:xfrm>
+          <a:prstGeom prst="triangle">
+            <a:avLst/>
+          </a:prstGeom>
+          <a:solidFill>
+            <a:schemeClr val="bg1"/>
+          </a:solidFill>
+          <a:ln>
+            <a:noFill/>
+          </a:ln>
+          <a:effectLst/>
+        </p:spPr>
+        <p:style>
+          <a:lnRef idx="1">
+            <a:schemeClr val="accent1"/>
+          </a:lnRef>
+          <a:fillRef idx="3">
+            <a:schemeClr val="accent1"/>
+          </a:fillRef>
+          <a:effectRef idx="2">
+            <a:schemeClr val="accent1"/>
+          </a:effectRef>
+          <a:fontRef idx="minor">
+            <a:schemeClr val="lt1"/>
+          </a:fontRef>
+        </p:style>
+        <p:txBody>
+          <a:bodyPr rtlCol="0" anchor="ctr"/>
+          <a:lstStyle/>
+          <a:p>
+            <a:pPr algn="ctr"/>
+            <a:endParaRPr kumimoji="1" lang="ja-JP" altLang="en-US"/>
+          </a:p>
+        </p:txBody>
+      </p:sp>
+      <p:sp>
+        <p:nvSpPr>
+          <p:cNvPr id="220" name="二等辺三角形 219"/>
+          <p:cNvSpPr/>
+          <p:nvPr/>
+        </p:nvSpPr>
+        <p:spPr>
+          <a:xfrm>
+            <a:off x="7672965" y="2494362"/>
+            <a:ext cx="144000" cy="144000"/>
+          </a:xfrm>
+          <a:prstGeom prst="triangle">
+            <a:avLst/>
+          </a:prstGeom>
+          <a:solidFill>
+            <a:schemeClr val="bg1"/>
+          </a:solidFill>
+          <a:ln>
+            <a:noFill/>
+          </a:ln>
+          <a:effectLst/>
+        </p:spPr>
+        <p:style>
+          <a:lnRef idx="1">
+            <a:schemeClr val="accent1"/>
+          </a:lnRef>
+          <a:fillRef idx="3">
+            <a:schemeClr val="accent1"/>
+          </a:fillRef>
+          <a:effectRef idx="2">
+            <a:schemeClr val="accent1"/>
+          </a:effectRef>
+          <a:fontRef idx="minor">
+            <a:schemeClr val="lt1"/>
+          </a:fontRef>
+        </p:style>
+        <p:txBody>
+          <a:bodyPr rtlCol="0" anchor="ctr"/>
+          <a:lstStyle/>
+          <a:p>
+            <a:pPr algn="ctr"/>
+            <a:endParaRPr kumimoji="1" lang="ja-JP" altLang="en-US"/>
+          </a:p>
+        </p:txBody>
+      </p:sp>
+      <p:sp>
+        <p:nvSpPr>
+          <p:cNvPr id="221" name="二等辺三角形 220"/>
+          <p:cNvSpPr/>
+          <p:nvPr/>
+        </p:nvSpPr>
+        <p:spPr>
+          <a:xfrm rot="10800000">
+            <a:off x="7672966" y="2649602"/>
+            <a:ext cx="144000" cy="144000"/>
+          </a:xfrm>
+          <a:prstGeom prst="triangle">
+            <a:avLst/>
+          </a:prstGeom>
+          <a:solidFill>
+            <a:schemeClr val="bg1"/>
+          </a:solidFill>
+          <a:ln>
+            <a:noFill/>
+          </a:ln>
+          <a:effectLst/>
+        </p:spPr>
+        <p:style>
+          <a:lnRef idx="1">
+            <a:schemeClr val="accent1"/>
+          </a:lnRef>
+          <a:fillRef idx="3">
+            <a:schemeClr val="accent1"/>
+          </a:fillRef>
+          <a:effectRef idx="2">
+            <a:schemeClr val="accent1"/>
+          </a:effectRef>
+          <a:fontRef idx="minor">
+            <a:schemeClr val="lt1"/>
+          </a:fontRef>
+        </p:style>
+        <p:txBody>
+          <a:bodyPr rtlCol="0" anchor="ctr"/>
+          <a:lstStyle/>
+          <a:p>
+            <a:pPr algn="ctr"/>
+            <a:endParaRPr kumimoji="1" lang="ja-JP" altLang="en-US"/>
+          </a:p>
+        </p:txBody>
+      </p:sp>
+      <p:sp>
+        <p:nvSpPr>
+          <p:cNvPr id="222" name="正方形/長方形 221"/>
           <p:cNvSpPr/>
           <p:nvPr/>
         </p:nvSpPr>
@@ -12848,7 +13575,7 @@
     </p:spTree>
     <p:extLst>
       <p:ext uri="{BB962C8B-B14F-4D97-AF65-F5344CB8AC3E}">
-        <p14:creationId xmlns:p14="http://schemas.microsoft.com/office/powerpoint/2010/main" val="3124408554"/>
+        <p14:creationId xmlns:p14="http://schemas.microsoft.com/office/powerpoint/2010/main" val="317780623"/>
       </p:ext>
     </p:extLst>
   </p:cSld>
@@ -12877,14 +13604,14 @@
       </p:grpSpPr>
       <p:graphicFrame>
         <p:nvGraphicFramePr>
-          <p:cNvPr id="102" name="表 101"/>
+          <p:cNvPr id="80" name="表 79"/>
           <p:cNvGraphicFramePr>
             <a:graphicFrameLocks noGrp="1"/>
           </p:cNvGraphicFramePr>
           <p:nvPr>
             <p:extLst>
               <p:ext uri="{D42A27DB-BD31-4B8C-83A1-F6EECF244321}">
-                <p14:modId xmlns:p14="http://schemas.microsoft.com/office/powerpoint/2010/main" val="171597873"/>
+                <p14:modId xmlns:p14="http://schemas.microsoft.com/office/powerpoint/2010/main" val="1358158467"/>
               </p:ext>
             </p:extLst>
           </p:nvPr>
@@ -13379,7 +14106,7 @@
       </p:graphicFrame>
       <p:sp>
         <p:nvSpPr>
-          <p:cNvPr id="103" name="正方形/長方形 102"/>
+          <p:cNvPr id="81" name="正方形/長方形 80"/>
           <p:cNvSpPr/>
           <p:nvPr/>
         </p:nvSpPr>
@@ -13431,7 +14158,7 @@
       </p:sp>
       <p:sp>
         <p:nvSpPr>
-          <p:cNvPr id="104" name="角丸四角形 103"/>
+          <p:cNvPr id="82" name="角丸四角形 81"/>
           <p:cNvSpPr/>
           <p:nvPr/>
         </p:nvSpPr>
@@ -13476,7 +14203,7 @@
       </p:sp>
       <p:sp>
         <p:nvSpPr>
-          <p:cNvPr id="105" name="テキスト ボックス 104"/>
+          <p:cNvPr id="83" name="テキスト ボックス 82"/>
           <p:cNvSpPr txBox="1"/>
           <p:nvPr/>
         </p:nvSpPr>
@@ -13514,7 +14241,7 @@
       </p:sp>
       <p:sp>
         <p:nvSpPr>
-          <p:cNvPr id="106" name="角丸四角形 105"/>
+          <p:cNvPr id="84" name="角丸四角形 83"/>
           <p:cNvSpPr/>
           <p:nvPr/>
         </p:nvSpPr>
@@ -13559,7 +14286,7 @@
       </p:sp>
       <p:sp>
         <p:nvSpPr>
-          <p:cNvPr id="107" name="テキスト ボックス 106"/>
+          <p:cNvPr id="85" name="テキスト ボックス 84"/>
           <p:cNvSpPr txBox="1"/>
           <p:nvPr/>
         </p:nvSpPr>
@@ -13605,7 +14332,7 @@
       </p:sp>
       <p:sp>
         <p:nvSpPr>
-          <p:cNvPr id="108" name="角丸四角形 107"/>
+          <p:cNvPr id="86" name="角丸四角形 85"/>
           <p:cNvSpPr/>
           <p:nvPr/>
         </p:nvSpPr>
@@ -13650,7 +14377,7 @@
       </p:sp>
       <p:sp>
         <p:nvSpPr>
-          <p:cNvPr id="109" name="テキスト ボックス 108"/>
+          <p:cNvPr id="87" name="テキスト ボックス 86"/>
           <p:cNvSpPr txBox="1"/>
           <p:nvPr/>
         </p:nvSpPr>
@@ -13696,7 +14423,7 @@
       </p:sp>
       <p:sp>
         <p:nvSpPr>
-          <p:cNvPr id="110" name="角丸四角形 109"/>
+          <p:cNvPr id="88" name="角丸四角形 87"/>
           <p:cNvSpPr/>
           <p:nvPr/>
         </p:nvSpPr>
@@ -13741,7 +14468,7 @@
       </p:sp>
       <p:sp>
         <p:nvSpPr>
-          <p:cNvPr id="111" name="テキスト ボックス 110"/>
+          <p:cNvPr id="89" name="テキスト ボックス 88"/>
           <p:cNvSpPr txBox="1"/>
           <p:nvPr/>
         </p:nvSpPr>
@@ -13787,7 +14514,7 @@
       </p:sp>
       <p:sp>
         <p:nvSpPr>
-          <p:cNvPr id="112" name="角丸四角形 111"/>
+          <p:cNvPr id="90" name="角丸四角形 89"/>
           <p:cNvSpPr/>
           <p:nvPr/>
         </p:nvSpPr>
@@ -13850,7 +14577,7 @@
       </p:sp>
       <p:cxnSp>
         <p:nvCxnSpPr>
-          <p:cNvPr id="113" name="直線コネクタ 112"/>
+          <p:cNvPr id="91" name="直線コネクタ 90"/>
           <p:cNvCxnSpPr/>
           <p:nvPr/>
         </p:nvCxnSpPr>
@@ -13888,7 +14615,7 @@
       </p:cxnSp>
       <p:sp>
         <p:nvSpPr>
-          <p:cNvPr id="114" name="テキスト ボックス 113"/>
+          <p:cNvPr id="92" name="テキスト ボックス 91"/>
           <p:cNvSpPr txBox="1"/>
           <p:nvPr/>
         </p:nvSpPr>
@@ -13926,7 +14653,7 @@
       </p:sp>
       <p:sp>
         <p:nvSpPr>
-          <p:cNvPr id="115" name="テキスト ボックス 114"/>
+          <p:cNvPr id="93" name="テキスト ボックス 92"/>
           <p:cNvSpPr txBox="1"/>
           <p:nvPr/>
         </p:nvSpPr>
@@ -13964,7 +14691,7 @@
       </p:sp>
       <p:sp>
         <p:nvSpPr>
-          <p:cNvPr id="116" name="テキスト ボックス 115"/>
+          <p:cNvPr id="94" name="テキスト ボックス 93"/>
           <p:cNvSpPr txBox="1"/>
           <p:nvPr/>
         </p:nvSpPr>
@@ -14002,7 +14729,7 @@
       </p:sp>
       <p:sp>
         <p:nvSpPr>
-          <p:cNvPr id="117" name="二等辺三角形 116"/>
+          <p:cNvPr id="95" name="二等辺三角形 94"/>
           <p:cNvSpPr/>
           <p:nvPr/>
         </p:nvSpPr>
@@ -14047,7 +14774,7 @@
       </p:sp>
       <p:sp>
         <p:nvSpPr>
-          <p:cNvPr id="118" name="二等辺三角形 117"/>
+          <p:cNvPr id="96" name="二等辺三角形 95"/>
           <p:cNvSpPr/>
           <p:nvPr/>
         </p:nvSpPr>
@@ -14092,7 +14819,7 @@
       </p:sp>
       <p:sp>
         <p:nvSpPr>
-          <p:cNvPr id="119" name="テキスト ボックス 118"/>
+          <p:cNvPr id="97" name="テキスト ボックス 96"/>
           <p:cNvSpPr txBox="1"/>
           <p:nvPr/>
         </p:nvSpPr>
@@ -14130,7 +14857,7 @@
       </p:sp>
       <p:sp>
         <p:nvSpPr>
-          <p:cNvPr id="120" name="テキスト ボックス 119"/>
+          <p:cNvPr id="98" name="テキスト ボックス 97"/>
           <p:cNvSpPr txBox="1"/>
           <p:nvPr/>
         </p:nvSpPr>
@@ -14224,7 +14951,7 @@
       </p:sp>
       <p:sp>
         <p:nvSpPr>
-          <p:cNvPr id="121" name="二等辺三角形 120"/>
+          <p:cNvPr id="99" name="二等辺三角形 98"/>
           <p:cNvSpPr/>
           <p:nvPr/>
         </p:nvSpPr>
@@ -14269,7 +14996,7 @@
       </p:sp>
       <p:sp>
         <p:nvSpPr>
-          <p:cNvPr id="122" name="二等辺三角形 121"/>
+          <p:cNvPr id="100" name="二等辺三角形 99"/>
           <p:cNvSpPr/>
           <p:nvPr/>
         </p:nvSpPr>
@@ -14314,7 +15041,7 @@
       </p:sp>
       <p:sp>
         <p:nvSpPr>
-          <p:cNvPr id="123" name="二等辺三角形 122"/>
+          <p:cNvPr id="101" name="二等辺三角形 100"/>
           <p:cNvSpPr/>
           <p:nvPr/>
         </p:nvSpPr>
@@ -14359,7 +15086,7 @@
       </p:sp>
       <p:sp>
         <p:nvSpPr>
-          <p:cNvPr id="124" name="二等辺三角形 123"/>
+          <p:cNvPr id="140" name="二等辺三角形 139"/>
           <p:cNvSpPr/>
           <p:nvPr/>
         </p:nvSpPr>
@@ -14404,7 +15131,7 @@
       </p:sp>
       <p:sp>
         <p:nvSpPr>
-          <p:cNvPr id="125" name="角丸四角形 124"/>
+          <p:cNvPr id="141" name="角丸四角形 140"/>
           <p:cNvSpPr/>
           <p:nvPr/>
         </p:nvSpPr>
@@ -14467,7 +15194,7 @@
       </p:sp>
       <p:pic>
         <p:nvPicPr>
-          <p:cNvPr id="126" name="図 125" descr="trash.png"/>
+          <p:cNvPr id="142" name="図 141" descr="trash.png"/>
           <p:cNvPicPr>
             <a:picLocks noChangeAspect="1"/>
           </p:cNvPicPr>
@@ -14497,7 +15224,7 @@
       </p:pic>
       <p:pic>
         <p:nvPicPr>
-          <p:cNvPr id="127" name="図 126" descr="trash.png"/>
+          <p:cNvPr id="143" name="図 142" descr="trash.png"/>
           <p:cNvPicPr>
             <a:picLocks noChangeAspect="1"/>
           </p:cNvPicPr>
@@ -14527,7 +15254,7 @@
       </p:pic>
       <p:pic>
         <p:nvPicPr>
-          <p:cNvPr id="128" name="図 127" descr="trash.png"/>
+          <p:cNvPr id="144" name="図 143" descr="trash.png"/>
           <p:cNvPicPr>
             <a:picLocks noChangeAspect="1"/>
           </p:cNvPicPr>
@@ -14557,7 +15284,7 @@
       </p:pic>
       <p:pic>
         <p:nvPicPr>
-          <p:cNvPr id="129" name="図 128" descr="trash.png"/>
+          <p:cNvPr id="145" name="図 144" descr="trash.png"/>
           <p:cNvPicPr>
             <a:picLocks noChangeAspect="1"/>
           </p:cNvPicPr>
@@ -14587,7 +15314,7 @@
       </p:pic>
       <p:pic>
         <p:nvPicPr>
-          <p:cNvPr id="130" name="図 129" descr="trash.png"/>
+          <p:cNvPr id="146" name="図 145" descr="trash.png"/>
           <p:cNvPicPr>
             <a:picLocks noChangeAspect="1"/>
           </p:cNvPicPr>
@@ -14617,7 +15344,7 @@
       </p:pic>
       <p:pic>
         <p:nvPicPr>
-          <p:cNvPr id="131" name="図 130" descr="trash.png"/>
+          <p:cNvPr id="147" name="図 146" descr="trash.png"/>
           <p:cNvPicPr>
             <a:picLocks noChangeAspect="1"/>
           </p:cNvPicPr>
@@ -14647,7 +15374,7 @@
       </p:pic>
       <p:pic>
         <p:nvPicPr>
-          <p:cNvPr id="132" name="図 131" descr="trash.png"/>
+          <p:cNvPr id="148" name="図 147" descr="trash.png"/>
           <p:cNvPicPr>
             <a:picLocks noChangeAspect="1"/>
           </p:cNvPicPr>
@@ -14677,7 +15404,7 @@
       </p:pic>
       <p:pic>
         <p:nvPicPr>
-          <p:cNvPr id="133" name="図 132" descr="trash.png"/>
+          <p:cNvPr id="149" name="図 148" descr="trash.png"/>
           <p:cNvPicPr>
             <a:picLocks noChangeAspect="1"/>
           </p:cNvPicPr>
@@ -14707,7 +15434,7 @@
       </p:pic>
       <p:pic>
         <p:nvPicPr>
-          <p:cNvPr id="134" name="図 133" descr="trash.png"/>
+          <p:cNvPr id="150" name="図 149" descr="trash.png"/>
           <p:cNvPicPr>
             <a:picLocks noChangeAspect="1"/>
           </p:cNvPicPr>
@@ -14737,7 +15464,7 @@
       </p:pic>
       <p:pic>
         <p:nvPicPr>
-          <p:cNvPr id="135" name="図 134" descr="trash.png"/>
+          <p:cNvPr id="151" name="図 150" descr="trash.png"/>
           <p:cNvPicPr>
             <a:picLocks noChangeAspect="1"/>
           </p:cNvPicPr>
@@ -14767,7 +15494,7 @@
       </p:pic>
       <p:grpSp>
         <p:nvGrpSpPr>
-          <p:cNvPr id="136" name="図形グループ 135"/>
+          <p:cNvPr id="152" name="図形グループ 151"/>
           <p:cNvGrpSpPr/>
           <p:nvPr/>
         </p:nvGrpSpPr>
@@ -14781,7 +15508,7 @@
         </p:grpSpPr>
         <p:sp>
           <p:nvSpPr>
-            <p:cNvPr id="137" name="角丸四角形 136"/>
+            <p:cNvPr id="153" name="角丸四角形 152"/>
             <p:cNvSpPr/>
             <p:nvPr/>
           </p:nvSpPr>
@@ -14830,7 +15557,7 @@
         </p:sp>
         <p:cxnSp>
           <p:nvCxnSpPr>
-            <p:cNvPr id="138" name="直線コネクタ 137"/>
+            <p:cNvPr id="154" name="直線コネクタ 153"/>
             <p:cNvCxnSpPr/>
             <p:nvPr/>
           </p:nvCxnSpPr>
@@ -14865,7 +15592,7 @@
         </p:cxnSp>
         <p:cxnSp>
           <p:nvCxnSpPr>
-            <p:cNvPr id="139" name="直線コネクタ 138"/>
+            <p:cNvPr id="155" name="直線コネクタ 154"/>
             <p:cNvCxnSpPr/>
             <p:nvPr/>
           </p:nvCxnSpPr>
@@ -14900,7 +15627,7 @@
         </p:cxnSp>
         <p:cxnSp>
           <p:nvCxnSpPr>
-            <p:cNvPr id="195" name="直線コネクタ 194"/>
+            <p:cNvPr id="156" name="直線コネクタ 155"/>
             <p:cNvCxnSpPr/>
             <p:nvPr/>
           </p:nvCxnSpPr>
@@ -14936,7 +15663,7 @@
       </p:grpSp>
       <p:cxnSp>
         <p:nvCxnSpPr>
-          <p:cNvPr id="196" name="直線コネクタ 195"/>
+          <p:cNvPr id="157" name="直線コネクタ 156"/>
           <p:cNvCxnSpPr/>
           <p:nvPr/>
         </p:nvCxnSpPr>
@@ -14974,7 +15701,7 @@
       </p:cxnSp>
       <p:sp>
         <p:nvSpPr>
-          <p:cNvPr id="197" name="テキスト ボックス 196"/>
+          <p:cNvPr id="158" name="テキスト ボックス 157"/>
           <p:cNvSpPr txBox="1"/>
           <p:nvPr/>
         </p:nvSpPr>
@@ -15012,7 +15739,7 @@
       </p:sp>
       <p:sp>
         <p:nvSpPr>
-          <p:cNvPr id="198" name="角丸四角形 197"/>
+          <p:cNvPr id="159" name="角丸四角形 158"/>
           <p:cNvSpPr/>
           <p:nvPr/>
         </p:nvSpPr>
@@ -15057,7 +15784,7 @@
       </p:sp>
       <p:sp>
         <p:nvSpPr>
-          <p:cNvPr id="199" name="テキスト ボックス 198"/>
+          <p:cNvPr id="160" name="テキスト ボックス 159"/>
           <p:cNvSpPr txBox="1"/>
           <p:nvPr/>
         </p:nvSpPr>
@@ -15095,7 +15822,7 @@
       </p:sp>
       <p:sp>
         <p:nvSpPr>
-          <p:cNvPr id="200" name="テキスト ボックス 199"/>
+          <p:cNvPr id="161" name="テキスト ボックス 160"/>
           <p:cNvSpPr txBox="1"/>
           <p:nvPr/>
         </p:nvSpPr>
@@ -15141,7 +15868,7 @@
       </p:sp>
       <p:sp>
         <p:nvSpPr>
-          <p:cNvPr id="201" name="角丸四角形 200"/>
+          <p:cNvPr id="162" name="角丸四角形 161"/>
           <p:cNvSpPr/>
           <p:nvPr/>
         </p:nvSpPr>
@@ -15186,7 +15913,7 @@
       </p:sp>
       <p:grpSp>
         <p:nvGrpSpPr>
-          <p:cNvPr id="202" name="図形グループ 201"/>
+          <p:cNvPr id="163" name="図形グループ 162"/>
           <p:cNvGrpSpPr/>
           <p:nvPr/>
         </p:nvGrpSpPr>
@@ -15200,7 +15927,7 @@
         </p:grpSpPr>
         <p:sp>
           <p:nvSpPr>
-            <p:cNvPr id="203" name="角丸四角形 202"/>
+            <p:cNvPr id="164" name="角丸四角形 163"/>
             <p:cNvSpPr/>
             <p:nvPr/>
           </p:nvSpPr>
@@ -15262,7 +15989,7 @@
         </p:sp>
         <p:sp>
           <p:nvSpPr>
-            <p:cNvPr id="204" name="二等辺三角形 203"/>
+            <p:cNvPr id="165" name="二等辺三角形 164"/>
             <p:cNvSpPr/>
             <p:nvPr/>
           </p:nvSpPr>
@@ -15308,7 +16035,7 @@
       </p:grpSp>
       <p:sp>
         <p:nvSpPr>
-          <p:cNvPr id="205" name="テキスト ボックス 204"/>
+          <p:cNvPr id="166" name="テキスト ボックス 165"/>
           <p:cNvSpPr txBox="1"/>
           <p:nvPr/>
         </p:nvSpPr>
@@ -15354,7 +16081,7 @@
       </p:sp>
       <p:sp>
         <p:nvSpPr>
-          <p:cNvPr id="206" name="角丸四角形 205"/>
+          <p:cNvPr id="167" name="角丸四角形 166"/>
           <p:cNvSpPr/>
           <p:nvPr/>
         </p:nvSpPr>
@@ -15399,7 +16126,7 @@
       </p:sp>
       <p:sp>
         <p:nvSpPr>
-          <p:cNvPr id="207" name="テキスト ボックス 206"/>
+          <p:cNvPr id="168" name="テキスト ボックス 167"/>
           <p:cNvSpPr txBox="1"/>
           <p:nvPr/>
         </p:nvSpPr>
@@ -15445,7 +16172,7 @@
       </p:sp>
       <p:sp>
         <p:nvSpPr>
-          <p:cNvPr id="208" name="角丸四角形 207"/>
+          <p:cNvPr id="169" name="角丸四角形 168"/>
           <p:cNvSpPr/>
           <p:nvPr/>
         </p:nvSpPr>
@@ -15490,7 +16217,7 @@
       </p:sp>
       <p:sp>
         <p:nvSpPr>
-          <p:cNvPr id="209" name="角丸四角形 208"/>
+          <p:cNvPr id="170" name="角丸四角形 169"/>
           <p:cNvSpPr/>
           <p:nvPr/>
         </p:nvSpPr>
@@ -15535,7 +16262,7 @@
       </p:sp>
       <p:sp>
         <p:nvSpPr>
-          <p:cNvPr id="210" name="テキスト ボックス 209"/>
+          <p:cNvPr id="171" name="テキスト ボックス 170"/>
           <p:cNvSpPr txBox="1"/>
           <p:nvPr/>
         </p:nvSpPr>
@@ -15573,7 +16300,7 @@
       </p:sp>
       <p:sp>
         <p:nvSpPr>
-          <p:cNvPr id="211" name="角丸四角形 210"/>
+          <p:cNvPr id="172" name="角丸四角形 171"/>
           <p:cNvSpPr/>
           <p:nvPr/>
         </p:nvSpPr>
@@ -15618,7 +16345,7 @@
       </p:sp>
       <p:sp>
         <p:nvSpPr>
-          <p:cNvPr id="212" name="角丸四角形 211"/>
+          <p:cNvPr id="173" name="角丸四角形 172"/>
           <p:cNvSpPr/>
           <p:nvPr/>
         </p:nvSpPr>
@@ -15681,7 +16408,7 @@
       </p:sp>
       <p:grpSp>
         <p:nvGrpSpPr>
-          <p:cNvPr id="213" name="図形グループ 212"/>
+          <p:cNvPr id="174" name="図形グループ 173"/>
           <p:cNvGrpSpPr/>
           <p:nvPr/>
         </p:nvGrpSpPr>
@@ -15695,7 +16422,7 @@
         </p:grpSpPr>
         <p:sp>
           <p:nvSpPr>
-            <p:cNvPr id="214" name="角丸四角形 213"/>
+            <p:cNvPr id="175" name="角丸四角形 174"/>
             <p:cNvSpPr/>
             <p:nvPr/>
           </p:nvSpPr>
@@ -15744,7 +16471,7 @@
         </p:sp>
         <p:cxnSp>
           <p:nvCxnSpPr>
-            <p:cNvPr id="215" name="直線コネクタ 214"/>
+            <p:cNvPr id="176" name="直線コネクタ 175"/>
             <p:cNvCxnSpPr/>
             <p:nvPr/>
           </p:nvCxnSpPr>
@@ -15779,7 +16506,7 @@
         </p:cxnSp>
         <p:cxnSp>
           <p:nvCxnSpPr>
-            <p:cNvPr id="216" name="直線コネクタ 215"/>
+            <p:cNvPr id="177" name="直線コネクタ 176"/>
             <p:cNvCxnSpPr/>
             <p:nvPr/>
           </p:nvCxnSpPr>
@@ -15814,7 +16541,7 @@
         </p:cxnSp>
         <p:cxnSp>
           <p:nvCxnSpPr>
-            <p:cNvPr id="217" name="直線コネクタ 216"/>
+            <p:cNvPr id="178" name="直線コネクタ 177"/>
             <p:cNvCxnSpPr/>
             <p:nvPr/>
           </p:nvCxnSpPr>
@@ -15850,7 +16577,7 @@
       </p:grpSp>
       <p:sp>
         <p:nvSpPr>
-          <p:cNvPr id="218" name="テキスト ボックス 217"/>
+          <p:cNvPr id="179" name="テキスト ボックス 178"/>
           <p:cNvSpPr txBox="1"/>
           <p:nvPr/>
         </p:nvSpPr>
@@ -15888,7 +16615,7 @@
       </p:sp>
       <p:sp>
         <p:nvSpPr>
-          <p:cNvPr id="219" name="テキスト ボックス 218"/>
+          <p:cNvPr id="180" name="テキスト ボックス 179"/>
           <p:cNvSpPr txBox="1"/>
           <p:nvPr/>
         </p:nvSpPr>
@@ -15926,7 +16653,7 @@
       </p:sp>
       <p:sp>
         <p:nvSpPr>
-          <p:cNvPr id="220" name="円/楕円 219"/>
+          <p:cNvPr id="181" name="円/楕円 180"/>
           <p:cNvSpPr/>
           <p:nvPr/>
         </p:nvSpPr>
@@ -15971,7 +16698,7 @@
       </p:sp>
       <p:sp>
         <p:nvSpPr>
-          <p:cNvPr id="221" name="円/楕円 220"/>
+          <p:cNvPr id="182" name="円/楕円 181"/>
           <p:cNvSpPr/>
           <p:nvPr/>
         </p:nvSpPr>
@@ -16016,7 +16743,7 @@
       </p:sp>
       <p:grpSp>
         <p:nvGrpSpPr>
-          <p:cNvPr id="222" name="図形グループ 221"/>
+          <p:cNvPr id="183" name="図形グループ 182"/>
           <p:cNvGrpSpPr/>
           <p:nvPr/>
         </p:nvGrpSpPr>
@@ -16030,7 +16757,7 @@
         </p:grpSpPr>
         <p:sp>
           <p:nvSpPr>
-            <p:cNvPr id="223" name="角丸四角形 222"/>
+            <p:cNvPr id="184" name="角丸四角形 183"/>
             <p:cNvSpPr/>
             <p:nvPr/>
           </p:nvSpPr>
@@ -16081,7 +16808,7 @@
         </p:sp>
         <p:sp>
           <p:nvSpPr>
-            <p:cNvPr id="224" name="二等辺三角形 223"/>
+            <p:cNvPr id="185" name="二等辺三角形 184"/>
             <p:cNvSpPr/>
             <p:nvPr/>
           </p:nvSpPr>
@@ -16127,7 +16854,7 @@
       </p:grpSp>
       <p:sp>
         <p:nvSpPr>
-          <p:cNvPr id="225" name="テキスト ボックス 224"/>
+          <p:cNvPr id="186" name="テキスト ボックス 185"/>
           <p:cNvSpPr txBox="1"/>
           <p:nvPr/>
         </p:nvSpPr>
@@ -16153,15 +16880,7 @@
                 <a:ea typeface="メイリオ"/>
                 <a:cs typeface="メイリオ"/>
               </a:rPr>
-              <a:t>種類</a:t>
-            </a:r>
-            <a:r>
-              <a:rPr kumimoji="1" lang="ja-JP" altLang="en-US" sz="1000" dirty="0" smtClean="0">
-                <a:latin typeface="メイリオ"/>
-                <a:ea typeface="メイリオ"/>
-                <a:cs typeface="メイリオ"/>
-              </a:rPr>
-              <a:t>：</a:t>
+              <a:t>種類：</a:t>
             </a:r>
             <a:endParaRPr kumimoji="1" lang="ja-JP" altLang="en-US" sz="1000" dirty="0">
               <a:latin typeface="メイリオ"/>
@@ -16173,7 +16892,367 @@
       </p:sp>
       <p:sp>
         <p:nvSpPr>
-          <p:cNvPr id="226" name="正方形/長方形 225"/>
+          <p:cNvPr id="187" name="二等辺三角形 186"/>
+          <p:cNvSpPr/>
+          <p:nvPr/>
+        </p:nvSpPr>
+        <p:spPr>
+          <a:xfrm>
+            <a:off x="2516950" y="2487417"/>
+            <a:ext cx="144000" cy="144000"/>
+          </a:xfrm>
+          <a:prstGeom prst="triangle">
+            <a:avLst/>
+          </a:prstGeom>
+          <a:solidFill>
+            <a:schemeClr val="bg1"/>
+          </a:solidFill>
+          <a:ln>
+            <a:noFill/>
+          </a:ln>
+          <a:effectLst/>
+        </p:spPr>
+        <p:style>
+          <a:lnRef idx="1">
+            <a:schemeClr val="accent1"/>
+          </a:lnRef>
+          <a:fillRef idx="3">
+            <a:schemeClr val="accent1"/>
+          </a:fillRef>
+          <a:effectRef idx="2">
+            <a:schemeClr val="accent1"/>
+          </a:effectRef>
+          <a:fontRef idx="minor">
+            <a:schemeClr val="lt1"/>
+          </a:fontRef>
+        </p:style>
+        <p:txBody>
+          <a:bodyPr rtlCol="0" anchor="ctr"/>
+          <a:lstStyle/>
+          <a:p>
+            <a:pPr algn="ctr"/>
+            <a:endParaRPr kumimoji="1" lang="ja-JP" altLang="en-US"/>
+          </a:p>
+        </p:txBody>
+      </p:sp>
+      <p:sp>
+        <p:nvSpPr>
+          <p:cNvPr id="227" name="二等辺三角形 226"/>
+          <p:cNvSpPr/>
+          <p:nvPr/>
+        </p:nvSpPr>
+        <p:spPr>
+          <a:xfrm rot="10800000">
+            <a:off x="2516951" y="2642657"/>
+            <a:ext cx="144000" cy="144000"/>
+          </a:xfrm>
+          <a:prstGeom prst="triangle">
+            <a:avLst/>
+          </a:prstGeom>
+          <a:solidFill>
+            <a:schemeClr val="bg1"/>
+          </a:solidFill>
+          <a:ln>
+            <a:noFill/>
+          </a:ln>
+          <a:effectLst/>
+        </p:spPr>
+        <p:style>
+          <a:lnRef idx="1">
+            <a:schemeClr val="accent1"/>
+          </a:lnRef>
+          <a:fillRef idx="3">
+            <a:schemeClr val="accent1"/>
+          </a:fillRef>
+          <a:effectRef idx="2">
+            <a:schemeClr val="accent1"/>
+          </a:effectRef>
+          <a:fontRef idx="minor">
+            <a:schemeClr val="lt1"/>
+          </a:fontRef>
+        </p:style>
+        <p:txBody>
+          <a:bodyPr rtlCol="0" anchor="ctr"/>
+          <a:lstStyle/>
+          <a:p>
+            <a:pPr algn="ctr"/>
+            <a:endParaRPr kumimoji="1" lang="ja-JP" altLang="en-US"/>
+          </a:p>
+        </p:txBody>
+      </p:sp>
+      <p:sp>
+        <p:nvSpPr>
+          <p:cNvPr id="228" name="二等辺三角形 227"/>
+          <p:cNvSpPr/>
+          <p:nvPr/>
+        </p:nvSpPr>
+        <p:spPr>
+          <a:xfrm>
+            <a:off x="4227925" y="2489732"/>
+            <a:ext cx="144000" cy="144000"/>
+          </a:xfrm>
+          <a:prstGeom prst="triangle">
+            <a:avLst/>
+          </a:prstGeom>
+          <a:solidFill>
+            <a:schemeClr val="bg1"/>
+          </a:solidFill>
+          <a:ln>
+            <a:noFill/>
+          </a:ln>
+          <a:effectLst/>
+        </p:spPr>
+        <p:style>
+          <a:lnRef idx="1">
+            <a:schemeClr val="accent1"/>
+          </a:lnRef>
+          <a:fillRef idx="3">
+            <a:schemeClr val="accent1"/>
+          </a:fillRef>
+          <a:effectRef idx="2">
+            <a:schemeClr val="accent1"/>
+          </a:effectRef>
+          <a:fontRef idx="minor">
+            <a:schemeClr val="lt1"/>
+          </a:fontRef>
+        </p:style>
+        <p:txBody>
+          <a:bodyPr rtlCol="0" anchor="ctr"/>
+          <a:lstStyle/>
+          <a:p>
+            <a:pPr algn="ctr"/>
+            <a:endParaRPr kumimoji="1" lang="ja-JP" altLang="en-US"/>
+          </a:p>
+        </p:txBody>
+      </p:sp>
+      <p:sp>
+        <p:nvSpPr>
+          <p:cNvPr id="229" name="二等辺三角形 228"/>
+          <p:cNvSpPr/>
+          <p:nvPr/>
+        </p:nvSpPr>
+        <p:spPr>
+          <a:xfrm rot="10800000">
+            <a:off x="4227926" y="2644972"/>
+            <a:ext cx="144000" cy="144000"/>
+          </a:xfrm>
+          <a:prstGeom prst="triangle">
+            <a:avLst/>
+          </a:prstGeom>
+          <a:solidFill>
+            <a:schemeClr val="bg1"/>
+          </a:solidFill>
+          <a:ln>
+            <a:noFill/>
+          </a:ln>
+          <a:effectLst/>
+        </p:spPr>
+        <p:style>
+          <a:lnRef idx="1">
+            <a:schemeClr val="accent1"/>
+          </a:lnRef>
+          <a:fillRef idx="3">
+            <a:schemeClr val="accent1"/>
+          </a:fillRef>
+          <a:effectRef idx="2">
+            <a:schemeClr val="accent1"/>
+          </a:effectRef>
+          <a:fontRef idx="minor">
+            <a:schemeClr val="lt1"/>
+          </a:fontRef>
+        </p:style>
+        <p:txBody>
+          <a:bodyPr rtlCol="0" anchor="ctr"/>
+          <a:lstStyle/>
+          <a:p>
+            <a:pPr algn="ctr"/>
+            <a:endParaRPr kumimoji="1" lang="ja-JP" altLang="en-US"/>
+          </a:p>
+        </p:txBody>
+      </p:sp>
+      <p:sp>
+        <p:nvSpPr>
+          <p:cNvPr id="230" name="二等辺三角形 229"/>
+          <p:cNvSpPr/>
+          <p:nvPr/>
+        </p:nvSpPr>
+        <p:spPr>
+          <a:xfrm>
+            <a:off x="5950445" y="2492047"/>
+            <a:ext cx="144000" cy="144000"/>
+          </a:xfrm>
+          <a:prstGeom prst="triangle">
+            <a:avLst/>
+          </a:prstGeom>
+          <a:solidFill>
+            <a:schemeClr val="bg1"/>
+          </a:solidFill>
+          <a:ln>
+            <a:noFill/>
+          </a:ln>
+          <a:effectLst/>
+        </p:spPr>
+        <p:style>
+          <a:lnRef idx="1">
+            <a:schemeClr val="accent1"/>
+          </a:lnRef>
+          <a:fillRef idx="3">
+            <a:schemeClr val="accent1"/>
+          </a:fillRef>
+          <a:effectRef idx="2">
+            <a:schemeClr val="accent1"/>
+          </a:effectRef>
+          <a:fontRef idx="minor">
+            <a:schemeClr val="lt1"/>
+          </a:fontRef>
+        </p:style>
+        <p:txBody>
+          <a:bodyPr rtlCol="0" anchor="ctr"/>
+          <a:lstStyle/>
+          <a:p>
+            <a:pPr algn="ctr"/>
+            <a:endParaRPr kumimoji="1" lang="ja-JP" altLang="en-US"/>
+          </a:p>
+        </p:txBody>
+      </p:sp>
+      <p:sp>
+        <p:nvSpPr>
+          <p:cNvPr id="231" name="二等辺三角形 230"/>
+          <p:cNvSpPr/>
+          <p:nvPr/>
+        </p:nvSpPr>
+        <p:spPr>
+          <a:xfrm rot="10800000">
+            <a:off x="5950446" y="2647287"/>
+            <a:ext cx="144000" cy="144000"/>
+          </a:xfrm>
+          <a:prstGeom prst="triangle">
+            <a:avLst/>
+          </a:prstGeom>
+          <a:solidFill>
+            <a:schemeClr val="bg1"/>
+          </a:solidFill>
+          <a:ln>
+            <a:noFill/>
+          </a:ln>
+          <a:effectLst/>
+        </p:spPr>
+        <p:style>
+          <a:lnRef idx="1">
+            <a:schemeClr val="accent1"/>
+          </a:lnRef>
+          <a:fillRef idx="3">
+            <a:schemeClr val="accent1"/>
+          </a:fillRef>
+          <a:effectRef idx="2">
+            <a:schemeClr val="accent1"/>
+          </a:effectRef>
+          <a:fontRef idx="minor">
+            <a:schemeClr val="lt1"/>
+          </a:fontRef>
+        </p:style>
+        <p:txBody>
+          <a:bodyPr rtlCol="0" anchor="ctr"/>
+          <a:lstStyle/>
+          <a:p>
+            <a:pPr algn="ctr"/>
+            <a:endParaRPr kumimoji="1" lang="ja-JP" altLang="en-US"/>
+          </a:p>
+        </p:txBody>
+      </p:sp>
+      <p:sp>
+        <p:nvSpPr>
+          <p:cNvPr id="232" name="二等辺三角形 231"/>
+          <p:cNvSpPr/>
+          <p:nvPr/>
+        </p:nvSpPr>
+        <p:spPr>
+          <a:xfrm>
+            <a:off x="7672965" y="2494362"/>
+            <a:ext cx="144000" cy="144000"/>
+          </a:xfrm>
+          <a:prstGeom prst="triangle">
+            <a:avLst/>
+          </a:prstGeom>
+          <a:solidFill>
+            <a:schemeClr val="bg1"/>
+          </a:solidFill>
+          <a:ln>
+            <a:noFill/>
+          </a:ln>
+          <a:effectLst/>
+        </p:spPr>
+        <p:style>
+          <a:lnRef idx="1">
+            <a:schemeClr val="accent1"/>
+          </a:lnRef>
+          <a:fillRef idx="3">
+            <a:schemeClr val="accent1"/>
+          </a:fillRef>
+          <a:effectRef idx="2">
+            <a:schemeClr val="accent1"/>
+          </a:effectRef>
+          <a:fontRef idx="minor">
+            <a:schemeClr val="lt1"/>
+          </a:fontRef>
+        </p:style>
+        <p:txBody>
+          <a:bodyPr rtlCol="0" anchor="ctr"/>
+          <a:lstStyle/>
+          <a:p>
+            <a:pPr algn="ctr"/>
+            <a:endParaRPr kumimoji="1" lang="ja-JP" altLang="en-US"/>
+          </a:p>
+        </p:txBody>
+      </p:sp>
+      <p:sp>
+        <p:nvSpPr>
+          <p:cNvPr id="233" name="二等辺三角形 232"/>
+          <p:cNvSpPr/>
+          <p:nvPr/>
+        </p:nvSpPr>
+        <p:spPr>
+          <a:xfrm rot="10800000">
+            <a:off x="7672966" y="2649602"/>
+            <a:ext cx="144000" cy="144000"/>
+          </a:xfrm>
+          <a:prstGeom prst="triangle">
+            <a:avLst/>
+          </a:prstGeom>
+          <a:solidFill>
+            <a:schemeClr val="bg1"/>
+          </a:solidFill>
+          <a:ln>
+            <a:noFill/>
+          </a:ln>
+          <a:effectLst/>
+        </p:spPr>
+        <p:style>
+          <a:lnRef idx="1">
+            <a:schemeClr val="accent1"/>
+          </a:lnRef>
+          <a:fillRef idx="3">
+            <a:schemeClr val="accent1"/>
+          </a:fillRef>
+          <a:effectRef idx="2">
+            <a:schemeClr val="accent1"/>
+          </a:effectRef>
+          <a:fontRef idx="minor">
+            <a:schemeClr val="lt1"/>
+          </a:fontRef>
+        </p:style>
+        <p:txBody>
+          <a:bodyPr rtlCol="0" anchor="ctr"/>
+          <a:lstStyle/>
+          <a:p>
+            <a:pPr algn="ctr"/>
+            <a:endParaRPr kumimoji="1" lang="ja-JP" altLang="en-US"/>
+          </a:p>
+        </p:txBody>
+      </p:sp>
+      <p:sp>
+        <p:nvSpPr>
+          <p:cNvPr id="234" name="正方形/長方形 233"/>
           <p:cNvSpPr/>
           <p:nvPr/>
         </p:nvSpPr>
@@ -16641,14 +17720,14 @@
       </p:grpSpPr>
       <p:graphicFrame>
         <p:nvGraphicFramePr>
-          <p:cNvPr id="102" name="表 101"/>
+          <p:cNvPr id="79" name="表 78"/>
           <p:cNvGraphicFramePr>
             <a:graphicFrameLocks noGrp="1"/>
           </p:cNvGraphicFramePr>
           <p:nvPr>
             <p:extLst>
               <p:ext uri="{D42A27DB-BD31-4B8C-83A1-F6EECF244321}">
-                <p14:modId xmlns:p14="http://schemas.microsoft.com/office/powerpoint/2010/main" val="3705858149"/>
+                <p14:modId xmlns:p14="http://schemas.microsoft.com/office/powerpoint/2010/main" val="1627573183"/>
               </p:ext>
             </p:extLst>
           </p:nvPr>
@@ -17143,7 +18222,7 @@
       </p:graphicFrame>
       <p:sp>
         <p:nvSpPr>
-          <p:cNvPr id="103" name="正方形/長方形 102"/>
+          <p:cNvPr id="80" name="正方形/長方形 79"/>
           <p:cNvSpPr/>
           <p:nvPr/>
         </p:nvSpPr>
@@ -17195,7 +18274,7 @@
       </p:sp>
       <p:sp>
         <p:nvSpPr>
-          <p:cNvPr id="104" name="角丸四角形 103"/>
+          <p:cNvPr id="81" name="角丸四角形 80"/>
           <p:cNvSpPr/>
           <p:nvPr/>
         </p:nvSpPr>
@@ -17240,7 +18319,7 @@
       </p:sp>
       <p:sp>
         <p:nvSpPr>
-          <p:cNvPr id="105" name="テキスト ボックス 104"/>
+          <p:cNvPr id="82" name="テキスト ボックス 81"/>
           <p:cNvSpPr txBox="1"/>
           <p:nvPr/>
         </p:nvSpPr>
@@ -17278,7 +18357,7 @@
       </p:sp>
       <p:sp>
         <p:nvSpPr>
-          <p:cNvPr id="106" name="角丸四角形 105"/>
+          <p:cNvPr id="83" name="角丸四角形 82"/>
           <p:cNvSpPr/>
           <p:nvPr/>
         </p:nvSpPr>
@@ -17323,7 +18402,7 @@
       </p:sp>
       <p:sp>
         <p:nvSpPr>
-          <p:cNvPr id="107" name="テキスト ボックス 106"/>
+          <p:cNvPr id="84" name="テキスト ボックス 83"/>
           <p:cNvSpPr txBox="1"/>
           <p:nvPr/>
         </p:nvSpPr>
@@ -17369,7 +18448,7 @@
       </p:sp>
       <p:sp>
         <p:nvSpPr>
-          <p:cNvPr id="108" name="角丸四角形 107"/>
+          <p:cNvPr id="85" name="角丸四角形 84"/>
           <p:cNvSpPr/>
           <p:nvPr/>
         </p:nvSpPr>
@@ -17414,7 +18493,7 @@
       </p:sp>
       <p:sp>
         <p:nvSpPr>
-          <p:cNvPr id="109" name="テキスト ボックス 108"/>
+          <p:cNvPr id="86" name="テキスト ボックス 85"/>
           <p:cNvSpPr txBox="1"/>
           <p:nvPr/>
         </p:nvSpPr>
@@ -17460,7 +18539,7 @@
       </p:sp>
       <p:sp>
         <p:nvSpPr>
-          <p:cNvPr id="110" name="角丸四角形 109"/>
+          <p:cNvPr id="87" name="角丸四角形 86"/>
           <p:cNvSpPr/>
           <p:nvPr/>
         </p:nvSpPr>
@@ -17505,7 +18584,7 @@
       </p:sp>
       <p:sp>
         <p:nvSpPr>
-          <p:cNvPr id="111" name="テキスト ボックス 110"/>
+          <p:cNvPr id="88" name="テキスト ボックス 87"/>
           <p:cNvSpPr txBox="1"/>
           <p:nvPr/>
         </p:nvSpPr>
@@ -17551,7 +18630,7 @@
       </p:sp>
       <p:sp>
         <p:nvSpPr>
-          <p:cNvPr id="112" name="角丸四角形 111"/>
+          <p:cNvPr id="89" name="角丸四角形 88"/>
           <p:cNvSpPr/>
           <p:nvPr/>
         </p:nvSpPr>
@@ -17614,7 +18693,7 @@
       </p:sp>
       <p:cxnSp>
         <p:nvCxnSpPr>
-          <p:cNvPr id="113" name="直線コネクタ 112"/>
+          <p:cNvPr id="90" name="直線コネクタ 89"/>
           <p:cNvCxnSpPr/>
           <p:nvPr/>
         </p:nvCxnSpPr>
@@ -17652,7 +18731,7 @@
       </p:cxnSp>
       <p:sp>
         <p:nvSpPr>
-          <p:cNvPr id="114" name="テキスト ボックス 113"/>
+          <p:cNvPr id="91" name="テキスト ボックス 90"/>
           <p:cNvSpPr txBox="1"/>
           <p:nvPr/>
         </p:nvSpPr>
@@ -17690,7 +18769,7 @@
       </p:sp>
       <p:sp>
         <p:nvSpPr>
-          <p:cNvPr id="115" name="テキスト ボックス 114"/>
+          <p:cNvPr id="92" name="テキスト ボックス 91"/>
           <p:cNvSpPr txBox="1"/>
           <p:nvPr/>
         </p:nvSpPr>
@@ -17728,7 +18807,7 @@
       </p:sp>
       <p:sp>
         <p:nvSpPr>
-          <p:cNvPr id="116" name="テキスト ボックス 115"/>
+          <p:cNvPr id="93" name="テキスト ボックス 92"/>
           <p:cNvSpPr txBox="1"/>
           <p:nvPr/>
         </p:nvSpPr>
@@ -17766,7 +18845,7 @@
       </p:sp>
       <p:sp>
         <p:nvSpPr>
-          <p:cNvPr id="117" name="二等辺三角形 116"/>
+          <p:cNvPr id="94" name="二等辺三角形 93"/>
           <p:cNvSpPr/>
           <p:nvPr/>
         </p:nvSpPr>
@@ -17811,7 +18890,7 @@
       </p:sp>
       <p:sp>
         <p:nvSpPr>
-          <p:cNvPr id="118" name="二等辺三角形 117"/>
+          <p:cNvPr id="95" name="二等辺三角形 94"/>
           <p:cNvSpPr/>
           <p:nvPr/>
         </p:nvSpPr>
@@ -17856,7 +18935,7 @@
       </p:sp>
       <p:sp>
         <p:nvSpPr>
-          <p:cNvPr id="119" name="テキスト ボックス 118"/>
+          <p:cNvPr id="96" name="テキスト ボックス 95"/>
           <p:cNvSpPr txBox="1"/>
           <p:nvPr/>
         </p:nvSpPr>
@@ -17894,7 +18973,7 @@
       </p:sp>
       <p:sp>
         <p:nvSpPr>
-          <p:cNvPr id="120" name="テキスト ボックス 119"/>
+          <p:cNvPr id="97" name="テキスト ボックス 96"/>
           <p:cNvSpPr txBox="1"/>
           <p:nvPr/>
         </p:nvSpPr>
@@ -17988,7 +19067,7 @@
       </p:sp>
       <p:sp>
         <p:nvSpPr>
-          <p:cNvPr id="121" name="二等辺三角形 120"/>
+          <p:cNvPr id="98" name="二等辺三角形 97"/>
           <p:cNvSpPr/>
           <p:nvPr/>
         </p:nvSpPr>
@@ -18033,7 +19112,7 @@
       </p:sp>
       <p:sp>
         <p:nvSpPr>
-          <p:cNvPr id="122" name="二等辺三角形 121"/>
+          <p:cNvPr id="99" name="二等辺三角形 98"/>
           <p:cNvSpPr/>
           <p:nvPr/>
         </p:nvSpPr>
@@ -18078,7 +19157,7 @@
       </p:sp>
       <p:sp>
         <p:nvSpPr>
-          <p:cNvPr id="123" name="二等辺三角形 122"/>
+          <p:cNvPr id="100" name="二等辺三角形 99"/>
           <p:cNvSpPr/>
           <p:nvPr/>
         </p:nvSpPr>
@@ -18123,7 +19202,7 @@
       </p:sp>
       <p:sp>
         <p:nvSpPr>
-          <p:cNvPr id="124" name="二等辺三角形 123"/>
+          <p:cNvPr id="101" name="二等辺三角形 100"/>
           <p:cNvSpPr/>
           <p:nvPr/>
         </p:nvSpPr>
@@ -18168,7 +19247,7 @@
       </p:sp>
       <p:sp>
         <p:nvSpPr>
-          <p:cNvPr id="125" name="角丸四角形 124"/>
+          <p:cNvPr id="140" name="角丸四角形 139"/>
           <p:cNvSpPr/>
           <p:nvPr/>
         </p:nvSpPr>
@@ -18231,7 +19310,7 @@
       </p:sp>
       <p:pic>
         <p:nvPicPr>
-          <p:cNvPr id="126" name="図 125" descr="trash.png"/>
+          <p:cNvPr id="141" name="図 140" descr="trash.png"/>
           <p:cNvPicPr>
             <a:picLocks noChangeAspect="1"/>
           </p:cNvPicPr>
@@ -18261,7 +19340,7 @@
       </p:pic>
       <p:pic>
         <p:nvPicPr>
-          <p:cNvPr id="127" name="図 126" descr="trash.png"/>
+          <p:cNvPr id="142" name="図 141" descr="trash.png"/>
           <p:cNvPicPr>
             <a:picLocks noChangeAspect="1"/>
           </p:cNvPicPr>
@@ -18291,7 +19370,7 @@
       </p:pic>
       <p:pic>
         <p:nvPicPr>
-          <p:cNvPr id="128" name="図 127" descr="trash.png"/>
+          <p:cNvPr id="143" name="図 142" descr="trash.png"/>
           <p:cNvPicPr>
             <a:picLocks noChangeAspect="1"/>
           </p:cNvPicPr>
@@ -18321,7 +19400,7 @@
       </p:pic>
       <p:pic>
         <p:nvPicPr>
-          <p:cNvPr id="129" name="図 128" descr="trash.png"/>
+          <p:cNvPr id="144" name="図 143" descr="trash.png"/>
           <p:cNvPicPr>
             <a:picLocks noChangeAspect="1"/>
           </p:cNvPicPr>
@@ -18351,7 +19430,7 @@
       </p:pic>
       <p:pic>
         <p:nvPicPr>
-          <p:cNvPr id="130" name="図 129" descr="trash.png"/>
+          <p:cNvPr id="145" name="図 144" descr="trash.png"/>
           <p:cNvPicPr>
             <a:picLocks noChangeAspect="1"/>
           </p:cNvPicPr>
@@ -18381,7 +19460,7 @@
       </p:pic>
       <p:pic>
         <p:nvPicPr>
-          <p:cNvPr id="131" name="図 130" descr="trash.png"/>
+          <p:cNvPr id="146" name="図 145" descr="trash.png"/>
           <p:cNvPicPr>
             <a:picLocks noChangeAspect="1"/>
           </p:cNvPicPr>
@@ -18411,7 +19490,7 @@
       </p:pic>
       <p:pic>
         <p:nvPicPr>
-          <p:cNvPr id="132" name="図 131" descr="trash.png"/>
+          <p:cNvPr id="147" name="図 146" descr="trash.png"/>
           <p:cNvPicPr>
             <a:picLocks noChangeAspect="1"/>
           </p:cNvPicPr>
@@ -18441,7 +19520,7 @@
       </p:pic>
       <p:pic>
         <p:nvPicPr>
-          <p:cNvPr id="133" name="図 132" descr="trash.png"/>
+          <p:cNvPr id="148" name="図 147" descr="trash.png"/>
           <p:cNvPicPr>
             <a:picLocks noChangeAspect="1"/>
           </p:cNvPicPr>
@@ -18471,7 +19550,7 @@
       </p:pic>
       <p:pic>
         <p:nvPicPr>
-          <p:cNvPr id="134" name="図 133" descr="trash.png"/>
+          <p:cNvPr id="149" name="図 148" descr="trash.png"/>
           <p:cNvPicPr>
             <a:picLocks noChangeAspect="1"/>
           </p:cNvPicPr>
@@ -18501,7 +19580,7 @@
       </p:pic>
       <p:pic>
         <p:nvPicPr>
-          <p:cNvPr id="135" name="図 134" descr="trash.png"/>
+          <p:cNvPr id="150" name="図 149" descr="trash.png"/>
           <p:cNvPicPr>
             <a:picLocks noChangeAspect="1"/>
           </p:cNvPicPr>
@@ -18531,7 +19610,7 @@
       </p:pic>
       <p:grpSp>
         <p:nvGrpSpPr>
-          <p:cNvPr id="136" name="図形グループ 135"/>
+          <p:cNvPr id="151" name="図形グループ 150"/>
           <p:cNvGrpSpPr/>
           <p:nvPr/>
         </p:nvGrpSpPr>
@@ -18545,7 +19624,7 @@
         </p:grpSpPr>
         <p:sp>
           <p:nvSpPr>
-            <p:cNvPr id="137" name="角丸四角形 136"/>
+            <p:cNvPr id="152" name="角丸四角形 151"/>
             <p:cNvSpPr/>
             <p:nvPr/>
           </p:nvSpPr>
@@ -18594,7 +19673,7 @@
         </p:sp>
         <p:cxnSp>
           <p:nvCxnSpPr>
-            <p:cNvPr id="138" name="直線コネクタ 137"/>
+            <p:cNvPr id="153" name="直線コネクタ 152"/>
             <p:cNvCxnSpPr/>
             <p:nvPr/>
           </p:nvCxnSpPr>
@@ -18629,7 +19708,7 @@
         </p:cxnSp>
         <p:cxnSp>
           <p:nvCxnSpPr>
-            <p:cNvPr id="139" name="直線コネクタ 138"/>
+            <p:cNvPr id="154" name="直線コネクタ 153"/>
             <p:cNvCxnSpPr/>
             <p:nvPr/>
           </p:nvCxnSpPr>
@@ -18664,7 +19743,7 @@
         </p:cxnSp>
         <p:cxnSp>
           <p:nvCxnSpPr>
-            <p:cNvPr id="185" name="直線コネクタ 184"/>
+            <p:cNvPr id="155" name="直線コネクタ 154"/>
             <p:cNvCxnSpPr/>
             <p:nvPr/>
           </p:nvCxnSpPr>
@@ -18700,7 +19779,7 @@
       </p:grpSp>
       <p:cxnSp>
         <p:nvCxnSpPr>
-          <p:cNvPr id="186" name="直線コネクタ 185"/>
+          <p:cNvPr id="156" name="直線コネクタ 155"/>
           <p:cNvCxnSpPr/>
           <p:nvPr/>
         </p:nvCxnSpPr>
@@ -18738,7 +19817,7 @@
       </p:cxnSp>
       <p:sp>
         <p:nvSpPr>
-          <p:cNvPr id="187" name="テキスト ボックス 186"/>
+          <p:cNvPr id="157" name="テキスト ボックス 156"/>
           <p:cNvSpPr txBox="1"/>
           <p:nvPr/>
         </p:nvSpPr>
@@ -18776,7 +19855,7 @@
       </p:sp>
       <p:sp>
         <p:nvSpPr>
-          <p:cNvPr id="188" name="角丸四角形 187"/>
+          <p:cNvPr id="158" name="角丸四角形 157"/>
           <p:cNvSpPr/>
           <p:nvPr/>
         </p:nvSpPr>
@@ -18821,7 +19900,7 @@
       </p:sp>
       <p:sp>
         <p:nvSpPr>
-          <p:cNvPr id="189" name="テキスト ボックス 188"/>
+          <p:cNvPr id="159" name="テキスト ボックス 158"/>
           <p:cNvSpPr txBox="1"/>
           <p:nvPr/>
         </p:nvSpPr>
@@ -18859,7 +19938,7 @@
       </p:sp>
       <p:sp>
         <p:nvSpPr>
-          <p:cNvPr id="190" name="テキスト ボックス 189"/>
+          <p:cNvPr id="160" name="テキスト ボックス 159"/>
           <p:cNvSpPr txBox="1"/>
           <p:nvPr/>
         </p:nvSpPr>
@@ -18905,7 +19984,7 @@
       </p:sp>
       <p:sp>
         <p:nvSpPr>
-          <p:cNvPr id="191" name="角丸四角形 190"/>
+          <p:cNvPr id="161" name="角丸四角形 160"/>
           <p:cNvSpPr/>
           <p:nvPr/>
         </p:nvSpPr>
@@ -18950,7 +20029,7 @@
       </p:sp>
       <p:grpSp>
         <p:nvGrpSpPr>
-          <p:cNvPr id="192" name="図形グループ 191"/>
+          <p:cNvPr id="162" name="図形グループ 161"/>
           <p:cNvGrpSpPr/>
           <p:nvPr/>
         </p:nvGrpSpPr>
@@ -18964,7 +20043,7 @@
         </p:grpSpPr>
         <p:sp>
           <p:nvSpPr>
-            <p:cNvPr id="193" name="角丸四角形 192"/>
+            <p:cNvPr id="163" name="角丸四角形 162"/>
             <p:cNvSpPr/>
             <p:nvPr/>
           </p:nvSpPr>
@@ -19026,7 +20105,7 @@
         </p:sp>
         <p:sp>
           <p:nvSpPr>
-            <p:cNvPr id="194" name="二等辺三角形 193"/>
+            <p:cNvPr id="164" name="二等辺三角形 163"/>
             <p:cNvSpPr/>
             <p:nvPr/>
           </p:nvSpPr>
@@ -19072,7 +20151,7 @@
       </p:grpSp>
       <p:sp>
         <p:nvSpPr>
-          <p:cNvPr id="195" name="テキスト ボックス 194"/>
+          <p:cNvPr id="165" name="テキスト ボックス 164"/>
           <p:cNvSpPr txBox="1"/>
           <p:nvPr/>
         </p:nvSpPr>
@@ -19118,7 +20197,7 @@
       </p:sp>
       <p:sp>
         <p:nvSpPr>
-          <p:cNvPr id="196" name="角丸四角形 195"/>
+          <p:cNvPr id="166" name="角丸四角形 165"/>
           <p:cNvSpPr/>
           <p:nvPr/>
         </p:nvSpPr>
@@ -19163,7 +20242,7 @@
       </p:sp>
       <p:sp>
         <p:nvSpPr>
-          <p:cNvPr id="197" name="テキスト ボックス 196"/>
+          <p:cNvPr id="167" name="テキスト ボックス 166"/>
           <p:cNvSpPr txBox="1"/>
           <p:nvPr/>
         </p:nvSpPr>
@@ -19209,7 +20288,7 @@
       </p:sp>
       <p:sp>
         <p:nvSpPr>
-          <p:cNvPr id="198" name="角丸四角形 197"/>
+          <p:cNvPr id="168" name="角丸四角形 167"/>
           <p:cNvSpPr/>
           <p:nvPr/>
         </p:nvSpPr>
@@ -19254,7 +20333,7 @@
       </p:sp>
       <p:sp>
         <p:nvSpPr>
-          <p:cNvPr id="199" name="角丸四角形 198"/>
+          <p:cNvPr id="169" name="角丸四角形 168"/>
           <p:cNvSpPr/>
           <p:nvPr/>
         </p:nvSpPr>
@@ -19299,7 +20378,7 @@
       </p:sp>
       <p:sp>
         <p:nvSpPr>
-          <p:cNvPr id="200" name="テキスト ボックス 199"/>
+          <p:cNvPr id="170" name="テキスト ボックス 169"/>
           <p:cNvSpPr txBox="1"/>
           <p:nvPr/>
         </p:nvSpPr>
@@ -19337,7 +20416,7 @@
       </p:sp>
       <p:sp>
         <p:nvSpPr>
-          <p:cNvPr id="201" name="角丸四角形 200"/>
+          <p:cNvPr id="171" name="角丸四角形 170"/>
           <p:cNvSpPr/>
           <p:nvPr/>
         </p:nvSpPr>
@@ -19382,7 +20461,7 @@
       </p:sp>
       <p:sp>
         <p:nvSpPr>
-          <p:cNvPr id="202" name="角丸四角形 201"/>
+          <p:cNvPr id="172" name="角丸四角形 171"/>
           <p:cNvSpPr/>
           <p:nvPr/>
         </p:nvSpPr>
@@ -19445,7 +20524,7 @@
       </p:sp>
       <p:grpSp>
         <p:nvGrpSpPr>
-          <p:cNvPr id="203" name="図形グループ 202"/>
+          <p:cNvPr id="173" name="図形グループ 172"/>
           <p:cNvGrpSpPr/>
           <p:nvPr/>
         </p:nvGrpSpPr>
@@ -19459,7 +20538,7 @@
         </p:grpSpPr>
         <p:sp>
           <p:nvSpPr>
-            <p:cNvPr id="204" name="角丸四角形 203"/>
+            <p:cNvPr id="174" name="角丸四角形 173"/>
             <p:cNvSpPr/>
             <p:nvPr/>
           </p:nvSpPr>
@@ -19508,7 +20587,7 @@
         </p:sp>
         <p:cxnSp>
           <p:nvCxnSpPr>
-            <p:cNvPr id="205" name="直線コネクタ 204"/>
+            <p:cNvPr id="175" name="直線コネクタ 174"/>
             <p:cNvCxnSpPr/>
             <p:nvPr/>
           </p:nvCxnSpPr>
@@ -19543,7 +20622,7 @@
         </p:cxnSp>
         <p:cxnSp>
           <p:nvCxnSpPr>
-            <p:cNvPr id="206" name="直線コネクタ 205"/>
+            <p:cNvPr id="176" name="直線コネクタ 175"/>
             <p:cNvCxnSpPr/>
             <p:nvPr/>
           </p:nvCxnSpPr>
@@ -19578,7 +20657,7 @@
         </p:cxnSp>
         <p:cxnSp>
           <p:nvCxnSpPr>
-            <p:cNvPr id="207" name="直線コネクタ 206"/>
+            <p:cNvPr id="177" name="直線コネクタ 176"/>
             <p:cNvCxnSpPr/>
             <p:nvPr/>
           </p:nvCxnSpPr>
@@ -19614,7 +20693,7 @@
       </p:grpSp>
       <p:sp>
         <p:nvSpPr>
-          <p:cNvPr id="208" name="テキスト ボックス 207"/>
+          <p:cNvPr id="178" name="テキスト ボックス 177"/>
           <p:cNvSpPr txBox="1"/>
           <p:nvPr/>
         </p:nvSpPr>
@@ -19652,7 +20731,7 @@
       </p:sp>
       <p:sp>
         <p:nvSpPr>
-          <p:cNvPr id="209" name="テキスト ボックス 208"/>
+          <p:cNvPr id="217" name="テキスト ボックス 216"/>
           <p:cNvSpPr txBox="1"/>
           <p:nvPr/>
         </p:nvSpPr>
@@ -19690,7 +20769,7 @@
       </p:sp>
       <p:sp>
         <p:nvSpPr>
-          <p:cNvPr id="210" name="円/楕円 209"/>
+          <p:cNvPr id="218" name="円/楕円 217"/>
           <p:cNvSpPr/>
           <p:nvPr/>
         </p:nvSpPr>
@@ -19735,7 +20814,7 @@
       </p:sp>
       <p:sp>
         <p:nvSpPr>
-          <p:cNvPr id="211" name="円/楕円 210"/>
+          <p:cNvPr id="219" name="円/楕円 218"/>
           <p:cNvSpPr/>
           <p:nvPr/>
         </p:nvSpPr>
@@ -19780,7 +20859,7 @@
       </p:sp>
       <p:grpSp>
         <p:nvGrpSpPr>
-          <p:cNvPr id="212" name="図形グループ 211"/>
+          <p:cNvPr id="220" name="図形グループ 219"/>
           <p:cNvGrpSpPr/>
           <p:nvPr/>
         </p:nvGrpSpPr>
@@ -19794,7 +20873,7 @@
         </p:grpSpPr>
         <p:sp>
           <p:nvSpPr>
-            <p:cNvPr id="213" name="角丸四角形 212"/>
+            <p:cNvPr id="221" name="角丸四角形 220"/>
             <p:cNvSpPr/>
             <p:nvPr/>
           </p:nvSpPr>
@@ -19845,7 +20924,7 @@
         </p:sp>
         <p:sp>
           <p:nvSpPr>
-            <p:cNvPr id="214" name="二等辺三角形 213"/>
+            <p:cNvPr id="222" name="二等辺三角形 221"/>
             <p:cNvSpPr/>
             <p:nvPr/>
           </p:nvSpPr>
@@ -19891,7 +20970,7 @@
       </p:grpSp>
       <p:sp>
         <p:nvSpPr>
-          <p:cNvPr id="215" name="テキスト ボックス 214"/>
+          <p:cNvPr id="223" name="テキスト ボックス 222"/>
           <p:cNvSpPr txBox="1"/>
           <p:nvPr/>
         </p:nvSpPr>
@@ -19917,15 +20996,7 @@
                 <a:ea typeface="メイリオ"/>
                 <a:cs typeface="メイリオ"/>
               </a:rPr>
-              <a:t>種類</a:t>
-            </a:r>
-            <a:r>
-              <a:rPr kumimoji="1" lang="ja-JP" altLang="en-US" sz="1000" dirty="0" smtClean="0">
-                <a:latin typeface="メイリオ"/>
-                <a:ea typeface="メイリオ"/>
-                <a:cs typeface="メイリオ"/>
-              </a:rPr>
-              <a:t>：</a:t>
+              <a:t>種類：</a:t>
             </a:r>
             <a:endParaRPr kumimoji="1" lang="ja-JP" altLang="en-US" sz="1000" dirty="0">
               <a:latin typeface="メイリオ"/>
@@ -19937,7 +21008,367 @@
       </p:sp>
       <p:sp>
         <p:nvSpPr>
-          <p:cNvPr id="216" name="正方形/長方形 215"/>
+          <p:cNvPr id="224" name="二等辺三角形 223"/>
+          <p:cNvSpPr/>
+          <p:nvPr/>
+        </p:nvSpPr>
+        <p:spPr>
+          <a:xfrm>
+            <a:off x="2516950" y="2487417"/>
+            <a:ext cx="144000" cy="144000"/>
+          </a:xfrm>
+          <a:prstGeom prst="triangle">
+            <a:avLst/>
+          </a:prstGeom>
+          <a:solidFill>
+            <a:schemeClr val="bg1"/>
+          </a:solidFill>
+          <a:ln>
+            <a:noFill/>
+          </a:ln>
+          <a:effectLst/>
+        </p:spPr>
+        <p:style>
+          <a:lnRef idx="1">
+            <a:schemeClr val="accent1"/>
+          </a:lnRef>
+          <a:fillRef idx="3">
+            <a:schemeClr val="accent1"/>
+          </a:fillRef>
+          <a:effectRef idx="2">
+            <a:schemeClr val="accent1"/>
+          </a:effectRef>
+          <a:fontRef idx="minor">
+            <a:schemeClr val="lt1"/>
+          </a:fontRef>
+        </p:style>
+        <p:txBody>
+          <a:bodyPr rtlCol="0" anchor="ctr"/>
+          <a:lstStyle/>
+          <a:p>
+            <a:pPr algn="ctr"/>
+            <a:endParaRPr kumimoji="1" lang="ja-JP" altLang="en-US"/>
+          </a:p>
+        </p:txBody>
+      </p:sp>
+      <p:sp>
+        <p:nvSpPr>
+          <p:cNvPr id="225" name="二等辺三角形 224"/>
+          <p:cNvSpPr/>
+          <p:nvPr/>
+        </p:nvSpPr>
+        <p:spPr>
+          <a:xfrm rot="10800000">
+            <a:off x="2516951" y="2642657"/>
+            <a:ext cx="144000" cy="144000"/>
+          </a:xfrm>
+          <a:prstGeom prst="triangle">
+            <a:avLst/>
+          </a:prstGeom>
+          <a:solidFill>
+            <a:schemeClr val="bg1"/>
+          </a:solidFill>
+          <a:ln>
+            <a:noFill/>
+          </a:ln>
+          <a:effectLst/>
+        </p:spPr>
+        <p:style>
+          <a:lnRef idx="1">
+            <a:schemeClr val="accent1"/>
+          </a:lnRef>
+          <a:fillRef idx="3">
+            <a:schemeClr val="accent1"/>
+          </a:fillRef>
+          <a:effectRef idx="2">
+            <a:schemeClr val="accent1"/>
+          </a:effectRef>
+          <a:fontRef idx="minor">
+            <a:schemeClr val="lt1"/>
+          </a:fontRef>
+        </p:style>
+        <p:txBody>
+          <a:bodyPr rtlCol="0" anchor="ctr"/>
+          <a:lstStyle/>
+          <a:p>
+            <a:pPr algn="ctr"/>
+            <a:endParaRPr kumimoji="1" lang="ja-JP" altLang="en-US"/>
+          </a:p>
+        </p:txBody>
+      </p:sp>
+      <p:sp>
+        <p:nvSpPr>
+          <p:cNvPr id="226" name="二等辺三角形 225"/>
+          <p:cNvSpPr/>
+          <p:nvPr/>
+        </p:nvSpPr>
+        <p:spPr>
+          <a:xfrm>
+            <a:off x="4227925" y="2489732"/>
+            <a:ext cx="144000" cy="144000"/>
+          </a:xfrm>
+          <a:prstGeom prst="triangle">
+            <a:avLst/>
+          </a:prstGeom>
+          <a:solidFill>
+            <a:schemeClr val="bg1"/>
+          </a:solidFill>
+          <a:ln>
+            <a:noFill/>
+          </a:ln>
+          <a:effectLst/>
+        </p:spPr>
+        <p:style>
+          <a:lnRef idx="1">
+            <a:schemeClr val="accent1"/>
+          </a:lnRef>
+          <a:fillRef idx="3">
+            <a:schemeClr val="accent1"/>
+          </a:fillRef>
+          <a:effectRef idx="2">
+            <a:schemeClr val="accent1"/>
+          </a:effectRef>
+          <a:fontRef idx="minor">
+            <a:schemeClr val="lt1"/>
+          </a:fontRef>
+        </p:style>
+        <p:txBody>
+          <a:bodyPr rtlCol="0" anchor="ctr"/>
+          <a:lstStyle/>
+          <a:p>
+            <a:pPr algn="ctr"/>
+            <a:endParaRPr kumimoji="1" lang="ja-JP" altLang="en-US"/>
+          </a:p>
+        </p:txBody>
+      </p:sp>
+      <p:sp>
+        <p:nvSpPr>
+          <p:cNvPr id="227" name="二等辺三角形 226"/>
+          <p:cNvSpPr/>
+          <p:nvPr/>
+        </p:nvSpPr>
+        <p:spPr>
+          <a:xfrm rot="10800000">
+            <a:off x="4227926" y="2644972"/>
+            <a:ext cx="144000" cy="144000"/>
+          </a:xfrm>
+          <a:prstGeom prst="triangle">
+            <a:avLst/>
+          </a:prstGeom>
+          <a:solidFill>
+            <a:schemeClr val="bg1"/>
+          </a:solidFill>
+          <a:ln>
+            <a:noFill/>
+          </a:ln>
+          <a:effectLst/>
+        </p:spPr>
+        <p:style>
+          <a:lnRef idx="1">
+            <a:schemeClr val="accent1"/>
+          </a:lnRef>
+          <a:fillRef idx="3">
+            <a:schemeClr val="accent1"/>
+          </a:fillRef>
+          <a:effectRef idx="2">
+            <a:schemeClr val="accent1"/>
+          </a:effectRef>
+          <a:fontRef idx="minor">
+            <a:schemeClr val="lt1"/>
+          </a:fontRef>
+        </p:style>
+        <p:txBody>
+          <a:bodyPr rtlCol="0" anchor="ctr"/>
+          <a:lstStyle/>
+          <a:p>
+            <a:pPr algn="ctr"/>
+            <a:endParaRPr kumimoji="1" lang="ja-JP" altLang="en-US"/>
+          </a:p>
+        </p:txBody>
+      </p:sp>
+      <p:sp>
+        <p:nvSpPr>
+          <p:cNvPr id="228" name="二等辺三角形 227"/>
+          <p:cNvSpPr/>
+          <p:nvPr/>
+        </p:nvSpPr>
+        <p:spPr>
+          <a:xfrm>
+            <a:off x="5950445" y="2492047"/>
+            <a:ext cx="144000" cy="144000"/>
+          </a:xfrm>
+          <a:prstGeom prst="triangle">
+            <a:avLst/>
+          </a:prstGeom>
+          <a:solidFill>
+            <a:schemeClr val="bg1"/>
+          </a:solidFill>
+          <a:ln>
+            <a:noFill/>
+          </a:ln>
+          <a:effectLst/>
+        </p:spPr>
+        <p:style>
+          <a:lnRef idx="1">
+            <a:schemeClr val="accent1"/>
+          </a:lnRef>
+          <a:fillRef idx="3">
+            <a:schemeClr val="accent1"/>
+          </a:fillRef>
+          <a:effectRef idx="2">
+            <a:schemeClr val="accent1"/>
+          </a:effectRef>
+          <a:fontRef idx="minor">
+            <a:schemeClr val="lt1"/>
+          </a:fontRef>
+        </p:style>
+        <p:txBody>
+          <a:bodyPr rtlCol="0" anchor="ctr"/>
+          <a:lstStyle/>
+          <a:p>
+            <a:pPr algn="ctr"/>
+            <a:endParaRPr kumimoji="1" lang="ja-JP" altLang="en-US"/>
+          </a:p>
+        </p:txBody>
+      </p:sp>
+      <p:sp>
+        <p:nvSpPr>
+          <p:cNvPr id="229" name="二等辺三角形 228"/>
+          <p:cNvSpPr/>
+          <p:nvPr/>
+        </p:nvSpPr>
+        <p:spPr>
+          <a:xfrm rot="10800000">
+            <a:off x="5950446" y="2647287"/>
+            <a:ext cx="144000" cy="144000"/>
+          </a:xfrm>
+          <a:prstGeom prst="triangle">
+            <a:avLst/>
+          </a:prstGeom>
+          <a:solidFill>
+            <a:schemeClr val="bg1"/>
+          </a:solidFill>
+          <a:ln>
+            <a:noFill/>
+          </a:ln>
+          <a:effectLst/>
+        </p:spPr>
+        <p:style>
+          <a:lnRef idx="1">
+            <a:schemeClr val="accent1"/>
+          </a:lnRef>
+          <a:fillRef idx="3">
+            <a:schemeClr val="accent1"/>
+          </a:fillRef>
+          <a:effectRef idx="2">
+            <a:schemeClr val="accent1"/>
+          </a:effectRef>
+          <a:fontRef idx="minor">
+            <a:schemeClr val="lt1"/>
+          </a:fontRef>
+        </p:style>
+        <p:txBody>
+          <a:bodyPr rtlCol="0" anchor="ctr"/>
+          <a:lstStyle/>
+          <a:p>
+            <a:pPr algn="ctr"/>
+            <a:endParaRPr kumimoji="1" lang="ja-JP" altLang="en-US"/>
+          </a:p>
+        </p:txBody>
+      </p:sp>
+      <p:sp>
+        <p:nvSpPr>
+          <p:cNvPr id="230" name="二等辺三角形 229"/>
+          <p:cNvSpPr/>
+          <p:nvPr/>
+        </p:nvSpPr>
+        <p:spPr>
+          <a:xfrm>
+            <a:off x="7672965" y="2494362"/>
+            <a:ext cx="144000" cy="144000"/>
+          </a:xfrm>
+          <a:prstGeom prst="triangle">
+            <a:avLst/>
+          </a:prstGeom>
+          <a:solidFill>
+            <a:schemeClr val="bg1"/>
+          </a:solidFill>
+          <a:ln>
+            <a:noFill/>
+          </a:ln>
+          <a:effectLst/>
+        </p:spPr>
+        <p:style>
+          <a:lnRef idx="1">
+            <a:schemeClr val="accent1"/>
+          </a:lnRef>
+          <a:fillRef idx="3">
+            <a:schemeClr val="accent1"/>
+          </a:fillRef>
+          <a:effectRef idx="2">
+            <a:schemeClr val="accent1"/>
+          </a:effectRef>
+          <a:fontRef idx="minor">
+            <a:schemeClr val="lt1"/>
+          </a:fontRef>
+        </p:style>
+        <p:txBody>
+          <a:bodyPr rtlCol="0" anchor="ctr"/>
+          <a:lstStyle/>
+          <a:p>
+            <a:pPr algn="ctr"/>
+            <a:endParaRPr kumimoji="1" lang="ja-JP" altLang="en-US"/>
+          </a:p>
+        </p:txBody>
+      </p:sp>
+      <p:sp>
+        <p:nvSpPr>
+          <p:cNvPr id="231" name="二等辺三角形 230"/>
+          <p:cNvSpPr/>
+          <p:nvPr/>
+        </p:nvSpPr>
+        <p:spPr>
+          <a:xfrm rot="10800000">
+            <a:off x="7672966" y="2649602"/>
+            <a:ext cx="144000" cy="144000"/>
+          </a:xfrm>
+          <a:prstGeom prst="triangle">
+            <a:avLst/>
+          </a:prstGeom>
+          <a:solidFill>
+            <a:schemeClr val="bg1"/>
+          </a:solidFill>
+          <a:ln>
+            <a:noFill/>
+          </a:ln>
+          <a:effectLst/>
+        </p:spPr>
+        <p:style>
+          <a:lnRef idx="1">
+            <a:schemeClr val="accent1"/>
+          </a:lnRef>
+          <a:fillRef idx="3">
+            <a:schemeClr val="accent1"/>
+          </a:fillRef>
+          <a:effectRef idx="2">
+            <a:schemeClr val="accent1"/>
+          </a:effectRef>
+          <a:fontRef idx="minor">
+            <a:schemeClr val="lt1"/>
+          </a:fontRef>
+        </p:style>
+        <p:txBody>
+          <a:bodyPr rtlCol="0" anchor="ctr"/>
+          <a:lstStyle/>
+          <a:p>
+            <a:pPr algn="ctr"/>
+            <a:endParaRPr kumimoji="1" lang="ja-JP" altLang="en-US"/>
+          </a:p>
+        </p:txBody>
+      </p:sp>
+      <p:sp>
+        <p:nvSpPr>
+          <p:cNvPr id="232" name="正方形/長方形 231"/>
           <p:cNvSpPr/>
           <p:nvPr/>
         </p:nvSpPr>

</xml_diff>

<commit_message>
Algieba set page count (#127)
* update ui

* update external spec for page count

* update version

* update CHANGELOG.md
</commit_message>
<xml_diff>
--- a/payment_manager/bin/algieba.pptx
+++ b/payment_manager/bin/algieba.pptx
@@ -200,7 +200,7 @@
           <a:p>
             <a:fld id="{EE82FEE5-269B-9B49-A8C4-823C45BE6055}" type="datetimeFigureOut">
               <a:rPr kumimoji="1" lang="ja-JP" altLang="en-US" smtClean="0"/>
-              <a:t>17/11/12</a:t>
+              <a:t>17/12/02</a:t>
             </a:fld>
             <a:endParaRPr kumimoji="1" lang="ja-JP" altLang="en-US"/>
           </a:p>
@@ -1353,7 +1353,7 @@
           <a:p>
             <a:fld id="{3ABA01A1-4899-9944-833D-6A66CDE659CB}" type="datetimeFigureOut">
               <a:rPr kumimoji="1" lang="ja-JP" altLang="en-US" smtClean="0"/>
-              <a:t>17/11/12</a:t>
+              <a:t>17/12/02</a:t>
             </a:fld>
             <a:endParaRPr kumimoji="1" lang="ja-JP" altLang="en-US"/>
           </a:p>
@@ -1555,7 +1555,7 @@
           <a:p>
             <a:fld id="{3ABA01A1-4899-9944-833D-6A66CDE659CB}" type="datetimeFigureOut">
               <a:rPr kumimoji="1" lang="ja-JP" altLang="en-US" smtClean="0"/>
-              <a:t>17/11/12</a:t>
+              <a:t>17/12/02</a:t>
             </a:fld>
             <a:endParaRPr kumimoji="1" lang="ja-JP" altLang="en-US"/>
           </a:p>
@@ -1767,7 +1767,7 @@
           <a:p>
             <a:fld id="{3ABA01A1-4899-9944-833D-6A66CDE659CB}" type="datetimeFigureOut">
               <a:rPr kumimoji="1" lang="ja-JP" altLang="en-US" smtClean="0"/>
-              <a:t>17/11/12</a:t>
+              <a:t>17/12/02</a:t>
             </a:fld>
             <a:endParaRPr kumimoji="1" lang="ja-JP" altLang="en-US"/>
           </a:p>
@@ -1969,7 +1969,7 @@
           <a:p>
             <a:fld id="{3ABA01A1-4899-9944-833D-6A66CDE659CB}" type="datetimeFigureOut">
               <a:rPr kumimoji="1" lang="ja-JP" altLang="en-US" smtClean="0"/>
-              <a:t>17/11/12</a:t>
+              <a:t>17/12/02</a:t>
             </a:fld>
             <a:endParaRPr kumimoji="1" lang="ja-JP" altLang="en-US"/>
           </a:p>
@@ -2215,7 +2215,7 @@
           <a:p>
             <a:fld id="{3ABA01A1-4899-9944-833D-6A66CDE659CB}" type="datetimeFigureOut">
               <a:rPr kumimoji="1" lang="ja-JP" altLang="en-US" smtClean="0"/>
-              <a:t>17/11/12</a:t>
+              <a:t>17/12/02</a:t>
             </a:fld>
             <a:endParaRPr kumimoji="1" lang="ja-JP" altLang="en-US"/>
           </a:p>
@@ -2567,7 +2567,7 @@
           <a:p>
             <a:fld id="{3ABA01A1-4899-9944-833D-6A66CDE659CB}" type="datetimeFigureOut">
               <a:rPr kumimoji="1" lang="ja-JP" altLang="en-US" smtClean="0"/>
-              <a:t>17/11/12</a:t>
+              <a:t>17/12/02</a:t>
             </a:fld>
             <a:endParaRPr kumimoji="1" lang="ja-JP" altLang="en-US"/>
           </a:p>
@@ -3053,7 +3053,7 @@
           <a:p>
             <a:fld id="{3ABA01A1-4899-9944-833D-6A66CDE659CB}" type="datetimeFigureOut">
               <a:rPr kumimoji="1" lang="ja-JP" altLang="en-US" smtClean="0"/>
-              <a:t>17/11/12</a:t>
+              <a:t>17/12/02</a:t>
             </a:fld>
             <a:endParaRPr kumimoji="1" lang="ja-JP" altLang="en-US"/>
           </a:p>
@@ -3171,7 +3171,7 @@
           <a:p>
             <a:fld id="{3ABA01A1-4899-9944-833D-6A66CDE659CB}" type="datetimeFigureOut">
               <a:rPr kumimoji="1" lang="ja-JP" altLang="en-US" smtClean="0"/>
-              <a:t>17/11/12</a:t>
+              <a:t>17/12/02</a:t>
             </a:fld>
             <a:endParaRPr kumimoji="1" lang="ja-JP" altLang="en-US"/>
           </a:p>
@@ -3266,7 +3266,7 @@
           <a:p>
             <a:fld id="{3ABA01A1-4899-9944-833D-6A66CDE659CB}" type="datetimeFigureOut">
               <a:rPr kumimoji="1" lang="ja-JP" altLang="en-US" smtClean="0"/>
-              <a:t>17/11/12</a:t>
+              <a:t>17/12/02</a:t>
             </a:fld>
             <a:endParaRPr kumimoji="1" lang="ja-JP" altLang="en-US"/>
           </a:p>
@@ -3575,7 +3575,7 @@
           <a:p>
             <a:fld id="{3ABA01A1-4899-9944-833D-6A66CDE659CB}" type="datetimeFigureOut">
               <a:rPr kumimoji="1" lang="ja-JP" altLang="en-US" smtClean="0"/>
-              <a:t>17/11/12</a:t>
+              <a:t>17/12/02</a:t>
             </a:fld>
             <a:endParaRPr kumimoji="1" lang="ja-JP" altLang="en-US"/>
           </a:p>
@@ -3828,7 +3828,7 @@
           <a:p>
             <a:fld id="{3ABA01A1-4899-9944-833D-6A66CDE659CB}" type="datetimeFigureOut">
               <a:rPr kumimoji="1" lang="ja-JP" altLang="en-US" smtClean="0"/>
-              <a:t>17/11/12</a:t>
+              <a:t>17/12/02</a:t>
             </a:fld>
             <a:endParaRPr kumimoji="1" lang="ja-JP" altLang="en-US"/>
           </a:p>
@@ -4073,7 +4073,7 @@
           <a:p>
             <a:fld id="{3ABA01A1-4899-9944-833D-6A66CDE659CB}" type="datetimeFigureOut">
               <a:rPr kumimoji="1" lang="ja-JP" altLang="en-US" smtClean="0"/>
-              <a:t>17/11/12</a:t>
+              <a:t>17/12/02</a:t>
             </a:fld>
             <a:endParaRPr kumimoji="1" lang="ja-JP" altLang="en-US"/>
           </a:p>
@@ -4521,7 +4521,7 @@
             </a:r>
             <a:r>
               <a:rPr lang="en-US" altLang="ja-JP" sz="2800" dirty="0" smtClean="0"/>
-              <a:t>11/12</a:t>
+              <a:t>12/02</a:t>
             </a:r>
             <a:r>
               <a:rPr lang="en-US" altLang="ja-JP" sz="2800" dirty="0" smtClean="0"/>
@@ -4540,7 +4540,7 @@
             </a:r>
             <a:r>
               <a:rPr lang="en-US" altLang="ja-JP" sz="2800" dirty="0" smtClean="0"/>
-              <a:t>2.12.0</a:t>
+              <a:t>2.13.0</a:t>
             </a:r>
             <a:endParaRPr kumimoji="1" lang="ja-JP" altLang="en-US" dirty="0"/>
           </a:p>
@@ -4850,8 +4850,8 @@
         </p:nvSpPr>
         <p:spPr>
           <a:xfrm>
-            <a:off x="646545" y="969818"/>
-            <a:ext cx="7635424" cy="5663089"/>
+            <a:off x="646545" y="900548"/>
+            <a:ext cx="7635424" cy="5816978"/>
           </a:xfrm>
           <a:prstGeom prst="rect">
             <a:avLst/>
@@ -5204,6 +5204,41 @@
                 <a:cs typeface="メイリオ"/>
               </a:rPr>
               <a:t>される</a:t>
+            </a:r>
+            <a:endParaRPr lang="en-US" altLang="ja-JP" dirty="0" smtClean="0">
+              <a:latin typeface="メイリオ"/>
+              <a:ea typeface="メイリオ"/>
+              <a:cs typeface="メイリオ"/>
+            </a:endParaRPr>
+          </a:p>
+          <a:p>
+            <a:pPr marL="742950" lvl="1" indent="-285750">
+              <a:buFont typeface="Arial"/>
+              <a:buChar char="•"/>
+            </a:pPr>
+            <a:r>
+              <a:rPr lang="ja-JP" altLang="en-US" dirty="0" smtClean="0">
+                <a:latin typeface="メイリオ"/>
+                <a:ea typeface="メイリオ"/>
+                <a:cs typeface="メイリオ"/>
+              </a:rPr>
+              <a:t>表示件数は管理画面で変更可能（デフォルト</a:t>
+            </a:r>
+            <a:r>
+              <a:rPr lang="en-US" altLang="ja-JP" dirty="0" smtClean="0">
+                <a:latin typeface="メイリオ"/>
+                <a:ea typeface="メイリオ"/>
+                <a:cs typeface="メイリオ"/>
+              </a:rPr>
+              <a:t>: 50</a:t>
+            </a:r>
+            <a:r>
+              <a:rPr lang="ja-JP" altLang="en-US" dirty="0" smtClean="0">
+                <a:latin typeface="メイリオ"/>
+                <a:ea typeface="メイリオ"/>
+                <a:cs typeface="メイリオ"/>
+              </a:rPr>
+              <a:t>件）</a:t>
             </a:r>
             <a:endParaRPr lang="en-US" altLang="ja-JP" dirty="0">
               <a:latin typeface="メイリオ"/>
@@ -5933,7 +5968,7 @@
           <p:nvPr>
             <p:extLst>
               <p:ext uri="{D42A27DB-BD31-4B8C-83A1-F6EECF244321}">
-                <p14:modId xmlns:p14="http://schemas.microsoft.com/office/powerpoint/2010/main" val="3806521063"/>
+                <p14:modId xmlns:p14="http://schemas.microsoft.com/office/powerpoint/2010/main" val="2376657391"/>
               </p:ext>
             </p:extLst>
           </p:nvPr>
@@ -9572,6 +9607,89 @@
           </a:p>
         </p:txBody>
       </p:sp>
+      <p:sp>
+        <p:nvSpPr>
+          <p:cNvPr id="92" name="テキスト ボックス 91"/>
+          <p:cNvSpPr txBox="1"/>
+          <p:nvPr/>
+        </p:nvSpPr>
+        <p:spPr>
+          <a:xfrm>
+            <a:off x="7120566" y="2122353"/>
+            <a:ext cx="697627" cy="246221"/>
+          </a:xfrm>
+          <a:prstGeom prst="rect">
+            <a:avLst/>
+          </a:prstGeom>
+          <a:noFill/>
+        </p:spPr>
+        <p:txBody>
+          <a:bodyPr wrap="none" rtlCol="0">
+            <a:spAutoFit/>
+          </a:bodyPr>
+          <a:lstStyle/>
+          <a:p>
+            <a:r>
+              <a:rPr lang="en-US" altLang="en-US" sz="1000" dirty="0" smtClean="0">
+                <a:latin typeface="メイリオ"/>
+                <a:ea typeface="メイリオ"/>
+                <a:cs typeface="メイリオ"/>
+              </a:rPr>
+              <a:t>表示件数</a:t>
+            </a:r>
+            <a:endParaRPr kumimoji="1" lang="ja-JP" altLang="en-US" sz="1000" dirty="0">
+              <a:latin typeface="メイリオ"/>
+              <a:ea typeface="メイリオ"/>
+              <a:cs typeface="メイリオ"/>
+            </a:endParaRPr>
+          </a:p>
+        </p:txBody>
+      </p:sp>
+      <p:sp>
+        <p:nvSpPr>
+          <p:cNvPr id="104" name="角丸四角形 103"/>
+          <p:cNvSpPr/>
+          <p:nvPr/>
+        </p:nvSpPr>
+        <p:spPr>
+          <a:xfrm>
+            <a:off x="7832121" y="2169029"/>
+            <a:ext cx="352321" cy="158766"/>
+          </a:xfrm>
+          <a:prstGeom prst="roundRect">
+            <a:avLst/>
+          </a:prstGeom>
+          <a:noFill/>
+          <a:ln w="25400">
+            <a:solidFill>
+              <a:schemeClr val="tx1"/>
+            </a:solidFill>
+          </a:ln>
+          <a:effectLst/>
+        </p:spPr>
+        <p:style>
+          <a:lnRef idx="1">
+            <a:schemeClr val="accent1"/>
+          </a:lnRef>
+          <a:fillRef idx="3">
+            <a:schemeClr val="accent1"/>
+          </a:fillRef>
+          <a:effectRef idx="2">
+            <a:schemeClr val="accent1"/>
+          </a:effectRef>
+          <a:fontRef idx="minor">
+            <a:schemeClr val="lt1"/>
+          </a:fontRef>
+        </p:style>
+        <p:txBody>
+          <a:bodyPr rtlCol="0" anchor="ctr"/>
+          <a:lstStyle/>
+          <a:p>
+            <a:pPr algn="ctr"/>
+            <a:endParaRPr kumimoji="1" lang="ja-JP" altLang="en-US"/>
+          </a:p>
+        </p:txBody>
+      </p:sp>
     </p:spTree>
     <p:extLst>
       <p:ext uri="{BB962C8B-B14F-4D97-AF65-F5344CB8AC3E}">
@@ -9801,14 +9919,14 @@
       </p:grpSpPr>
       <p:graphicFrame>
         <p:nvGraphicFramePr>
-          <p:cNvPr id="74" name="表 73"/>
+          <p:cNvPr id="82" name="表 81"/>
           <p:cNvGraphicFramePr>
             <a:graphicFrameLocks noGrp="1"/>
           </p:cNvGraphicFramePr>
           <p:nvPr>
             <p:extLst>
               <p:ext uri="{D42A27DB-BD31-4B8C-83A1-F6EECF244321}">
-                <p14:modId xmlns:p14="http://schemas.microsoft.com/office/powerpoint/2010/main" val="310339601"/>
+                <p14:modId xmlns:p14="http://schemas.microsoft.com/office/powerpoint/2010/main" val="1214837235"/>
               </p:ext>
             </p:extLst>
           </p:nvPr>
@@ -10303,7 +10421,7 @@
       </p:graphicFrame>
       <p:sp>
         <p:nvSpPr>
-          <p:cNvPr id="75" name="正方形/長方形 74"/>
+          <p:cNvPr id="83" name="正方形/長方形 82"/>
           <p:cNvSpPr/>
           <p:nvPr/>
         </p:nvSpPr>
@@ -10355,7 +10473,7 @@
       </p:sp>
       <p:sp>
         <p:nvSpPr>
-          <p:cNvPr id="76" name="角丸四角形 75"/>
+          <p:cNvPr id="84" name="角丸四角形 83"/>
           <p:cNvSpPr/>
           <p:nvPr/>
         </p:nvSpPr>
@@ -10400,7 +10518,7 @@
       </p:sp>
       <p:sp>
         <p:nvSpPr>
-          <p:cNvPr id="77" name="テキスト ボックス 76"/>
+          <p:cNvPr id="85" name="テキスト ボックス 84"/>
           <p:cNvSpPr txBox="1"/>
           <p:nvPr/>
         </p:nvSpPr>
@@ -10438,7 +10556,7 @@
       </p:sp>
       <p:sp>
         <p:nvSpPr>
-          <p:cNvPr id="78" name="角丸四角形 77"/>
+          <p:cNvPr id="86" name="角丸四角形 85"/>
           <p:cNvSpPr/>
           <p:nvPr/>
         </p:nvSpPr>
@@ -10483,7 +10601,7 @@
       </p:sp>
       <p:sp>
         <p:nvSpPr>
-          <p:cNvPr id="79" name="テキスト ボックス 78"/>
+          <p:cNvPr id="87" name="テキスト ボックス 86"/>
           <p:cNvSpPr txBox="1"/>
           <p:nvPr/>
         </p:nvSpPr>
@@ -10529,7 +10647,7 @@
       </p:sp>
       <p:sp>
         <p:nvSpPr>
-          <p:cNvPr id="80" name="角丸四角形 79"/>
+          <p:cNvPr id="88" name="角丸四角形 87"/>
           <p:cNvSpPr/>
           <p:nvPr/>
         </p:nvSpPr>
@@ -10574,7 +10692,7 @@
       </p:sp>
       <p:sp>
         <p:nvSpPr>
-          <p:cNvPr id="81" name="テキスト ボックス 80"/>
+          <p:cNvPr id="89" name="テキスト ボックス 88"/>
           <p:cNvSpPr txBox="1"/>
           <p:nvPr/>
         </p:nvSpPr>
@@ -10620,7 +10738,7 @@
       </p:sp>
       <p:sp>
         <p:nvSpPr>
-          <p:cNvPr id="137" name="角丸四角形 136"/>
+          <p:cNvPr id="90" name="角丸四角形 89"/>
           <p:cNvSpPr/>
           <p:nvPr/>
         </p:nvSpPr>
@@ -10665,7 +10783,7 @@
       </p:sp>
       <p:sp>
         <p:nvSpPr>
-          <p:cNvPr id="138" name="テキスト ボックス 137"/>
+          <p:cNvPr id="91" name="テキスト ボックス 90"/>
           <p:cNvSpPr txBox="1"/>
           <p:nvPr/>
         </p:nvSpPr>
@@ -10711,7 +10829,7 @@
       </p:sp>
       <p:sp>
         <p:nvSpPr>
-          <p:cNvPr id="139" name="角丸四角形 138"/>
+          <p:cNvPr id="92" name="角丸四角形 91"/>
           <p:cNvSpPr/>
           <p:nvPr/>
         </p:nvSpPr>
@@ -10774,7 +10892,7 @@
       </p:sp>
       <p:cxnSp>
         <p:nvCxnSpPr>
-          <p:cNvPr id="140" name="直線コネクタ 139"/>
+          <p:cNvPr id="93" name="直線コネクタ 92"/>
           <p:cNvCxnSpPr/>
           <p:nvPr/>
         </p:nvCxnSpPr>
@@ -10812,7 +10930,7 @@
       </p:cxnSp>
       <p:sp>
         <p:nvSpPr>
-          <p:cNvPr id="141" name="テキスト ボックス 140"/>
+          <p:cNvPr id="94" name="テキスト ボックス 93"/>
           <p:cNvSpPr txBox="1"/>
           <p:nvPr/>
         </p:nvSpPr>
@@ -10850,7 +10968,7 @@
       </p:sp>
       <p:sp>
         <p:nvSpPr>
-          <p:cNvPr id="142" name="テキスト ボックス 141"/>
+          <p:cNvPr id="95" name="テキスト ボックス 94"/>
           <p:cNvSpPr txBox="1"/>
           <p:nvPr/>
         </p:nvSpPr>
@@ -10888,7 +11006,7 @@
       </p:sp>
       <p:sp>
         <p:nvSpPr>
-          <p:cNvPr id="143" name="テキスト ボックス 142"/>
+          <p:cNvPr id="96" name="テキスト ボックス 95"/>
           <p:cNvSpPr txBox="1"/>
           <p:nvPr/>
         </p:nvSpPr>
@@ -10926,7 +11044,7 @@
       </p:sp>
       <p:sp>
         <p:nvSpPr>
-          <p:cNvPr id="144" name="二等辺三角形 143"/>
+          <p:cNvPr id="97" name="二等辺三角形 96"/>
           <p:cNvSpPr/>
           <p:nvPr/>
         </p:nvSpPr>
@@ -10971,7 +11089,7 @@
       </p:sp>
       <p:sp>
         <p:nvSpPr>
-          <p:cNvPr id="145" name="二等辺三角形 144"/>
+          <p:cNvPr id="98" name="二等辺三角形 97"/>
           <p:cNvSpPr/>
           <p:nvPr/>
         </p:nvSpPr>
@@ -11016,7 +11134,7 @@
       </p:sp>
       <p:sp>
         <p:nvSpPr>
-          <p:cNvPr id="146" name="テキスト ボックス 145"/>
+          <p:cNvPr id="99" name="テキスト ボックス 98"/>
           <p:cNvSpPr txBox="1"/>
           <p:nvPr/>
         </p:nvSpPr>
@@ -11054,7 +11172,7 @@
       </p:sp>
       <p:sp>
         <p:nvSpPr>
-          <p:cNvPr id="147" name="テキスト ボックス 146"/>
+          <p:cNvPr id="100" name="テキスト ボックス 99"/>
           <p:cNvSpPr txBox="1"/>
           <p:nvPr/>
         </p:nvSpPr>
@@ -11148,7 +11266,7 @@
       </p:sp>
       <p:sp>
         <p:nvSpPr>
-          <p:cNvPr id="148" name="二等辺三角形 147"/>
+          <p:cNvPr id="101" name="二等辺三角形 100"/>
           <p:cNvSpPr/>
           <p:nvPr/>
         </p:nvSpPr>
@@ -11193,7 +11311,7 @@
       </p:sp>
       <p:sp>
         <p:nvSpPr>
-          <p:cNvPr id="149" name="二等辺三角形 148"/>
+          <p:cNvPr id="102" name="二等辺三角形 101"/>
           <p:cNvSpPr/>
           <p:nvPr/>
         </p:nvSpPr>
@@ -11238,7 +11356,7 @@
       </p:sp>
       <p:sp>
         <p:nvSpPr>
-          <p:cNvPr id="150" name="二等辺三角形 149"/>
+          <p:cNvPr id="103" name="二等辺三角形 102"/>
           <p:cNvSpPr/>
           <p:nvPr/>
         </p:nvSpPr>
@@ -11283,7 +11401,7 @@
       </p:sp>
       <p:sp>
         <p:nvSpPr>
-          <p:cNvPr id="151" name="二等辺三角形 150"/>
+          <p:cNvPr id="104" name="二等辺三角形 103"/>
           <p:cNvSpPr/>
           <p:nvPr/>
         </p:nvSpPr>
@@ -11328,7 +11446,7 @@
       </p:sp>
       <p:sp>
         <p:nvSpPr>
-          <p:cNvPr id="152" name="角丸四角形 151"/>
+          <p:cNvPr id="105" name="角丸四角形 104"/>
           <p:cNvSpPr/>
           <p:nvPr/>
         </p:nvSpPr>
@@ -11391,7 +11509,7 @@
       </p:sp>
       <p:pic>
         <p:nvPicPr>
-          <p:cNvPr id="153" name="図 152" descr="trash.png"/>
+          <p:cNvPr id="106" name="図 105" descr="trash.png"/>
           <p:cNvPicPr>
             <a:picLocks noChangeAspect="1"/>
           </p:cNvPicPr>
@@ -11421,7 +11539,7 @@
       </p:pic>
       <p:pic>
         <p:nvPicPr>
-          <p:cNvPr id="154" name="図 153" descr="trash.png"/>
+          <p:cNvPr id="107" name="図 106" descr="trash.png"/>
           <p:cNvPicPr>
             <a:picLocks noChangeAspect="1"/>
           </p:cNvPicPr>
@@ -11451,7 +11569,7 @@
       </p:pic>
       <p:pic>
         <p:nvPicPr>
-          <p:cNvPr id="155" name="図 154" descr="trash.png"/>
+          <p:cNvPr id="108" name="図 107" descr="trash.png"/>
           <p:cNvPicPr>
             <a:picLocks noChangeAspect="1"/>
           </p:cNvPicPr>
@@ -11481,7 +11599,7 @@
       </p:pic>
       <p:pic>
         <p:nvPicPr>
-          <p:cNvPr id="156" name="図 155" descr="trash.png"/>
+          <p:cNvPr id="109" name="図 108" descr="trash.png"/>
           <p:cNvPicPr>
             <a:picLocks noChangeAspect="1"/>
           </p:cNvPicPr>
@@ -11511,7 +11629,7 @@
       </p:pic>
       <p:pic>
         <p:nvPicPr>
-          <p:cNvPr id="157" name="図 156" descr="trash.png"/>
+          <p:cNvPr id="110" name="図 109" descr="trash.png"/>
           <p:cNvPicPr>
             <a:picLocks noChangeAspect="1"/>
           </p:cNvPicPr>
@@ -11541,7 +11659,7 @@
       </p:pic>
       <p:pic>
         <p:nvPicPr>
-          <p:cNvPr id="158" name="図 157" descr="trash.png"/>
+          <p:cNvPr id="111" name="図 110" descr="trash.png"/>
           <p:cNvPicPr>
             <a:picLocks noChangeAspect="1"/>
           </p:cNvPicPr>
@@ -11571,7 +11689,7 @@
       </p:pic>
       <p:pic>
         <p:nvPicPr>
-          <p:cNvPr id="159" name="図 158" descr="trash.png"/>
+          <p:cNvPr id="112" name="図 111" descr="trash.png"/>
           <p:cNvPicPr>
             <a:picLocks noChangeAspect="1"/>
           </p:cNvPicPr>
@@ -11601,7 +11719,7 @@
       </p:pic>
       <p:pic>
         <p:nvPicPr>
-          <p:cNvPr id="160" name="図 159" descr="trash.png"/>
+          <p:cNvPr id="113" name="図 112" descr="trash.png"/>
           <p:cNvPicPr>
             <a:picLocks noChangeAspect="1"/>
           </p:cNvPicPr>
@@ -11631,7 +11749,7 @@
       </p:pic>
       <p:pic>
         <p:nvPicPr>
-          <p:cNvPr id="161" name="図 160" descr="trash.png"/>
+          <p:cNvPr id="114" name="図 113" descr="trash.png"/>
           <p:cNvPicPr>
             <a:picLocks noChangeAspect="1"/>
           </p:cNvPicPr>
@@ -11661,7 +11779,7 @@
       </p:pic>
       <p:pic>
         <p:nvPicPr>
-          <p:cNvPr id="162" name="図 161" descr="trash.png"/>
+          <p:cNvPr id="115" name="図 114" descr="trash.png"/>
           <p:cNvPicPr>
             <a:picLocks noChangeAspect="1"/>
           </p:cNvPicPr>
@@ -11691,7 +11809,7 @@
       </p:pic>
       <p:grpSp>
         <p:nvGrpSpPr>
-          <p:cNvPr id="163" name="図形グループ 162"/>
+          <p:cNvPr id="116" name="図形グループ 115"/>
           <p:cNvGrpSpPr/>
           <p:nvPr/>
         </p:nvGrpSpPr>
@@ -11705,7 +11823,7 @@
         </p:grpSpPr>
         <p:sp>
           <p:nvSpPr>
-            <p:cNvPr id="164" name="角丸四角形 163"/>
+            <p:cNvPr id="117" name="角丸四角形 116"/>
             <p:cNvSpPr/>
             <p:nvPr/>
           </p:nvSpPr>
@@ -11754,7 +11872,7 @@
         </p:sp>
         <p:cxnSp>
           <p:nvCxnSpPr>
-            <p:cNvPr id="165" name="直線コネクタ 164"/>
+            <p:cNvPr id="118" name="直線コネクタ 117"/>
             <p:cNvCxnSpPr/>
             <p:nvPr/>
           </p:nvCxnSpPr>
@@ -11789,7 +11907,7 @@
         </p:cxnSp>
         <p:cxnSp>
           <p:nvCxnSpPr>
-            <p:cNvPr id="166" name="直線コネクタ 165"/>
+            <p:cNvPr id="119" name="直線コネクタ 118"/>
             <p:cNvCxnSpPr/>
             <p:nvPr/>
           </p:nvCxnSpPr>
@@ -11824,7 +11942,7 @@
         </p:cxnSp>
         <p:cxnSp>
           <p:nvCxnSpPr>
-            <p:cNvPr id="167" name="直線コネクタ 166"/>
+            <p:cNvPr id="120" name="直線コネクタ 119"/>
             <p:cNvCxnSpPr/>
             <p:nvPr/>
           </p:nvCxnSpPr>
@@ -11860,7 +11978,7 @@
       </p:grpSp>
       <p:cxnSp>
         <p:nvCxnSpPr>
-          <p:cNvPr id="168" name="直線コネクタ 167"/>
+          <p:cNvPr id="121" name="直線コネクタ 120"/>
           <p:cNvCxnSpPr/>
           <p:nvPr/>
         </p:nvCxnSpPr>
@@ -11898,7 +12016,7 @@
       </p:cxnSp>
       <p:sp>
         <p:nvSpPr>
-          <p:cNvPr id="169" name="テキスト ボックス 168"/>
+          <p:cNvPr id="122" name="テキスト ボックス 121"/>
           <p:cNvSpPr txBox="1"/>
           <p:nvPr/>
         </p:nvSpPr>
@@ -11936,7 +12054,7 @@
       </p:sp>
       <p:sp>
         <p:nvSpPr>
-          <p:cNvPr id="170" name="角丸四角形 169"/>
+          <p:cNvPr id="123" name="角丸四角形 122"/>
           <p:cNvSpPr/>
           <p:nvPr/>
         </p:nvSpPr>
@@ -11981,7 +12099,7 @@
       </p:sp>
       <p:sp>
         <p:nvSpPr>
-          <p:cNvPr id="171" name="テキスト ボックス 170"/>
+          <p:cNvPr id="124" name="テキスト ボックス 123"/>
           <p:cNvSpPr txBox="1"/>
           <p:nvPr/>
         </p:nvSpPr>
@@ -12019,7 +12137,7 @@
       </p:sp>
       <p:sp>
         <p:nvSpPr>
-          <p:cNvPr id="172" name="テキスト ボックス 171"/>
+          <p:cNvPr id="125" name="テキスト ボックス 124"/>
           <p:cNvSpPr txBox="1"/>
           <p:nvPr/>
         </p:nvSpPr>
@@ -12065,7 +12183,7 @@
       </p:sp>
       <p:sp>
         <p:nvSpPr>
-          <p:cNvPr id="173" name="角丸四角形 172"/>
+          <p:cNvPr id="126" name="角丸四角形 125"/>
           <p:cNvSpPr/>
           <p:nvPr/>
         </p:nvSpPr>
@@ -12110,7 +12228,7 @@
       </p:sp>
       <p:grpSp>
         <p:nvGrpSpPr>
-          <p:cNvPr id="174" name="図形グループ 173"/>
+          <p:cNvPr id="127" name="図形グループ 126"/>
           <p:cNvGrpSpPr/>
           <p:nvPr/>
         </p:nvGrpSpPr>
@@ -12124,7 +12242,7 @@
         </p:grpSpPr>
         <p:sp>
           <p:nvSpPr>
-            <p:cNvPr id="175" name="角丸四角形 174"/>
+            <p:cNvPr id="128" name="角丸四角形 127"/>
             <p:cNvSpPr/>
             <p:nvPr/>
           </p:nvSpPr>
@@ -12186,7 +12304,7 @@
         </p:sp>
         <p:sp>
           <p:nvSpPr>
-            <p:cNvPr id="176" name="二等辺三角形 175"/>
+            <p:cNvPr id="129" name="二等辺三角形 128"/>
             <p:cNvSpPr/>
             <p:nvPr/>
           </p:nvSpPr>
@@ -12232,7 +12350,7 @@
       </p:grpSp>
       <p:sp>
         <p:nvSpPr>
-          <p:cNvPr id="177" name="テキスト ボックス 176"/>
+          <p:cNvPr id="130" name="テキスト ボックス 129"/>
           <p:cNvSpPr txBox="1"/>
           <p:nvPr/>
         </p:nvSpPr>
@@ -12278,7 +12396,7 @@
       </p:sp>
       <p:sp>
         <p:nvSpPr>
-          <p:cNvPr id="178" name="角丸四角形 177"/>
+          <p:cNvPr id="131" name="角丸四角形 130"/>
           <p:cNvSpPr/>
           <p:nvPr/>
         </p:nvSpPr>
@@ -12323,7 +12441,7 @@
       </p:sp>
       <p:sp>
         <p:nvSpPr>
-          <p:cNvPr id="179" name="テキスト ボックス 178"/>
+          <p:cNvPr id="132" name="テキスト ボックス 131"/>
           <p:cNvSpPr txBox="1"/>
           <p:nvPr/>
         </p:nvSpPr>
@@ -12369,7 +12487,7 @@
       </p:sp>
       <p:sp>
         <p:nvSpPr>
-          <p:cNvPr id="180" name="角丸四角形 179"/>
+          <p:cNvPr id="133" name="角丸四角形 132"/>
           <p:cNvSpPr/>
           <p:nvPr/>
         </p:nvSpPr>
@@ -12414,7 +12532,7 @@
       </p:sp>
       <p:sp>
         <p:nvSpPr>
-          <p:cNvPr id="181" name="角丸四角形 180"/>
+          <p:cNvPr id="134" name="角丸四角形 133"/>
           <p:cNvSpPr/>
           <p:nvPr/>
         </p:nvSpPr>
@@ -12459,7 +12577,7 @@
       </p:sp>
       <p:sp>
         <p:nvSpPr>
-          <p:cNvPr id="182" name="テキスト ボックス 181"/>
+          <p:cNvPr id="135" name="テキスト ボックス 134"/>
           <p:cNvSpPr txBox="1"/>
           <p:nvPr/>
         </p:nvSpPr>
@@ -12497,7 +12615,7 @@
       </p:sp>
       <p:sp>
         <p:nvSpPr>
-          <p:cNvPr id="183" name="角丸四角形 182"/>
+          <p:cNvPr id="136" name="角丸四角形 135"/>
           <p:cNvSpPr/>
           <p:nvPr/>
         </p:nvSpPr>
@@ -12542,7 +12660,7 @@
       </p:sp>
       <p:sp>
         <p:nvSpPr>
-          <p:cNvPr id="200" name="角丸四角形 199"/>
+          <p:cNvPr id="185" name="角丸四角形 184"/>
           <p:cNvSpPr/>
           <p:nvPr/>
         </p:nvSpPr>
@@ -12605,7 +12723,7 @@
       </p:sp>
       <p:grpSp>
         <p:nvGrpSpPr>
-          <p:cNvPr id="201" name="図形グループ 200"/>
+          <p:cNvPr id="186" name="図形グループ 185"/>
           <p:cNvGrpSpPr/>
           <p:nvPr/>
         </p:nvGrpSpPr>
@@ -12619,7 +12737,7 @@
         </p:grpSpPr>
         <p:sp>
           <p:nvSpPr>
-            <p:cNvPr id="202" name="角丸四角形 201"/>
+            <p:cNvPr id="187" name="角丸四角形 186"/>
             <p:cNvSpPr/>
             <p:nvPr/>
           </p:nvSpPr>
@@ -12668,7 +12786,7 @@
         </p:sp>
         <p:cxnSp>
           <p:nvCxnSpPr>
-            <p:cNvPr id="203" name="直線コネクタ 202"/>
+            <p:cNvPr id="188" name="直線コネクタ 187"/>
             <p:cNvCxnSpPr/>
             <p:nvPr/>
           </p:nvCxnSpPr>
@@ -12703,7 +12821,7 @@
         </p:cxnSp>
         <p:cxnSp>
           <p:nvCxnSpPr>
-            <p:cNvPr id="204" name="直線コネクタ 203"/>
+            <p:cNvPr id="189" name="直線コネクタ 188"/>
             <p:cNvCxnSpPr/>
             <p:nvPr/>
           </p:nvCxnSpPr>
@@ -12738,7 +12856,7 @@
         </p:cxnSp>
         <p:cxnSp>
           <p:nvCxnSpPr>
-            <p:cNvPr id="205" name="直線コネクタ 204"/>
+            <p:cNvPr id="190" name="直線コネクタ 189"/>
             <p:cNvCxnSpPr/>
             <p:nvPr/>
           </p:nvCxnSpPr>
@@ -12774,7 +12892,7 @@
       </p:grpSp>
       <p:sp>
         <p:nvSpPr>
-          <p:cNvPr id="206" name="テキスト ボックス 205"/>
+          <p:cNvPr id="191" name="テキスト ボックス 190"/>
           <p:cNvSpPr txBox="1"/>
           <p:nvPr/>
         </p:nvSpPr>
@@ -12812,7 +12930,7 @@
       </p:sp>
       <p:sp>
         <p:nvSpPr>
-          <p:cNvPr id="207" name="テキスト ボックス 206"/>
+          <p:cNvPr id="192" name="テキスト ボックス 191"/>
           <p:cNvSpPr txBox="1"/>
           <p:nvPr/>
         </p:nvSpPr>
@@ -12850,7 +12968,7 @@
       </p:sp>
       <p:sp>
         <p:nvSpPr>
-          <p:cNvPr id="208" name="円/楕円 207"/>
+          <p:cNvPr id="193" name="円/楕円 192"/>
           <p:cNvSpPr/>
           <p:nvPr/>
         </p:nvSpPr>
@@ -12895,7 +13013,7 @@
       </p:sp>
       <p:sp>
         <p:nvSpPr>
-          <p:cNvPr id="209" name="円/楕円 208"/>
+          <p:cNvPr id="194" name="円/楕円 193"/>
           <p:cNvSpPr/>
           <p:nvPr/>
         </p:nvSpPr>
@@ -12940,7 +13058,7 @@
       </p:sp>
       <p:grpSp>
         <p:nvGrpSpPr>
-          <p:cNvPr id="210" name="図形グループ 209"/>
+          <p:cNvPr id="195" name="図形グループ 194"/>
           <p:cNvGrpSpPr/>
           <p:nvPr/>
         </p:nvGrpSpPr>
@@ -12954,7 +13072,7 @@
         </p:grpSpPr>
         <p:sp>
           <p:nvSpPr>
-            <p:cNvPr id="211" name="角丸四角形 210"/>
+            <p:cNvPr id="196" name="角丸四角形 195"/>
             <p:cNvSpPr/>
             <p:nvPr/>
           </p:nvSpPr>
@@ -13005,7 +13123,7 @@
         </p:sp>
         <p:sp>
           <p:nvSpPr>
-            <p:cNvPr id="212" name="二等辺三角形 211"/>
+            <p:cNvPr id="197" name="二等辺三角形 196"/>
             <p:cNvSpPr/>
             <p:nvPr/>
           </p:nvSpPr>
@@ -13051,7 +13169,7 @@
       </p:grpSp>
       <p:sp>
         <p:nvSpPr>
-          <p:cNvPr id="213" name="テキスト ボックス 212"/>
+          <p:cNvPr id="198" name="テキスト ボックス 197"/>
           <p:cNvSpPr txBox="1"/>
           <p:nvPr/>
         </p:nvSpPr>
@@ -13089,7 +13207,7 @@
       </p:sp>
       <p:sp>
         <p:nvSpPr>
-          <p:cNvPr id="214" name="二等辺三角形 213"/>
+          <p:cNvPr id="199" name="二等辺三角形 198"/>
           <p:cNvSpPr/>
           <p:nvPr/>
         </p:nvSpPr>
@@ -13134,7 +13252,7 @@
       </p:sp>
       <p:sp>
         <p:nvSpPr>
-          <p:cNvPr id="215" name="二等辺三角形 214"/>
+          <p:cNvPr id="223" name="二等辺三角形 222"/>
           <p:cNvSpPr/>
           <p:nvPr/>
         </p:nvSpPr>
@@ -13179,7 +13297,7 @@
       </p:sp>
       <p:sp>
         <p:nvSpPr>
-          <p:cNvPr id="216" name="二等辺三角形 215"/>
+          <p:cNvPr id="224" name="二等辺三角形 223"/>
           <p:cNvSpPr/>
           <p:nvPr/>
         </p:nvSpPr>
@@ -13224,7 +13342,7 @@
       </p:sp>
       <p:sp>
         <p:nvSpPr>
-          <p:cNvPr id="217" name="二等辺三角形 216"/>
+          <p:cNvPr id="225" name="二等辺三角形 224"/>
           <p:cNvSpPr/>
           <p:nvPr/>
         </p:nvSpPr>
@@ -13269,7 +13387,7 @@
       </p:sp>
       <p:sp>
         <p:nvSpPr>
-          <p:cNvPr id="218" name="二等辺三角形 217"/>
+          <p:cNvPr id="226" name="二等辺三角形 225"/>
           <p:cNvSpPr/>
           <p:nvPr/>
         </p:nvSpPr>
@@ -13314,7 +13432,7 @@
       </p:sp>
       <p:sp>
         <p:nvSpPr>
-          <p:cNvPr id="219" name="二等辺三角形 218"/>
+          <p:cNvPr id="227" name="二等辺三角形 226"/>
           <p:cNvSpPr/>
           <p:nvPr/>
         </p:nvSpPr>
@@ -13359,7 +13477,7 @@
       </p:sp>
       <p:sp>
         <p:nvSpPr>
-          <p:cNvPr id="220" name="二等辺三角形 219"/>
+          <p:cNvPr id="228" name="二等辺三角形 227"/>
           <p:cNvSpPr/>
           <p:nvPr/>
         </p:nvSpPr>
@@ -13404,7 +13522,7 @@
       </p:sp>
       <p:sp>
         <p:nvSpPr>
-          <p:cNvPr id="221" name="二等辺三角形 220"/>
+          <p:cNvPr id="229" name="二等辺三角形 228"/>
           <p:cNvSpPr/>
           <p:nvPr/>
         </p:nvSpPr>
@@ -13449,7 +13567,90 @@
       </p:sp>
       <p:sp>
         <p:nvSpPr>
-          <p:cNvPr id="222" name="正方形/長方形 221"/>
+          <p:cNvPr id="230" name="テキスト ボックス 229"/>
+          <p:cNvSpPr txBox="1"/>
+          <p:nvPr/>
+        </p:nvSpPr>
+        <p:spPr>
+          <a:xfrm>
+            <a:off x="7120566" y="2122353"/>
+            <a:ext cx="697627" cy="246221"/>
+          </a:xfrm>
+          <a:prstGeom prst="rect">
+            <a:avLst/>
+          </a:prstGeom>
+          <a:noFill/>
+        </p:spPr>
+        <p:txBody>
+          <a:bodyPr wrap="none" rtlCol="0">
+            <a:spAutoFit/>
+          </a:bodyPr>
+          <a:lstStyle/>
+          <a:p>
+            <a:r>
+              <a:rPr lang="en-US" altLang="en-US" sz="1000" dirty="0" smtClean="0">
+                <a:latin typeface="メイリオ"/>
+                <a:ea typeface="メイリオ"/>
+                <a:cs typeface="メイリオ"/>
+              </a:rPr>
+              <a:t>表示件数</a:t>
+            </a:r>
+            <a:endParaRPr kumimoji="1" lang="ja-JP" altLang="en-US" sz="1000" dirty="0">
+              <a:latin typeface="メイリオ"/>
+              <a:ea typeface="メイリオ"/>
+              <a:cs typeface="メイリオ"/>
+            </a:endParaRPr>
+          </a:p>
+        </p:txBody>
+      </p:sp>
+      <p:sp>
+        <p:nvSpPr>
+          <p:cNvPr id="231" name="角丸四角形 230"/>
+          <p:cNvSpPr/>
+          <p:nvPr/>
+        </p:nvSpPr>
+        <p:spPr>
+          <a:xfrm>
+            <a:off x="7832121" y="2169029"/>
+            <a:ext cx="352321" cy="158766"/>
+          </a:xfrm>
+          <a:prstGeom prst="roundRect">
+            <a:avLst/>
+          </a:prstGeom>
+          <a:noFill/>
+          <a:ln w="25400">
+            <a:solidFill>
+              <a:schemeClr val="tx1"/>
+            </a:solidFill>
+          </a:ln>
+          <a:effectLst/>
+        </p:spPr>
+        <p:style>
+          <a:lnRef idx="1">
+            <a:schemeClr val="accent1"/>
+          </a:lnRef>
+          <a:fillRef idx="3">
+            <a:schemeClr val="accent1"/>
+          </a:fillRef>
+          <a:effectRef idx="2">
+            <a:schemeClr val="accent1"/>
+          </a:effectRef>
+          <a:fontRef idx="minor">
+            <a:schemeClr val="lt1"/>
+          </a:fontRef>
+        </p:style>
+        <p:txBody>
+          <a:bodyPr rtlCol="0" anchor="ctr"/>
+          <a:lstStyle/>
+          <a:p>
+            <a:pPr algn="ctr"/>
+            <a:endParaRPr kumimoji="1" lang="ja-JP" altLang="en-US"/>
+          </a:p>
+        </p:txBody>
+      </p:sp>
+      <p:sp>
+        <p:nvSpPr>
+          <p:cNvPr id="232" name="正方形/長方形 231"/>
           <p:cNvSpPr/>
           <p:nvPr/>
         </p:nvSpPr>
@@ -13604,14 +13805,14 @@
       </p:grpSpPr>
       <p:graphicFrame>
         <p:nvGraphicFramePr>
-          <p:cNvPr id="80" name="表 79"/>
+          <p:cNvPr id="102" name="表 101"/>
           <p:cNvGraphicFramePr>
             <a:graphicFrameLocks noGrp="1"/>
           </p:cNvGraphicFramePr>
           <p:nvPr>
             <p:extLst>
               <p:ext uri="{D42A27DB-BD31-4B8C-83A1-F6EECF244321}">
-                <p14:modId xmlns:p14="http://schemas.microsoft.com/office/powerpoint/2010/main" val="1358158467"/>
+                <p14:modId xmlns:p14="http://schemas.microsoft.com/office/powerpoint/2010/main" val="4137401723"/>
               </p:ext>
             </p:extLst>
           </p:nvPr>
@@ -14106,7 +14307,7 @@
       </p:graphicFrame>
       <p:sp>
         <p:nvSpPr>
-          <p:cNvPr id="81" name="正方形/長方形 80"/>
+          <p:cNvPr id="103" name="正方形/長方形 102"/>
           <p:cNvSpPr/>
           <p:nvPr/>
         </p:nvSpPr>
@@ -14158,7 +14359,7 @@
       </p:sp>
       <p:sp>
         <p:nvSpPr>
-          <p:cNvPr id="82" name="角丸四角形 81"/>
+          <p:cNvPr id="104" name="角丸四角形 103"/>
           <p:cNvSpPr/>
           <p:nvPr/>
         </p:nvSpPr>
@@ -14203,7 +14404,7 @@
       </p:sp>
       <p:sp>
         <p:nvSpPr>
-          <p:cNvPr id="83" name="テキスト ボックス 82"/>
+          <p:cNvPr id="105" name="テキスト ボックス 104"/>
           <p:cNvSpPr txBox="1"/>
           <p:nvPr/>
         </p:nvSpPr>
@@ -14241,7 +14442,7 @@
       </p:sp>
       <p:sp>
         <p:nvSpPr>
-          <p:cNvPr id="84" name="角丸四角形 83"/>
+          <p:cNvPr id="106" name="角丸四角形 105"/>
           <p:cNvSpPr/>
           <p:nvPr/>
         </p:nvSpPr>
@@ -14286,7 +14487,7 @@
       </p:sp>
       <p:sp>
         <p:nvSpPr>
-          <p:cNvPr id="85" name="テキスト ボックス 84"/>
+          <p:cNvPr id="107" name="テキスト ボックス 106"/>
           <p:cNvSpPr txBox="1"/>
           <p:nvPr/>
         </p:nvSpPr>
@@ -14332,7 +14533,7 @@
       </p:sp>
       <p:sp>
         <p:nvSpPr>
-          <p:cNvPr id="86" name="角丸四角形 85"/>
+          <p:cNvPr id="108" name="角丸四角形 107"/>
           <p:cNvSpPr/>
           <p:nvPr/>
         </p:nvSpPr>
@@ -14377,7 +14578,7 @@
       </p:sp>
       <p:sp>
         <p:nvSpPr>
-          <p:cNvPr id="87" name="テキスト ボックス 86"/>
+          <p:cNvPr id="109" name="テキスト ボックス 108"/>
           <p:cNvSpPr txBox="1"/>
           <p:nvPr/>
         </p:nvSpPr>
@@ -14423,7 +14624,7 @@
       </p:sp>
       <p:sp>
         <p:nvSpPr>
-          <p:cNvPr id="88" name="角丸四角形 87"/>
+          <p:cNvPr id="110" name="角丸四角形 109"/>
           <p:cNvSpPr/>
           <p:nvPr/>
         </p:nvSpPr>
@@ -14468,7 +14669,7 @@
       </p:sp>
       <p:sp>
         <p:nvSpPr>
-          <p:cNvPr id="89" name="テキスト ボックス 88"/>
+          <p:cNvPr id="111" name="テキスト ボックス 110"/>
           <p:cNvSpPr txBox="1"/>
           <p:nvPr/>
         </p:nvSpPr>
@@ -14514,7 +14715,7 @@
       </p:sp>
       <p:sp>
         <p:nvSpPr>
-          <p:cNvPr id="90" name="角丸四角形 89"/>
+          <p:cNvPr id="112" name="角丸四角形 111"/>
           <p:cNvSpPr/>
           <p:nvPr/>
         </p:nvSpPr>
@@ -14577,7 +14778,7 @@
       </p:sp>
       <p:cxnSp>
         <p:nvCxnSpPr>
-          <p:cNvPr id="91" name="直線コネクタ 90"/>
+          <p:cNvPr id="113" name="直線コネクタ 112"/>
           <p:cNvCxnSpPr/>
           <p:nvPr/>
         </p:nvCxnSpPr>
@@ -14615,7 +14816,7 @@
       </p:cxnSp>
       <p:sp>
         <p:nvSpPr>
-          <p:cNvPr id="92" name="テキスト ボックス 91"/>
+          <p:cNvPr id="114" name="テキスト ボックス 113"/>
           <p:cNvSpPr txBox="1"/>
           <p:nvPr/>
         </p:nvSpPr>
@@ -14653,7 +14854,7 @@
       </p:sp>
       <p:sp>
         <p:nvSpPr>
-          <p:cNvPr id="93" name="テキスト ボックス 92"/>
+          <p:cNvPr id="115" name="テキスト ボックス 114"/>
           <p:cNvSpPr txBox="1"/>
           <p:nvPr/>
         </p:nvSpPr>
@@ -14691,7 +14892,7 @@
       </p:sp>
       <p:sp>
         <p:nvSpPr>
-          <p:cNvPr id="94" name="テキスト ボックス 93"/>
+          <p:cNvPr id="116" name="テキスト ボックス 115"/>
           <p:cNvSpPr txBox="1"/>
           <p:nvPr/>
         </p:nvSpPr>
@@ -14729,7 +14930,7 @@
       </p:sp>
       <p:sp>
         <p:nvSpPr>
-          <p:cNvPr id="95" name="二等辺三角形 94"/>
+          <p:cNvPr id="117" name="二等辺三角形 116"/>
           <p:cNvSpPr/>
           <p:nvPr/>
         </p:nvSpPr>
@@ -14774,7 +14975,7 @@
       </p:sp>
       <p:sp>
         <p:nvSpPr>
-          <p:cNvPr id="96" name="二等辺三角形 95"/>
+          <p:cNvPr id="118" name="二等辺三角形 117"/>
           <p:cNvSpPr/>
           <p:nvPr/>
         </p:nvSpPr>
@@ -14819,7 +15020,7 @@
       </p:sp>
       <p:sp>
         <p:nvSpPr>
-          <p:cNvPr id="97" name="テキスト ボックス 96"/>
+          <p:cNvPr id="119" name="テキスト ボックス 118"/>
           <p:cNvSpPr txBox="1"/>
           <p:nvPr/>
         </p:nvSpPr>
@@ -14857,7 +15058,7 @@
       </p:sp>
       <p:sp>
         <p:nvSpPr>
-          <p:cNvPr id="98" name="テキスト ボックス 97"/>
+          <p:cNvPr id="120" name="テキスト ボックス 119"/>
           <p:cNvSpPr txBox="1"/>
           <p:nvPr/>
         </p:nvSpPr>
@@ -14951,7 +15152,7 @@
       </p:sp>
       <p:sp>
         <p:nvSpPr>
-          <p:cNvPr id="99" name="二等辺三角形 98"/>
+          <p:cNvPr id="121" name="二等辺三角形 120"/>
           <p:cNvSpPr/>
           <p:nvPr/>
         </p:nvSpPr>
@@ -14996,7 +15197,7 @@
       </p:sp>
       <p:sp>
         <p:nvSpPr>
-          <p:cNvPr id="100" name="二等辺三角形 99"/>
+          <p:cNvPr id="122" name="二等辺三角形 121"/>
           <p:cNvSpPr/>
           <p:nvPr/>
         </p:nvSpPr>
@@ -15041,7 +15242,7 @@
       </p:sp>
       <p:sp>
         <p:nvSpPr>
-          <p:cNvPr id="101" name="二等辺三角形 100"/>
+          <p:cNvPr id="123" name="二等辺三角形 122"/>
           <p:cNvSpPr/>
           <p:nvPr/>
         </p:nvSpPr>
@@ -15086,7 +15287,7 @@
       </p:sp>
       <p:sp>
         <p:nvSpPr>
-          <p:cNvPr id="140" name="二等辺三角形 139"/>
+          <p:cNvPr id="124" name="二等辺三角形 123"/>
           <p:cNvSpPr/>
           <p:nvPr/>
         </p:nvSpPr>
@@ -15131,7 +15332,7 @@
       </p:sp>
       <p:sp>
         <p:nvSpPr>
-          <p:cNvPr id="141" name="角丸四角形 140"/>
+          <p:cNvPr id="125" name="角丸四角形 124"/>
           <p:cNvSpPr/>
           <p:nvPr/>
         </p:nvSpPr>
@@ -15194,7 +15395,7 @@
       </p:sp>
       <p:pic>
         <p:nvPicPr>
-          <p:cNvPr id="142" name="図 141" descr="trash.png"/>
+          <p:cNvPr id="126" name="図 125" descr="trash.png"/>
           <p:cNvPicPr>
             <a:picLocks noChangeAspect="1"/>
           </p:cNvPicPr>
@@ -15224,7 +15425,7 @@
       </p:pic>
       <p:pic>
         <p:nvPicPr>
-          <p:cNvPr id="143" name="図 142" descr="trash.png"/>
+          <p:cNvPr id="127" name="図 126" descr="trash.png"/>
           <p:cNvPicPr>
             <a:picLocks noChangeAspect="1"/>
           </p:cNvPicPr>
@@ -15254,7 +15455,7 @@
       </p:pic>
       <p:pic>
         <p:nvPicPr>
-          <p:cNvPr id="144" name="図 143" descr="trash.png"/>
+          <p:cNvPr id="128" name="図 127" descr="trash.png"/>
           <p:cNvPicPr>
             <a:picLocks noChangeAspect="1"/>
           </p:cNvPicPr>
@@ -15284,7 +15485,7 @@
       </p:pic>
       <p:pic>
         <p:nvPicPr>
-          <p:cNvPr id="145" name="図 144" descr="trash.png"/>
+          <p:cNvPr id="129" name="図 128" descr="trash.png"/>
           <p:cNvPicPr>
             <a:picLocks noChangeAspect="1"/>
           </p:cNvPicPr>
@@ -15314,7 +15515,7 @@
       </p:pic>
       <p:pic>
         <p:nvPicPr>
-          <p:cNvPr id="146" name="図 145" descr="trash.png"/>
+          <p:cNvPr id="130" name="図 129" descr="trash.png"/>
           <p:cNvPicPr>
             <a:picLocks noChangeAspect="1"/>
           </p:cNvPicPr>
@@ -15344,7 +15545,7 @@
       </p:pic>
       <p:pic>
         <p:nvPicPr>
-          <p:cNvPr id="147" name="図 146" descr="trash.png"/>
+          <p:cNvPr id="131" name="図 130" descr="trash.png"/>
           <p:cNvPicPr>
             <a:picLocks noChangeAspect="1"/>
           </p:cNvPicPr>
@@ -15374,7 +15575,7 @@
       </p:pic>
       <p:pic>
         <p:nvPicPr>
-          <p:cNvPr id="148" name="図 147" descr="trash.png"/>
+          <p:cNvPr id="132" name="図 131" descr="trash.png"/>
           <p:cNvPicPr>
             <a:picLocks noChangeAspect="1"/>
           </p:cNvPicPr>
@@ -15404,7 +15605,7 @@
       </p:pic>
       <p:pic>
         <p:nvPicPr>
-          <p:cNvPr id="149" name="図 148" descr="trash.png"/>
+          <p:cNvPr id="133" name="図 132" descr="trash.png"/>
           <p:cNvPicPr>
             <a:picLocks noChangeAspect="1"/>
           </p:cNvPicPr>
@@ -15434,7 +15635,7 @@
       </p:pic>
       <p:pic>
         <p:nvPicPr>
-          <p:cNvPr id="150" name="図 149" descr="trash.png"/>
+          <p:cNvPr id="134" name="図 133" descr="trash.png"/>
           <p:cNvPicPr>
             <a:picLocks noChangeAspect="1"/>
           </p:cNvPicPr>
@@ -15464,7 +15665,7 @@
       </p:pic>
       <p:pic>
         <p:nvPicPr>
-          <p:cNvPr id="151" name="図 150" descr="trash.png"/>
+          <p:cNvPr id="135" name="図 134" descr="trash.png"/>
           <p:cNvPicPr>
             <a:picLocks noChangeAspect="1"/>
           </p:cNvPicPr>
@@ -15494,7 +15695,7 @@
       </p:pic>
       <p:grpSp>
         <p:nvGrpSpPr>
-          <p:cNvPr id="152" name="図形グループ 151"/>
+          <p:cNvPr id="136" name="図形グループ 135"/>
           <p:cNvGrpSpPr/>
           <p:nvPr/>
         </p:nvGrpSpPr>
@@ -15508,7 +15709,7 @@
         </p:grpSpPr>
         <p:sp>
           <p:nvSpPr>
-            <p:cNvPr id="153" name="角丸四角形 152"/>
+            <p:cNvPr id="137" name="角丸四角形 136"/>
             <p:cNvSpPr/>
             <p:nvPr/>
           </p:nvSpPr>
@@ -15557,7 +15758,7 @@
         </p:sp>
         <p:cxnSp>
           <p:nvCxnSpPr>
-            <p:cNvPr id="154" name="直線コネクタ 153"/>
+            <p:cNvPr id="138" name="直線コネクタ 137"/>
             <p:cNvCxnSpPr/>
             <p:nvPr/>
           </p:nvCxnSpPr>
@@ -15592,7 +15793,7 @@
         </p:cxnSp>
         <p:cxnSp>
           <p:nvCxnSpPr>
-            <p:cNvPr id="155" name="直線コネクタ 154"/>
+            <p:cNvPr id="139" name="直線コネクタ 138"/>
             <p:cNvCxnSpPr/>
             <p:nvPr/>
           </p:nvCxnSpPr>
@@ -15627,7 +15828,7 @@
         </p:cxnSp>
         <p:cxnSp>
           <p:nvCxnSpPr>
-            <p:cNvPr id="156" name="直線コネクタ 155"/>
+            <p:cNvPr id="195" name="直線コネクタ 194"/>
             <p:cNvCxnSpPr/>
             <p:nvPr/>
           </p:nvCxnSpPr>
@@ -15663,7 +15864,7 @@
       </p:grpSp>
       <p:cxnSp>
         <p:nvCxnSpPr>
-          <p:cNvPr id="157" name="直線コネクタ 156"/>
+          <p:cNvPr id="196" name="直線コネクタ 195"/>
           <p:cNvCxnSpPr/>
           <p:nvPr/>
         </p:nvCxnSpPr>
@@ -15701,7 +15902,7 @@
       </p:cxnSp>
       <p:sp>
         <p:nvSpPr>
-          <p:cNvPr id="158" name="テキスト ボックス 157"/>
+          <p:cNvPr id="197" name="テキスト ボックス 196"/>
           <p:cNvSpPr txBox="1"/>
           <p:nvPr/>
         </p:nvSpPr>
@@ -15739,7 +15940,7 @@
       </p:sp>
       <p:sp>
         <p:nvSpPr>
-          <p:cNvPr id="159" name="角丸四角形 158"/>
+          <p:cNvPr id="198" name="角丸四角形 197"/>
           <p:cNvSpPr/>
           <p:nvPr/>
         </p:nvSpPr>
@@ -15784,7 +15985,7 @@
       </p:sp>
       <p:sp>
         <p:nvSpPr>
-          <p:cNvPr id="160" name="テキスト ボックス 159"/>
+          <p:cNvPr id="199" name="テキスト ボックス 198"/>
           <p:cNvSpPr txBox="1"/>
           <p:nvPr/>
         </p:nvSpPr>
@@ -15822,7 +16023,7 @@
       </p:sp>
       <p:sp>
         <p:nvSpPr>
-          <p:cNvPr id="161" name="テキスト ボックス 160"/>
+          <p:cNvPr id="200" name="テキスト ボックス 199"/>
           <p:cNvSpPr txBox="1"/>
           <p:nvPr/>
         </p:nvSpPr>
@@ -15868,7 +16069,7 @@
       </p:sp>
       <p:sp>
         <p:nvSpPr>
-          <p:cNvPr id="162" name="角丸四角形 161"/>
+          <p:cNvPr id="201" name="角丸四角形 200"/>
           <p:cNvSpPr/>
           <p:nvPr/>
         </p:nvSpPr>
@@ -15913,7 +16114,7 @@
       </p:sp>
       <p:grpSp>
         <p:nvGrpSpPr>
-          <p:cNvPr id="163" name="図形グループ 162"/>
+          <p:cNvPr id="202" name="図形グループ 201"/>
           <p:cNvGrpSpPr/>
           <p:nvPr/>
         </p:nvGrpSpPr>
@@ -15927,7 +16128,7 @@
         </p:grpSpPr>
         <p:sp>
           <p:nvSpPr>
-            <p:cNvPr id="164" name="角丸四角形 163"/>
+            <p:cNvPr id="203" name="角丸四角形 202"/>
             <p:cNvSpPr/>
             <p:nvPr/>
           </p:nvSpPr>
@@ -15989,7 +16190,7 @@
         </p:sp>
         <p:sp>
           <p:nvSpPr>
-            <p:cNvPr id="165" name="二等辺三角形 164"/>
+            <p:cNvPr id="204" name="二等辺三角形 203"/>
             <p:cNvSpPr/>
             <p:nvPr/>
           </p:nvSpPr>
@@ -16035,7 +16236,7 @@
       </p:grpSp>
       <p:sp>
         <p:nvSpPr>
-          <p:cNvPr id="166" name="テキスト ボックス 165"/>
+          <p:cNvPr id="205" name="テキスト ボックス 204"/>
           <p:cNvSpPr txBox="1"/>
           <p:nvPr/>
         </p:nvSpPr>
@@ -16081,7 +16282,7 @@
       </p:sp>
       <p:sp>
         <p:nvSpPr>
-          <p:cNvPr id="167" name="角丸四角形 166"/>
+          <p:cNvPr id="206" name="角丸四角形 205"/>
           <p:cNvSpPr/>
           <p:nvPr/>
         </p:nvSpPr>
@@ -16126,7 +16327,7 @@
       </p:sp>
       <p:sp>
         <p:nvSpPr>
-          <p:cNvPr id="168" name="テキスト ボックス 167"/>
+          <p:cNvPr id="207" name="テキスト ボックス 206"/>
           <p:cNvSpPr txBox="1"/>
           <p:nvPr/>
         </p:nvSpPr>
@@ -16172,7 +16373,7 @@
       </p:sp>
       <p:sp>
         <p:nvSpPr>
-          <p:cNvPr id="169" name="角丸四角形 168"/>
+          <p:cNvPr id="208" name="角丸四角形 207"/>
           <p:cNvSpPr/>
           <p:nvPr/>
         </p:nvSpPr>
@@ -16217,7 +16418,7 @@
       </p:sp>
       <p:sp>
         <p:nvSpPr>
-          <p:cNvPr id="170" name="角丸四角形 169"/>
+          <p:cNvPr id="209" name="角丸四角形 208"/>
           <p:cNvSpPr/>
           <p:nvPr/>
         </p:nvSpPr>
@@ -16262,7 +16463,7 @@
       </p:sp>
       <p:sp>
         <p:nvSpPr>
-          <p:cNvPr id="171" name="テキスト ボックス 170"/>
+          <p:cNvPr id="210" name="テキスト ボックス 209"/>
           <p:cNvSpPr txBox="1"/>
           <p:nvPr/>
         </p:nvSpPr>
@@ -16300,7 +16501,7 @@
       </p:sp>
       <p:sp>
         <p:nvSpPr>
-          <p:cNvPr id="172" name="角丸四角形 171"/>
+          <p:cNvPr id="211" name="角丸四角形 210"/>
           <p:cNvSpPr/>
           <p:nvPr/>
         </p:nvSpPr>
@@ -16345,7 +16546,7 @@
       </p:sp>
       <p:sp>
         <p:nvSpPr>
-          <p:cNvPr id="173" name="角丸四角形 172"/>
+          <p:cNvPr id="212" name="角丸四角形 211"/>
           <p:cNvSpPr/>
           <p:nvPr/>
         </p:nvSpPr>
@@ -16408,7 +16609,7 @@
       </p:sp>
       <p:grpSp>
         <p:nvGrpSpPr>
-          <p:cNvPr id="174" name="図形グループ 173"/>
+          <p:cNvPr id="213" name="図形グループ 212"/>
           <p:cNvGrpSpPr/>
           <p:nvPr/>
         </p:nvGrpSpPr>
@@ -16422,7 +16623,7 @@
         </p:grpSpPr>
         <p:sp>
           <p:nvSpPr>
-            <p:cNvPr id="175" name="角丸四角形 174"/>
+            <p:cNvPr id="214" name="角丸四角形 213"/>
             <p:cNvSpPr/>
             <p:nvPr/>
           </p:nvSpPr>
@@ -16471,7 +16672,7 @@
         </p:sp>
         <p:cxnSp>
           <p:nvCxnSpPr>
-            <p:cNvPr id="176" name="直線コネクタ 175"/>
+            <p:cNvPr id="215" name="直線コネクタ 214"/>
             <p:cNvCxnSpPr/>
             <p:nvPr/>
           </p:nvCxnSpPr>
@@ -16506,7 +16707,7 @@
         </p:cxnSp>
         <p:cxnSp>
           <p:nvCxnSpPr>
-            <p:cNvPr id="177" name="直線コネクタ 176"/>
+            <p:cNvPr id="216" name="直線コネクタ 215"/>
             <p:cNvCxnSpPr/>
             <p:nvPr/>
           </p:nvCxnSpPr>
@@ -16541,7 +16742,7 @@
         </p:cxnSp>
         <p:cxnSp>
           <p:nvCxnSpPr>
-            <p:cNvPr id="178" name="直線コネクタ 177"/>
+            <p:cNvPr id="217" name="直線コネクタ 216"/>
             <p:cNvCxnSpPr/>
             <p:nvPr/>
           </p:nvCxnSpPr>
@@ -16577,7 +16778,7 @@
       </p:grpSp>
       <p:sp>
         <p:nvSpPr>
-          <p:cNvPr id="179" name="テキスト ボックス 178"/>
+          <p:cNvPr id="218" name="テキスト ボックス 217"/>
           <p:cNvSpPr txBox="1"/>
           <p:nvPr/>
         </p:nvSpPr>
@@ -16615,7 +16816,7 @@
       </p:sp>
       <p:sp>
         <p:nvSpPr>
-          <p:cNvPr id="180" name="テキスト ボックス 179"/>
+          <p:cNvPr id="219" name="テキスト ボックス 218"/>
           <p:cNvSpPr txBox="1"/>
           <p:nvPr/>
         </p:nvSpPr>
@@ -16653,7 +16854,7 @@
       </p:sp>
       <p:sp>
         <p:nvSpPr>
-          <p:cNvPr id="181" name="円/楕円 180"/>
+          <p:cNvPr id="220" name="円/楕円 219"/>
           <p:cNvSpPr/>
           <p:nvPr/>
         </p:nvSpPr>
@@ -16698,7 +16899,7 @@
       </p:sp>
       <p:sp>
         <p:nvSpPr>
-          <p:cNvPr id="182" name="円/楕円 181"/>
+          <p:cNvPr id="221" name="円/楕円 220"/>
           <p:cNvSpPr/>
           <p:nvPr/>
         </p:nvSpPr>
@@ -16743,7 +16944,7 @@
       </p:sp>
       <p:grpSp>
         <p:nvGrpSpPr>
-          <p:cNvPr id="183" name="図形グループ 182"/>
+          <p:cNvPr id="222" name="図形グループ 221"/>
           <p:cNvGrpSpPr/>
           <p:nvPr/>
         </p:nvGrpSpPr>
@@ -16757,7 +16958,7 @@
         </p:grpSpPr>
         <p:sp>
           <p:nvSpPr>
-            <p:cNvPr id="184" name="角丸四角形 183"/>
+            <p:cNvPr id="223" name="角丸四角形 222"/>
             <p:cNvSpPr/>
             <p:nvPr/>
           </p:nvSpPr>
@@ -16808,7 +17009,7 @@
         </p:sp>
         <p:sp>
           <p:nvSpPr>
-            <p:cNvPr id="185" name="二等辺三角形 184"/>
+            <p:cNvPr id="224" name="二等辺三角形 223"/>
             <p:cNvSpPr/>
             <p:nvPr/>
           </p:nvSpPr>
@@ -16854,7 +17055,7 @@
       </p:grpSp>
       <p:sp>
         <p:nvSpPr>
-          <p:cNvPr id="186" name="テキスト ボックス 185"/>
+          <p:cNvPr id="225" name="テキスト ボックス 224"/>
           <p:cNvSpPr txBox="1"/>
           <p:nvPr/>
         </p:nvSpPr>
@@ -16892,7 +17093,7 @@
       </p:sp>
       <p:sp>
         <p:nvSpPr>
-          <p:cNvPr id="187" name="二等辺三角形 186"/>
+          <p:cNvPr id="226" name="二等辺三角形 225"/>
           <p:cNvSpPr/>
           <p:nvPr/>
         </p:nvSpPr>
@@ -16937,7 +17138,7 @@
       </p:sp>
       <p:sp>
         <p:nvSpPr>
-          <p:cNvPr id="227" name="二等辺三角形 226"/>
+          <p:cNvPr id="235" name="二等辺三角形 234"/>
           <p:cNvSpPr/>
           <p:nvPr/>
         </p:nvSpPr>
@@ -16982,7 +17183,7 @@
       </p:sp>
       <p:sp>
         <p:nvSpPr>
-          <p:cNvPr id="228" name="二等辺三角形 227"/>
+          <p:cNvPr id="236" name="二等辺三角形 235"/>
           <p:cNvSpPr/>
           <p:nvPr/>
         </p:nvSpPr>
@@ -17027,7 +17228,7 @@
       </p:sp>
       <p:sp>
         <p:nvSpPr>
-          <p:cNvPr id="229" name="二等辺三角形 228"/>
+          <p:cNvPr id="237" name="二等辺三角形 236"/>
           <p:cNvSpPr/>
           <p:nvPr/>
         </p:nvSpPr>
@@ -17072,7 +17273,7 @@
       </p:sp>
       <p:sp>
         <p:nvSpPr>
-          <p:cNvPr id="230" name="二等辺三角形 229"/>
+          <p:cNvPr id="238" name="二等辺三角形 237"/>
           <p:cNvSpPr/>
           <p:nvPr/>
         </p:nvSpPr>
@@ -17117,7 +17318,7 @@
       </p:sp>
       <p:sp>
         <p:nvSpPr>
-          <p:cNvPr id="231" name="二等辺三角形 230"/>
+          <p:cNvPr id="239" name="二等辺三角形 238"/>
           <p:cNvSpPr/>
           <p:nvPr/>
         </p:nvSpPr>
@@ -17162,7 +17363,7 @@
       </p:sp>
       <p:sp>
         <p:nvSpPr>
-          <p:cNvPr id="232" name="二等辺三角形 231"/>
+          <p:cNvPr id="240" name="二等辺三角形 239"/>
           <p:cNvSpPr/>
           <p:nvPr/>
         </p:nvSpPr>
@@ -17207,7 +17408,7 @@
       </p:sp>
       <p:sp>
         <p:nvSpPr>
-          <p:cNvPr id="233" name="二等辺三角形 232"/>
+          <p:cNvPr id="241" name="二等辺三角形 240"/>
           <p:cNvSpPr/>
           <p:nvPr/>
         </p:nvSpPr>
@@ -17252,7 +17453,90 @@
       </p:sp>
       <p:sp>
         <p:nvSpPr>
-          <p:cNvPr id="234" name="正方形/長方形 233"/>
+          <p:cNvPr id="242" name="テキスト ボックス 241"/>
+          <p:cNvSpPr txBox="1"/>
+          <p:nvPr/>
+        </p:nvSpPr>
+        <p:spPr>
+          <a:xfrm>
+            <a:off x="7120566" y="2122353"/>
+            <a:ext cx="697627" cy="246221"/>
+          </a:xfrm>
+          <a:prstGeom prst="rect">
+            <a:avLst/>
+          </a:prstGeom>
+          <a:noFill/>
+        </p:spPr>
+        <p:txBody>
+          <a:bodyPr wrap="none" rtlCol="0">
+            <a:spAutoFit/>
+          </a:bodyPr>
+          <a:lstStyle/>
+          <a:p>
+            <a:r>
+              <a:rPr lang="en-US" altLang="en-US" sz="1000" dirty="0" smtClean="0">
+                <a:latin typeface="メイリオ"/>
+                <a:ea typeface="メイリオ"/>
+                <a:cs typeface="メイリオ"/>
+              </a:rPr>
+              <a:t>表示件数</a:t>
+            </a:r>
+            <a:endParaRPr kumimoji="1" lang="ja-JP" altLang="en-US" sz="1000" dirty="0">
+              <a:latin typeface="メイリオ"/>
+              <a:ea typeface="メイリオ"/>
+              <a:cs typeface="メイリオ"/>
+            </a:endParaRPr>
+          </a:p>
+        </p:txBody>
+      </p:sp>
+      <p:sp>
+        <p:nvSpPr>
+          <p:cNvPr id="243" name="角丸四角形 242"/>
+          <p:cNvSpPr/>
+          <p:nvPr/>
+        </p:nvSpPr>
+        <p:spPr>
+          <a:xfrm>
+            <a:off x="7832121" y="2169029"/>
+            <a:ext cx="352321" cy="158766"/>
+          </a:xfrm>
+          <a:prstGeom prst="roundRect">
+            <a:avLst/>
+          </a:prstGeom>
+          <a:noFill/>
+          <a:ln w="25400">
+            <a:solidFill>
+              <a:schemeClr val="tx1"/>
+            </a:solidFill>
+          </a:ln>
+          <a:effectLst/>
+        </p:spPr>
+        <p:style>
+          <a:lnRef idx="1">
+            <a:schemeClr val="accent1"/>
+          </a:lnRef>
+          <a:fillRef idx="3">
+            <a:schemeClr val="accent1"/>
+          </a:fillRef>
+          <a:effectRef idx="2">
+            <a:schemeClr val="accent1"/>
+          </a:effectRef>
+          <a:fontRef idx="minor">
+            <a:schemeClr val="lt1"/>
+          </a:fontRef>
+        </p:style>
+        <p:txBody>
+          <a:bodyPr rtlCol="0" anchor="ctr"/>
+          <a:lstStyle/>
+          <a:p>
+            <a:pPr algn="ctr"/>
+            <a:endParaRPr kumimoji="1" lang="ja-JP" altLang="en-US"/>
+          </a:p>
+        </p:txBody>
+      </p:sp>
+      <p:sp>
+        <p:nvSpPr>
+          <p:cNvPr id="244" name="正方形/長方形 243"/>
           <p:cNvSpPr/>
           <p:nvPr/>
         </p:nvSpPr>
@@ -17720,14 +18004,14 @@
       </p:grpSpPr>
       <p:graphicFrame>
         <p:nvGraphicFramePr>
-          <p:cNvPr id="79" name="表 78"/>
+          <p:cNvPr id="102" name="表 101"/>
           <p:cNvGraphicFramePr>
             <a:graphicFrameLocks noGrp="1"/>
           </p:cNvGraphicFramePr>
           <p:nvPr>
             <p:extLst>
               <p:ext uri="{D42A27DB-BD31-4B8C-83A1-F6EECF244321}">
-                <p14:modId xmlns:p14="http://schemas.microsoft.com/office/powerpoint/2010/main" val="1627573183"/>
+                <p14:modId xmlns:p14="http://schemas.microsoft.com/office/powerpoint/2010/main" val="138950308"/>
               </p:ext>
             </p:extLst>
           </p:nvPr>
@@ -18222,7 +18506,7 @@
       </p:graphicFrame>
       <p:sp>
         <p:nvSpPr>
-          <p:cNvPr id="80" name="正方形/長方形 79"/>
+          <p:cNvPr id="103" name="正方形/長方形 102"/>
           <p:cNvSpPr/>
           <p:nvPr/>
         </p:nvSpPr>
@@ -18274,7 +18558,7 @@
       </p:sp>
       <p:sp>
         <p:nvSpPr>
-          <p:cNvPr id="81" name="角丸四角形 80"/>
+          <p:cNvPr id="104" name="角丸四角形 103"/>
           <p:cNvSpPr/>
           <p:nvPr/>
         </p:nvSpPr>
@@ -18319,7 +18603,7 @@
       </p:sp>
       <p:sp>
         <p:nvSpPr>
-          <p:cNvPr id="82" name="テキスト ボックス 81"/>
+          <p:cNvPr id="105" name="テキスト ボックス 104"/>
           <p:cNvSpPr txBox="1"/>
           <p:nvPr/>
         </p:nvSpPr>
@@ -18357,7 +18641,7 @@
       </p:sp>
       <p:sp>
         <p:nvSpPr>
-          <p:cNvPr id="83" name="角丸四角形 82"/>
+          <p:cNvPr id="106" name="角丸四角形 105"/>
           <p:cNvSpPr/>
           <p:nvPr/>
         </p:nvSpPr>
@@ -18402,7 +18686,7 @@
       </p:sp>
       <p:sp>
         <p:nvSpPr>
-          <p:cNvPr id="84" name="テキスト ボックス 83"/>
+          <p:cNvPr id="107" name="テキスト ボックス 106"/>
           <p:cNvSpPr txBox="1"/>
           <p:nvPr/>
         </p:nvSpPr>
@@ -18448,7 +18732,7 @@
       </p:sp>
       <p:sp>
         <p:nvSpPr>
-          <p:cNvPr id="85" name="角丸四角形 84"/>
+          <p:cNvPr id="108" name="角丸四角形 107"/>
           <p:cNvSpPr/>
           <p:nvPr/>
         </p:nvSpPr>
@@ -18493,7 +18777,7 @@
       </p:sp>
       <p:sp>
         <p:nvSpPr>
-          <p:cNvPr id="86" name="テキスト ボックス 85"/>
+          <p:cNvPr id="109" name="テキスト ボックス 108"/>
           <p:cNvSpPr txBox="1"/>
           <p:nvPr/>
         </p:nvSpPr>
@@ -18539,7 +18823,7 @@
       </p:sp>
       <p:sp>
         <p:nvSpPr>
-          <p:cNvPr id="87" name="角丸四角形 86"/>
+          <p:cNvPr id="110" name="角丸四角形 109"/>
           <p:cNvSpPr/>
           <p:nvPr/>
         </p:nvSpPr>
@@ -18584,7 +18868,7 @@
       </p:sp>
       <p:sp>
         <p:nvSpPr>
-          <p:cNvPr id="88" name="テキスト ボックス 87"/>
+          <p:cNvPr id="111" name="テキスト ボックス 110"/>
           <p:cNvSpPr txBox="1"/>
           <p:nvPr/>
         </p:nvSpPr>
@@ -18630,7 +18914,7 @@
       </p:sp>
       <p:sp>
         <p:nvSpPr>
-          <p:cNvPr id="89" name="角丸四角形 88"/>
+          <p:cNvPr id="112" name="角丸四角形 111"/>
           <p:cNvSpPr/>
           <p:nvPr/>
         </p:nvSpPr>
@@ -18693,7 +18977,7 @@
       </p:sp>
       <p:cxnSp>
         <p:nvCxnSpPr>
-          <p:cNvPr id="90" name="直線コネクタ 89"/>
+          <p:cNvPr id="113" name="直線コネクタ 112"/>
           <p:cNvCxnSpPr/>
           <p:nvPr/>
         </p:nvCxnSpPr>
@@ -18731,7 +19015,7 @@
       </p:cxnSp>
       <p:sp>
         <p:nvSpPr>
-          <p:cNvPr id="91" name="テキスト ボックス 90"/>
+          <p:cNvPr id="114" name="テキスト ボックス 113"/>
           <p:cNvSpPr txBox="1"/>
           <p:nvPr/>
         </p:nvSpPr>
@@ -18769,7 +19053,7 @@
       </p:sp>
       <p:sp>
         <p:nvSpPr>
-          <p:cNvPr id="92" name="テキスト ボックス 91"/>
+          <p:cNvPr id="115" name="テキスト ボックス 114"/>
           <p:cNvSpPr txBox="1"/>
           <p:nvPr/>
         </p:nvSpPr>
@@ -18807,7 +19091,7 @@
       </p:sp>
       <p:sp>
         <p:nvSpPr>
-          <p:cNvPr id="93" name="テキスト ボックス 92"/>
+          <p:cNvPr id="116" name="テキスト ボックス 115"/>
           <p:cNvSpPr txBox="1"/>
           <p:nvPr/>
         </p:nvSpPr>
@@ -18845,7 +19129,7 @@
       </p:sp>
       <p:sp>
         <p:nvSpPr>
-          <p:cNvPr id="94" name="二等辺三角形 93"/>
+          <p:cNvPr id="117" name="二等辺三角形 116"/>
           <p:cNvSpPr/>
           <p:nvPr/>
         </p:nvSpPr>
@@ -18890,7 +19174,7 @@
       </p:sp>
       <p:sp>
         <p:nvSpPr>
-          <p:cNvPr id="95" name="二等辺三角形 94"/>
+          <p:cNvPr id="118" name="二等辺三角形 117"/>
           <p:cNvSpPr/>
           <p:nvPr/>
         </p:nvSpPr>
@@ -18935,7 +19219,7 @@
       </p:sp>
       <p:sp>
         <p:nvSpPr>
-          <p:cNvPr id="96" name="テキスト ボックス 95"/>
+          <p:cNvPr id="119" name="テキスト ボックス 118"/>
           <p:cNvSpPr txBox="1"/>
           <p:nvPr/>
         </p:nvSpPr>
@@ -18973,7 +19257,7 @@
       </p:sp>
       <p:sp>
         <p:nvSpPr>
-          <p:cNvPr id="97" name="テキスト ボックス 96"/>
+          <p:cNvPr id="120" name="テキスト ボックス 119"/>
           <p:cNvSpPr txBox="1"/>
           <p:nvPr/>
         </p:nvSpPr>
@@ -19067,7 +19351,7 @@
       </p:sp>
       <p:sp>
         <p:nvSpPr>
-          <p:cNvPr id="98" name="二等辺三角形 97"/>
+          <p:cNvPr id="121" name="二等辺三角形 120"/>
           <p:cNvSpPr/>
           <p:nvPr/>
         </p:nvSpPr>
@@ -19112,7 +19396,7 @@
       </p:sp>
       <p:sp>
         <p:nvSpPr>
-          <p:cNvPr id="99" name="二等辺三角形 98"/>
+          <p:cNvPr id="122" name="二等辺三角形 121"/>
           <p:cNvSpPr/>
           <p:nvPr/>
         </p:nvSpPr>
@@ -19157,7 +19441,7 @@
       </p:sp>
       <p:sp>
         <p:nvSpPr>
-          <p:cNvPr id="100" name="二等辺三角形 99"/>
+          <p:cNvPr id="123" name="二等辺三角形 122"/>
           <p:cNvSpPr/>
           <p:nvPr/>
         </p:nvSpPr>
@@ -19202,7 +19486,7 @@
       </p:sp>
       <p:sp>
         <p:nvSpPr>
-          <p:cNvPr id="101" name="二等辺三角形 100"/>
+          <p:cNvPr id="124" name="二等辺三角形 123"/>
           <p:cNvSpPr/>
           <p:nvPr/>
         </p:nvSpPr>
@@ -19247,7 +19531,7 @@
       </p:sp>
       <p:sp>
         <p:nvSpPr>
-          <p:cNvPr id="140" name="角丸四角形 139"/>
+          <p:cNvPr id="125" name="角丸四角形 124"/>
           <p:cNvSpPr/>
           <p:nvPr/>
         </p:nvSpPr>
@@ -19310,7 +19594,7 @@
       </p:sp>
       <p:pic>
         <p:nvPicPr>
-          <p:cNvPr id="141" name="図 140" descr="trash.png"/>
+          <p:cNvPr id="126" name="図 125" descr="trash.png"/>
           <p:cNvPicPr>
             <a:picLocks noChangeAspect="1"/>
           </p:cNvPicPr>
@@ -19340,7 +19624,7 @@
       </p:pic>
       <p:pic>
         <p:nvPicPr>
-          <p:cNvPr id="142" name="図 141" descr="trash.png"/>
+          <p:cNvPr id="127" name="図 126" descr="trash.png"/>
           <p:cNvPicPr>
             <a:picLocks noChangeAspect="1"/>
           </p:cNvPicPr>
@@ -19370,7 +19654,7 @@
       </p:pic>
       <p:pic>
         <p:nvPicPr>
-          <p:cNvPr id="143" name="図 142" descr="trash.png"/>
+          <p:cNvPr id="128" name="図 127" descr="trash.png"/>
           <p:cNvPicPr>
             <a:picLocks noChangeAspect="1"/>
           </p:cNvPicPr>
@@ -19400,7 +19684,7 @@
       </p:pic>
       <p:pic>
         <p:nvPicPr>
-          <p:cNvPr id="144" name="図 143" descr="trash.png"/>
+          <p:cNvPr id="129" name="図 128" descr="trash.png"/>
           <p:cNvPicPr>
             <a:picLocks noChangeAspect="1"/>
           </p:cNvPicPr>
@@ -19430,7 +19714,7 @@
       </p:pic>
       <p:pic>
         <p:nvPicPr>
-          <p:cNvPr id="145" name="図 144" descr="trash.png"/>
+          <p:cNvPr id="130" name="図 129" descr="trash.png"/>
           <p:cNvPicPr>
             <a:picLocks noChangeAspect="1"/>
           </p:cNvPicPr>
@@ -19460,7 +19744,7 @@
       </p:pic>
       <p:pic>
         <p:nvPicPr>
-          <p:cNvPr id="146" name="図 145" descr="trash.png"/>
+          <p:cNvPr id="131" name="図 130" descr="trash.png"/>
           <p:cNvPicPr>
             <a:picLocks noChangeAspect="1"/>
           </p:cNvPicPr>
@@ -19490,7 +19774,7 @@
       </p:pic>
       <p:pic>
         <p:nvPicPr>
-          <p:cNvPr id="147" name="図 146" descr="trash.png"/>
+          <p:cNvPr id="132" name="図 131" descr="trash.png"/>
           <p:cNvPicPr>
             <a:picLocks noChangeAspect="1"/>
           </p:cNvPicPr>
@@ -19520,7 +19804,7 @@
       </p:pic>
       <p:pic>
         <p:nvPicPr>
-          <p:cNvPr id="148" name="図 147" descr="trash.png"/>
+          <p:cNvPr id="133" name="図 132" descr="trash.png"/>
           <p:cNvPicPr>
             <a:picLocks noChangeAspect="1"/>
           </p:cNvPicPr>
@@ -19550,7 +19834,7 @@
       </p:pic>
       <p:pic>
         <p:nvPicPr>
-          <p:cNvPr id="149" name="図 148" descr="trash.png"/>
+          <p:cNvPr id="134" name="図 133" descr="trash.png"/>
           <p:cNvPicPr>
             <a:picLocks noChangeAspect="1"/>
           </p:cNvPicPr>
@@ -19580,7 +19864,7 @@
       </p:pic>
       <p:pic>
         <p:nvPicPr>
-          <p:cNvPr id="150" name="図 149" descr="trash.png"/>
+          <p:cNvPr id="135" name="図 134" descr="trash.png"/>
           <p:cNvPicPr>
             <a:picLocks noChangeAspect="1"/>
           </p:cNvPicPr>
@@ -19610,7 +19894,7 @@
       </p:pic>
       <p:grpSp>
         <p:nvGrpSpPr>
-          <p:cNvPr id="151" name="図形グループ 150"/>
+          <p:cNvPr id="136" name="図形グループ 135"/>
           <p:cNvGrpSpPr/>
           <p:nvPr/>
         </p:nvGrpSpPr>
@@ -19624,7 +19908,7 @@
         </p:grpSpPr>
         <p:sp>
           <p:nvSpPr>
-            <p:cNvPr id="152" name="角丸四角形 151"/>
+            <p:cNvPr id="137" name="角丸四角形 136"/>
             <p:cNvSpPr/>
             <p:nvPr/>
           </p:nvSpPr>
@@ -19673,7 +19957,7 @@
         </p:sp>
         <p:cxnSp>
           <p:nvCxnSpPr>
-            <p:cNvPr id="153" name="直線コネクタ 152"/>
+            <p:cNvPr id="138" name="直線コネクタ 137"/>
             <p:cNvCxnSpPr/>
             <p:nvPr/>
           </p:nvCxnSpPr>
@@ -19708,7 +19992,7 @@
         </p:cxnSp>
         <p:cxnSp>
           <p:nvCxnSpPr>
-            <p:cNvPr id="154" name="直線コネクタ 153"/>
+            <p:cNvPr id="139" name="直線コネクタ 138"/>
             <p:cNvCxnSpPr/>
             <p:nvPr/>
           </p:nvCxnSpPr>
@@ -19743,7 +20027,7 @@
         </p:cxnSp>
         <p:cxnSp>
           <p:nvCxnSpPr>
-            <p:cNvPr id="155" name="直線コネクタ 154"/>
+            <p:cNvPr id="185" name="直線コネクタ 184"/>
             <p:cNvCxnSpPr/>
             <p:nvPr/>
           </p:nvCxnSpPr>
@@ -19779,7 +20063,7 @@
       </p:grpSp>
       <p:cxnSp>
         <p:nvCxnSpPr>
-          <p:cNvPr id="156" name="直線コネクタ 155"/>
+          <p:cNvPr id="186" name="直線コネクタ 185"/>
           <p:cNvCxnSpPr/>
           <p:nvPr/>
         </p:nvCxnSpPr>
@@ -19817,7 +20101,7 @@
       </p:cxnSp>
       <p:sp>
         <p:nvSpPr>
-          <p:cNvPr id="157" name="テキスト ボックス 156"/>
+          <p:cNvPr id="187" name="テキスト ボックス 186"/>
           <p:cNvSpPr txBox="1"/>
           <p:nvPr/>
         </p:nvSpPr>
@@ -19855,7 +20139,7 @@
       </p:sp>
       <p:sp>
         <p:nvSpPr>
-          <p:cNvPr id="158" name="角丸四角形 157"/>
+          <p:cNvPr id="188" name="角丸四角形 187"/>
           <p:cNvSpPr/>
           <p:nvPr/>
         </p:nvSpPr>
@@ -19900,7 +20184,7 @@
       </p:sp>
       <p:sp>
         <p:nvSpPr>
-          <p:cNvPr id="159" name="テキスト ボックス 158"/>
+          <p:cNvPr id="189" name="テキスト ボックス 188"/>
           <p:cNvSpPr txBox="1"/>
           <p:nvPr/>
         </p:nvSpPr>
@@ -19938,7 +20222,7 @@
       </p:sp>
       <p:sp>
         <p:nvSpPr>
-          <p:cNvPr id="160" name="テキスト ボックス 159"/>
+          <p:cNvPr id="190" name="テキスト ボックス 189"/>
           <p:cNvSpPr txBox="1"/>
           <p:nvPr/>
         </p:nvSpPr>
@@ -19984,7 +20268,7 @@
       </p:sp>
       <p:sp>
         <p:nvSpPr>
-          <p:cNvPr id="161" name="角丸四角形 160"/>
+          <p:cNvPr id="191" name="角丸四角形 190"/>
           <p:cNvSpPr/>
           <p:nvPr/>
         </p:nvSpPr>
@@ -20029,7 +20313,7 @@
       </p:sp>
       <p:grpSp>
         <p:nvGrpSpPr>
-          <p:cNvPr id="162" name="図形グループ 161"/>
+          <p:cNvPr id="192" name="図形グループ 191"/>
           <p:cNvGrpSpPr/>
           <p:nvPr/>
         </p:nvGrpSpPr>
@@ -20043,7 +20327,7 @@
         </p:grpSpPr>
         <p:sp>
           <p:nvSpPr>
-            <p:cNvPr id="163" name="角丸四角形 162"/>
+            <p:cNvPr id="193" name="角丸四角形 192"/>
             <p:cNvSpPr/>
             <p:nvPr/>
           </p:nvSpPr>
@@ -20105,7 +20389,7 @@
         </p:sp>
         <p:sp>
           <p:nvSpPr>
-            <p:cNvPr id="164" name="二等辺三角形 163"/>
+            <p:cNvPr id="194" name="二等辺三角形 193"/>
             <p:cNvSpPr/>
             <p:nvPr/>
           </p:nvSpPr>
@@ -20151,7 +20435,7 @@
       </p:grpSp>
       <p:sp>
         <p:nvSpPr>
-          <p:cNvPr id="165" name="テキスト ボックス 164"/>
+          <p:cNvPr id="195" name="テキスト ボックス 194"/>
           <p:cNvSpPr txBox="1"/>
           <p:nvPr/>
         </p:nvSpPr>
@@ -20197,7 +20481,7 @@
       </p:sp>
       <p:sp>
         <p:nvSpPr>
-          <p:cNvPr id="166" name="角丸四角形 165"/>
+          <p:cNvPr id="196" name="角丸四角形 195"/>
           <p:cNvSpPr/>
           <p:nvPr/>
         </p:nvSpPr>
@@ -20242,7 +20526,7 @@
       </p:sp>
       <p:sp>
         <p:nvSpPr>
-          <p:cNvPr id="167" name="テキスト ボックス 166"/>
+          <p:cNvPr id="197" name="テキスト ボックス 196"/>
           <p:cNvSpPr txBox="1"/>
           <p:nvPr/>
         </p:nvSpPr>
@@ -20288,7 +20572,7 @@
       </p:sp>
       <p:sp>
         <p:nvSpPr>
-          <p:cNvPr id="168" name="角丸四角形 167"/>
+          <p:cNvPr id="198" name="角丸四角形 197"/>
           <p:cNvSpPr/>
           <p:nvPr/>
         </p:nvSpPr>
@@ -20333,7 +20617,7 @@
       </p:sp>
       <p:sp>
         <p:nvSpPr>
-          <p:cNvPr id="169" name="角丸四角形 168"/>
+          <p:cNvPr id="199" name="角丸四角形 198"/>
           <p:cNvSpPr/>
           <p:nvPr/>
         </p:nvSpPr>
@@ -20378,7 +20662,7 @@
       </p:sp>
       <p:sp>
         <p:nvSpPr>
-          <p:cNvPr id="170" name="テキスト ボックス 169"/>
+          <p:cNvPr id="200" name="テキスト ボックス 199"/>
           <p:cNvSpPr txBox="1"/>
           <p:nvPr/>
         </p:nvSpPr>
@@ -20416,7 +20700,7 @@
       </p:sp>
       <p:sp>
         <p:nvSpPr>
-          <p:cNvPr id="171" name="角丸四角形 170"/>
+          <p:cNvPr id="201" name="角丸四角形 200"/>
           <p:cNvSpPr/>
           <p:nvPr/>
         </p:nvSpPr>
@@ -20461,7 +20745,7 @@
       </p:sp>
       <p:sp>
         <p:nvSpPr>
-          <p:cNvPr id="172" name="角丸四角形 171"/>
+          <p:cNvPr id="202" name="角丸四角形 201"/>
           <p:cNvSpPr/>
           <p:nvPr/>
         </p:nvSpPr>
@@ -20524,7 +20808,7 @@
       </p:sp>
       <p:grpSp>
         <p:nvGrpSpPr>
-          <p:cNvPr id="173" name="図形グループ 172"/>
+          <p:cNvPr id="203" name="図形グループ 202"/>
           <p:cNvGrpSpPr/>
           <p:nvPr/>
         </p:nvGrpSpPr>
@@ -20538,7 +20822,7 @@
         </p:grpSpPr>
         <p:sp>
           <p:nvSpPr>
-            <p:cNvPr id="174" name="角丸四角形 173"/>
+            <p:cNvPr id="204" name="角丸四角形 203"/>
             <p:cNvSpPr/>
             <p:nvPr/>
           </p:nvSpPr>
@@ -20587,7 +20871,7 @@
         </p:sp>
         <p:cxnSp>
           <p:nvCxnSpPr>
-            <p:cNvPr id="175" name="直線コネクタ 174"/>
+            <p:cNvPr id="205" name="直線コネクタ 204"/>
             <p:cNvCxnSpPr/>
             <p:nvPr/>
           </p:nvCxnSpPr>
@@ -20622,7 +20906,7 @@
         </p:cxnSp>
         <p:cxnSp>
           <p:nvCxnSpPr>
-            <p:cNvPr id="176" name="直線コネクタ 175"/>
+            <p:cNvPr id="206" name="直線コネクタ 205"/>
             <p:cNvCxnSpPr/>
             <p:nvPr/>
           </p:nvCxnSpPr>
@@ -20657,7 +20941,7 @@
         </p:cxnSp>
         <p:cxnSp>
           <p:nvCxnSpPr>
-            <p:cNvPr id="177" name="直線コネクタ 176"/>
+            <p:cNvPr id="207" name="直線コネクタ 206"/>
             <p:cNvCxnSpPr/>
             <p:nvPr/>
           </p:nvCxnSpPr>
@@ -20693,7 +20977,7 @@
       </p:grpSp>
       <p:sp>
         <p:nvSpPr>
-          <p:cNvPr id="178" name="テキスト ボックス 177"/>
+          <p:cNvPr id="208" name="テキスト ボックス 207"/>
           <p:cNvSpPr txBox="1"/>
           <p:nvPr/>
         </p:nvSpPr>
@@ -20731,7 +21015,7 @@
       </p:sp>
       <p:sp>
         <p:nvSpPr>
-          <p:cNvPr id="217" name="テキスト ボックス 216"/>
+          <p:cNvPr id="209" name="テキスト ボックス 208"/>
           <p:cNvSpPr txBox="1"/>
           <p:nvPr/>
         </p:nvSpPr>
@@ -20769,7 +21053,7 @@
       </p:sp>
       <p:sp>
         <p:nvSpPr>
-          <p:cNvPr id="218" name="円/楕円 217"/>
+          <p:cNvPr id="210" name="円/楕円 209"/>
           <p:cNvSpPr/>
           <p:nvPr/>
         </p:nvSpPr>
@@ -20814,7 +21098,7 @@
       </p:sp>
       <p:sp>
         <p:nvSpPr>
-          <p:cNvPr id="219" name="円/楕円 218"/>
+          <p:cNvPr id="211" name="円/楕円 210"/>
           <p:cNvSpPr/>
           <p:nvPr/>
         </p:nvSpPr>
@@ -20859,7 +21143,7 @@
       </p:sp>
       <p:grpSp>
         <p:nvGrpSpPr>
-          <p:cNvPr id="220" name="図形グループ 219"/>
+          <p:cNvPr id="212" name="図形グループ 211"/>
           <p:cNvGrpSpPr/>
           <p:nvPr/>
         </p:nvGrpSpPr>
@@ -20873,7 +21157,7 @@
         </p:grpSpPr>
         <p:sp>
           <p:nvSpPr>
-            <p:cNvPr id="221" name="角丸四角形 220"/>
+            <p:cNvPr id="213" name="角丸四角形 212"/>
             <p:cNvSpPr/>
             <p:nvPr/>
           </p:nvSpPr>
@@ -20924,7 +21208,7 @@
         </p:sp>
         <p:sp>
           <p:nvSpPr>
-            <p:cNvPr id="222" name="二等辺三角形 221"/>
+            <p:cNvPr id="214" name="二等辺三角形 213"/>
             <p:cNvSpPr/>
             <p:nvPr/>
           </p:nvSpPr>
@@ -20970,7 +21254,7 @@
       </p:grpSp>
       <p:sp>
         <p:nvSpPr>
-          <p:cNvPr id="223" name="テキスト ボックス 222"/>
+          <p:cNvPr id="215" name="テキスト ボックス 214"/>
           <p:cNvSpPr txBox="1"/>
           <p:nvPr/>
         </p:nvSpPr>
@@ -21008,7 +21292,7 @@
       </p:sp>
       <p:sp>
         <p:nvSpPr>
-          <p:cNvPr id="224" name="二等辺三角形 223"/>
+          <p:cNvPr id="216" name="二等辺三角形 215"/>
           <p:cNvSpPr/>
           <p:nvPr/>
         </p:nvSpPr>
@@ -21053,7 +21337,7 @@
       </p:sp>
       <p:sp>
         <p:nvSpPr>
-          <p:cNvPr id="225" name="二等辺三角形 224"/>
+          <p:cNvPr id="233" name="二等辺三角形 232"/>
           <p:cNvSpPr/>
           <p:nvPr/>
         </p:nvSpPr>
@@ -21098,7 +21382,7 @@
       </p:sp>
       <p:sp>
         <p:nvSpPr>
-          <p:cNvPr id="226" name="二等辺三角形 225"/>
+          <p:cNvPr id="234" name="二等辺三角形 233"/>
           <p:cNvSpPr/>
           <p:nvPr/>
         </p:nvSpPr>
@@ -21143,7 +21427,7 @@
       </p:sp>
       <p:sp>
         <p:nvSpPr>
-          <p:cNvPr id="227" name="二等辺三角形 226"/>
+          <p:cNvPr id="235" name="二等辺三角形 234"/>
           <p:cNvSpPr/>
           <p:nvPr/>
         </p:nvSpPr>
@@ -21188,7 +21472,7 @@
       </p:sp>
       <p:sp>
         <p:nvSpPr>
-          <p:cNvPr id="228" name="二等辺三角形 227"/>
+          <p:cNvPr id="236" name="二等辺三角形 235"/>
           <p:cNvSpPr/>
           <p:nvPr/>
         </p:nvSpPr>
@@ -21233,7 +21517,7 @@
       </p:sp>
       <p:sp>
         <p:nvSpPr>
-          <p:cNvPr id="229" name="二等辺三角形 228"/>
+          <p:cNvPr id="237" name="二等辺三角形 236"/>
           <p:cNvSpPr/>
           <p:nvPr/>
         </p:nvSpPr>
@@ -21278,7 +21562,7 @@
       </p:sp>
       <p:sp>
         <p:nvSpPr>
-          <p:cNvPr id="230" name="二等辺三角形 229"/>
+          <p:cNvPr id="238" name="二等辺三角形 237"/>
           <p:cNvSpPr/>
           <p:nvPr/>
         </p:nvSpPr>
@@ -21323,7 +21607,7 @@
       </p:sp>
       <p:sp>
         <p:nvSpPr>
-          <p:cNvPr id="231" name="二等辺三角形 230"/>
+          <p:cNvPr id="239" name="二等辺三角形 238"/>
           <p:cNvSpPr/>
           <p:nvPr/>
         </p:nvSpPr>
@@ -21368,7 +21652,90 @@
       </p:sp>
       <p:sp>
         <p:nvSpPr>
-          <p:cNvPr id="232" name="正方形/長方形 231"/>
+          <p:cNvPr id="240" name="テキスト ボックス 239"/>
+          <p:cNvSpPr txBox="1"/>
+          <p:nvPr/>
+        </p:nvSpPr>
+        <p:spPr>
+          <a:xfrm>
+            <a:off x="7120566" y="2122353"/>
+            <a:ext cx="697627" cy="246221"/>
+          </a:xfrm>
+          <a:prstGeom prst="rect">
+            <a:avLst/>
+          </a:prstGeom>
+          <a:noFill/>
+        </p:spPr>
+        <p:txBody>
+          <a:bodyPr wrap="none" rtlCol="0">
+            <a:spAutoFit/>
+          </a:bodyPr>
+          <a:lstStyle/>
+          <a:p>
+            <a:r>
+              <a:rPr lang="en-US" altLang="en-US" sz="1000" dirty="0" smtClean="0">
+                <a:latin typeface="メイリオ"/>
+                <a:ea typeface="メイリオ"/>
+                <a:cs typeface="メイリオ"/>
+              </a:rPr>
+              <a:t>表示件数</a:t>
+            </a:r>
+            <a:endParaRPr kumimoji="1" lang="ja-JP" altLang="en-US" sz="1000" dirty="0">
+              <a:latin typeface="メイリオ"/>
+              <a:ea typeface="メイリオ"/>
+              <a:cs typeface="メイリオ"/>
+            </a:endParaRPr>
+          </a:p>
+        </p:txBody>
+      </p:sp>
+      <p:sp>
+        <p:nvSpPr>
+          <p:cNvPr id="241" name="角丸四角形 240"/>
+          <p:cNvSpPr/>
+          <p:nvPr/>
+        </p:nvSpPr>
+        <p:spPr>
+          <a:xfrm>
+            <a:off x="7832121" y="2169029"/>
+            <a:ext cx="352321" cy="158766"/>
+          </a:xfrm>
+          <a:prstGeom prst="roundRect">
+            <a:avLst/>
+          </a:prstGeom>
+          <a:noFill/>
+          <a:ln w="25400">
+            <a:solidFill>
+              <a:schemeClr val="tx1"/>
+            </a:solidFill>
+          </a:ln>
+          <a:effectLst/>
+        </p:spPr>
+        <p:style>
+          <a:lnRef idx="1">
+            <a:schemeClr val="accent1"/>
+          </a:lnRef>
+          <a:fillRef idx="3">
+            <a:schemeClr val="accent1"/>
+          </a:fillRef>
+          <a:effectRef idx="2">
+            <a:schemeClr val="accent1"/>
+          </a:effectRef>
+          <a:fontRef idx="minor">
+            <a:schemeClr val="lt1"/>
+          </a:fontRef>
+        </p:style>
+        <p:txBody>
+          <a:bodyPr rtlCol="0" anchor="ctr"/>
+          <a:lstStyle/>
+          <a:p>
+            <a:pPr algn="ctr"/>
+            <a:endParaRPr kumimoji="1" lang="ja-JP" altLang="en-US"/>
+          </a:p>
+        </p:txBody>
+      </p:sp>
+      <p:sp>
+        <p:nvSpPr>
+          <p:cNvPr id="242" name="正方形/長方形 241"/>
           <p:cNvSpPr/>
           <p:nvPr/>
         </p:nvSpPr>

</xml_diff>